<commit_message>
Complete more of report. Change the plotting of some figures. Add object to assembly drawing.
</commit_message>
<xml_diff>
--- a/Report/Figures.pptx
+++ b/Report/Figures.pptx
@@ -262,7 +262,7 @@
           <a:p>
             <a:fld id="{CD8A8668-38E6-4869-B909-2A20D69E4707}" type="datetimeFigureOut">
               <a:rPr lang="en-AU" smtClean="0"/>
-              <a:t>25/05/2020</a:t>
+              <a:t>1/06/2020</a:t>
             </a:fld>
             <a:endParaRPr lang="en-AU"/>
           </a:p>
@@ -462,7 +462,7 @@
           <a:p>
             <a:fld id="{CD8A8668-38E6-4869-B909-2A20D69E4707}" type="datetimeFigureOut">
               <a:rPr lang="en-AU" smtClean="0"/>
-              <a:t>25/05/2020</a:t>
+              <a:t>1/06/2020</a:t>
             </a:fld>
             <a:endParaRPr lang="en-AU"/>
           </a:p>
@@ -672,7 +672,7 @@
           <a:p>
             <a:fld id="{CD8A8668-38E6-4869-B909-2A20D69E4707}" type="datetimeFigureOut">
               <a:rPr lang="en-AU" smtClean="0"/>
-              <a:t>25/05/2020</a:t>
+              <a:t>1/06/2020</a:t>
             </a:fld>
             <a:endParaRPr lang="en-AU"/>
           </a:p>
@@ -872,7 +872,7 @@
           <a:p>
             <a:fld id="{CD8A8668-38E6-4869-B909-2A20D69E4707}" type="datetimeFigureOut">
               <a:rPr lang="en-AU" smtClean="0"/>
-              <a:t>25/05/2020</a:t>
+              <a:t>1/06/2020</a:t>
             </a:fld>
             <a:endParaRPr lang="en-AU"/>
           </a:p>
@@ -1148,7 +1148,7 @@
           <a:p>
             <a:fld id="{CD8A8668-38E6-4869-B909-2A20D69E4707}" type="datetimeFigureOut">
               <a:rPr lang="en-AU" smtClean="0"/>
-              <a:t>25/05/2020</a:t>
+              <a:t>1/06/2020</a:t>
             </a:fld>
             <a:endParaRPr lang="en-AU"/>
           </a:p>
@@ -1416,7 +1416,7 @@
           <a:p>
             <a:fld id="{CD8A8668-38E6-4869-B909-2A20D69E4707}" type="datetimeFigureOut">
               <a:rPr lang="en-AU" smtClean="0"/>
-              <a:t>25/05/2020</a:t>
+              <a:t>1/06/2020</a:t>
             </a:fld>
             <a:endParaRPr lang="en-AU"/>
           </a:p>
@@ -1831,7 +1831,7 @@
           <a:p>
             <a:fld id="{CD8A8668-38E6-4869-B909-2A20D69E4707}" type="datetimeFigureOut">
               <a:rPr lang="en-AU" smtClean="0"/>
-              <a:t>25/05/2020</a:t>
+              <a:t>1/06/2020</a:t>
             </a:fld>
             <a:endParaRPr lang="en-AU"/>
           </a:p>
@@ -1973,7 +1973,7 @@
           <a:p>
             <a:fld id="{CD8A8668-38E6-4869-B909-2A20D69E4707}" type="datetimeFigureOut">
               <a:rPr lang="en-AU" smtClean="0"/>
-              <a:t>25/05/2020</a:t>
+              <a:t>1/06/2020</a:t>
             </a:fld>
             <a:endParaRPr lang="en-AU"/>
           </a:p>
@@ -2086,7 +2086,7 @@
           <a:p>
             <a:fld id="{CD8A8668-38E6-4869-B909-2A20D69E4707}" type="datetimeFigureOut">
               <a:rPr lang="en-AU" smtClean="0"/>
-              <a:t>25/05/2020</a:t>
+              <a:t>1/06/2020</a:t>
             </a:fld>
             <a:endParaRPr lang="en-AU"/>
           </a:p>
@@ -2399,7 +2399,7 @@
           <a:p>
             <a:fld id="{CD8A8668-38E6-4869-B909-2A20D69E4707}" type="datetimeFigureOut">
               <a:rPr lang="en-AU" smtClean="0"/>
-              <a:t>25/05/2020</a:t>
+              <a:t>1/06/2020</a:t>
             </a:fld>
             <a:endParaRPr lang="en-AU"/>
           </a:p>
@@ -2688,7 +2688,7 @@
           <a:p>
             <a:fld id="{CD8A8668-38E6-4869-B909-2A20D69E4707}" type="datetimeFigureOut">
               <a:rPr lang="en-AU" smtClean="0"/>
-              <a:t>25/05/2020</a:t>
+              <a:t>1/06/2020</a:t>
             </a:fld>
             <a:endParaRPr lang="en-AU"/>
           </a:p>
@@ -2931,7 +2931,7 @@
           <a:p>
             <a:fld id="{CD8A8668-38E6-4869-B909-2A20D69E4707}" type="datetimeFigureOut">
               <a:rPr lang="en-AU" smtClean="0"/>
-              <a:t>25/05/2020</a:t>
+              <a:t>1/06/2020</a:t>
             </a:fld>
             <a:endParaRPr lang="en-AU"/>
           </a:p>
@@ -3350,10 +3350,10 @@
       </p:grpSpPr>
       <p:grpSp>
         <p:nvGrpSpPr>
-          <p:cNvPr id="5" name="Group 4">
+          <p:cNvPr id="29" name="Group 28">
             <a:extLst>
               <a:ext uri="{FF2B5EF4-FFF2-40B4-BE49-F238E27FC236}">
-                <a16:creationId xmlns:a16="http://schemas.microsoft.com/office/drawing/2014/main" id="{6F3EEF8B-BE0A-4884-AC74-7DD19838BFB6}"/>
+                <a16:creationId xmlns:a16="http://schemas.microsoft.com/office/drawing/2014/main" id="{177A564D-5117-4B3E-AB70-26DD80447D71}"/>
               </a:ext>
             </a:extLst>
           </p:cNvPr>
@@ -3370,10 +3370,10 @@
         </p:grpSpPr>
         <p:grpSp>
           <p:nvGrpSpPr>
-            <p:cNvPr id="84" name="Group 83">
+            <p:cNvPr id="5" name="Group 4">
               <a:extLst>
                 <a:ext uri="{FF2B5EF4-FFF2-40B4-BE49-F238E27FC236}">
-                  <a16:creationId xmlns:a16="http://schemas.microsoft.com/office/drawing/2014/main" id="{C38FCD10-709A-47EF-B83E-A4AC0A51BD9A}"/>
+                  <a16:creationId xmlns:a16="http://schemas.microsoft.com/office/drawing/2014/main" id="{6F3EEF8B-BE0A-4884-AC74-7DD19838BFB6}"/>
                 </a:ext>
               </a:extLst>
             </p:cNvPr>
@@ -3390,10 +3390,10 @@
           </p:grpSpPr>
           <p:grpSp>
             <p:nvGrpSpPr>
-              <p:cNvPr id="83" name="Group 82">
+              <p:cNvPr id="84" name="Group 83">
                 <a:extLst>
                   <a:ext uri="{FF2B5EF4-FFF2-40B4-BE49-F238E27FC236}">
-                    <a16:creationId xmlns:a16="http://schemas.microsoft.com/office/drawing/2014/main" id="{A9072F21-F22B-4F9E-A4D5-01C1604B4D4D}"/>
+                    <a16:creationId xmlns:a16="http://schemas.microsoft.com/office/drawing/2014/main" id="{C38FCD10-709A-47EF-B83E-A4AC0A51BD9A}"/>
                   </a:ext>
                 </a:extLst>
               </p:cNvPr>
@@ -3402,183 +3402,1438 @@
             </p:nvGrpSpPr>
             <p:grpSpPr>
               <a:xfrm>
-                <a:off x="3776817" y="1924345"/>
-                <a:ext cx="2700000" cy="2840631"/>
-                <a:chOff x="3776817" y="1924345"/>
-                <a:chExt cx="2700000" cy="2840631"/>
+                <a:off x="3261102" y="1924345"/>
+                <a:ext cx="3615238" cy="2840631"/>
+                <a:chOff x="3261102" y="1924345"/>
+                <a:chExt cx="3615238" cy="2840631"/>
               </a:xfrm>
             </p:grpSpPr>
-            <p:sp>
-              <p:nvSpPr>
-                <p:cNvPr id="4" name="Oval 3">
+            <p:grpSp>
+              <p:nvGrpSpPr>
+                <p:cNvPr id="83" name="Group 82">
                   <a:extLst>
                     <a:ext uri="{FF2B5EF4-FFF2-40B4-BE49-F238E27FC236}">
-                      <a16:creationId xmlns:a16="http://schemas.microsoft.com/office/drawing/2014/main" id="{217FCEBC-71B9-4078-B9CE-26FDA7EC7CF5}"/>
+                      <a16:creationId xmlns:a16="http://schemas.microsoft.com/office/drawing/2014/main" id="{A9072F21-F22B-4F9E-A4D5-01C1604B4D4D}"/>
                     </a:ext>
                   </a:extLst>
                 </p:cNvPr>
-                <p:cNvSpPr/>
+                <p:cNvGrpSpPr/>
                 <p:nvPr/>
-              </p:nvSpPr>
-              <p:spPr>
+              </p:nvGrpSpPr>
+              <p:grpSpPr>
                 <a:xfrm>
-                  <a:off x="4316817" y="2604976"/>
-                  <a:ext cx="2160000" cy="2160000"/>
+                  <a:off x="3776817" y="1924345"/>
+                  <a:ext cx="2700000" cy="2840631"/>
+                  <a:chOff x="3776817" y="1924345"/>
+                  <a:chExt cx="2700000" cy="2840631"/>
                 </a:xfrm>
-                <a:prstGeom prst="ellipse">
-                  <a:avLst/>
-                </a:prstGeom>
-                <a:noFill/>
-                <a:ln w="28575">
-                  <a:solidFill>
+              </p:grpSpPr>
+              <p:sp>
+                <p:nvSpPr>
+                  <p:cNvPr id="4" name="Oval 3">
+                    <a:extLst>
+                      <a:ext uri="{FF2B5EF4-FFF2-40B4-BE49-F238E27FC236}">
+                        <a16:creationId xmlns:a16="http://schemas.microsoft.com/office/drawing/2014/main" id="{217FCEBC-71B9-4078-B9CE-26FDA7EC7CF5}"/>
+                      </a:ext>
+                    </a:extLst>
+                  </p:cNvPr>
+                  <p:cNvSpPr/>
+                  <p:nvPr/>
+                </p:nvSpPr>
+                <p:spPr>
+                  <a:xfrm>
+                    <a:off x="4316817" y="2604976"/>
+                    <a:ext cx="2160000" cy="2160000"/>
+                  </a:xfrm>
+                  <a:prstGeom prst="ellipse">
+                    <a:avLst/>
+                  </a:prstGeom>
+                  <a:noFill/>
+                  <a:ln w="28575">
+                    <a:solidFill>
+                      <a:schemeClr val="tx1"/>
+                    </a:solidFill>
+                  </a:ln>
+                </p:spPr>
+                <p:style>
+                  <a:lnRef idx="2">
+                    <a:schemeClr val="accent1">
+                      <a:shade val="50000"/>
+                    </a:schemeClr>
+                  </a:lnRef>
+                  <a:fillRef idx="1">
+                    <a:schemeClr val="accent1"/>
+                  </a:fillRef>
+                  <a:effectRef idx="0">
+                    <a:schemeClr val="accent1"/>
+                  </a:effectRef>
+                  <a:fontRef idx="minor">
+                    <a:schemeClr val="lt1"/>
+                  </a:fontRef>
+                </p:style>
+                <p:txBody>
+                  <a:bodyPr rtlCol="0" anchor="ctr"/>
+                  <a:lstStyle/>
+                  <a:p>
+                    <a:pPr algn="ctr"/>
+                    <a:endParaRPr lang="en-AU"/>
+                  </a:p>
+                </p:txBody>
+              </p:sp>
+              <p:sp>
+                <p:nvSpPr>
+                  <p:cNvPr id="6" name="Oval 5">
+                    <a:extLst>
+                      <a:ext uri="{FF2B5EF4-FFF2-40B4-BE49-F238E27FC236}">
+                        <a16:creationId xmlns:a16="http://schemas.microsoft.com/office/drawing/2014/main" id="{4B86FA2E-8825-4DB5-A12B-168614AF73EA}"/>
+                      </a:ext>
+                    </a:extLst>
+                  </p:cNvPr>
+                  <p:cNvSpPr/>
+                  <p:nvPr/>
+                </p:nvSpPr>
+                <p:spPr>
+                  <a:xfrm>
+                    <a:off x="3776817" y="1924345"/>
+                    <a:ext cx="1080000" cy="1080000"/>
+                  </a:xfrm>
+                  <a:prstGeom prst="ellipse">
+                    <a:avLst/>
+                  </a:prstGeom>
+                  <a:noFill/>
+                  <a:ln w="28575">
+                    <a:solidFill>
+                      <a:schemeClr val="tx1"/>
+                    </a:solidFill>
+                  </a:ln>
+                </p:spPr>
+                <p:style>
+                  <a:lnRef idx="2">
+                    <a:schemeClr val="accent1">
+                      <a:shade val="50000"/>
+                    </a:schemeClr>
+                  </a:lnRef>
+                  <a:fillRef idx="1">
+                    <a:schemeClr val="accent1"/>
+                  </a:fillRef>
+                  <a:effectRef idx="0">
+                    <a:schemeClr val="accent1"/>
+                  </a:effectRef>
+                  <a:fontRef idx="minor">
+                    <a:schemeClr val="lt1"/>
+                  </a:fontRef>
+                </p:style>
+                <p:txBody>
+                  <a:bodyPr rtlCol="0" anchor="ctr"/>
+                  <a:lstStyle/>
+                  <a:p>
+                    <a:pPr algn="ctr"/>
+                    <a:endParaRPr lang="en-AU"/>
+                  </a:p>
+                </p:txBody>
+              </p:sp>
+              <p:cxnSp>
+                <p:nvCxnSpPr>
+                  <p:cNvPr id="10" name="Straight Connector 9">
+                    <a:extLst>
+                      <a:ext uri="{FF2B5EF4-FFF2-40B4-BE49-F238E27FC236}">
+                        <a16:creationId xmlns:a16="http://schemas.microsoft.com/office/drawing/2014/main" id="{293CE433-AFE5-40EA-8087-4D1ABFA1ED09}"/>
+                      </a:ext>
+                    </a:extLst>
+                  </p:cNvPr>
+                  <p:cNvCxnSpPr>
+                    <a:cxnSpLocks/>
+                  </p:cNvCxnSpPr>
+                  <p:nvPr/>
+                </p:nvCxnSpPr>
+                <p:spPr>
+                  <a:xfrm>
+                    <a:off x="5396817" y="2184400"/>
+                    <a:ext cx="0" cy="1496600"/>
+                  </a:xfrm>
+                  <a:prstGeom prst="line">
+                    <a:avLst/>
+                  </a:prstGeom>
+                  <a:ln w="12700">
+                    <a:solidFill>
+                      <a:schemeClr val="tx1"/>
+                    </a:solidFill>
+                    <a:prstDash val="dash"/>
+                  </a:ln>
+                </p:spPr>
+                <p:style>
+                  <a:lnRef idx="1">
+                    <a:schemeClr val="accent1"/>
+                  </a:lnRef>
+                  <a:fillRef idx="0">
+                    <a:schemeClr val="accent1"/>
+                  </a:fillRef>
+                  <a:effectRef idx="0">
+                    <a:schemeClr val="accent1"/>
+                  </a:effectRef>
+                  <a:fontRef idx="minor">
                     <a:schemeClr val="tx1"/>
-                  </a:solidFill>
-                </a:ln>
-              </p:spPr>
-              <p:style>
-                <a:lnRef idx="2">
-                  <a:schemeClr val="accent1">
-                    <a:shade val="50000"/>
-                  </a:schemeClr>
-                </a:lnRef>
-                <a:fillRef idx="1">
-                  <a:schemeClr val="accent1"/>
-                </a:fillRef>
-                <a:effectRef idx="0">
-                  <a:schemeClr val="accent1"/>
-                </a:effectRef>
-                <a:fontRef idx="minor">
-                  <a:schemeClr val="lt1"/>
-                </a:fontRef>
-              </p:style>
-              <p:txBody>
-                <a:bodyPr rtlCol="0" anchor="ctr"/>
-                <a:lstStyle/>
-                <a:p>
-                  <a:pPr algn="ctr"/>
-                  <a:endParaRPr lang="en-AU"/>
-                </a:p>
-              </p:txBody>
-            </p:sp>
-            <p:sp>
-              <p:nvSpPr>
-                <p:cNvPr id="6" name="Oval 5">
+                  </a:fontRef>
+                </p:style>
+              </p:cxnSp>
+              <p:cxnSp>
+                <p:nvCxnSpPr>
+                  <p:cNvPr id="14" name="Straight Arrow Connector 13">
+                    <a:extLst>
+                      <a:ext uri="{FF2B5EF4-FFF2-40B4-BE49-F238E27FC236}">
+                        <a16:creationId xmlns:a16="http://schemas.microsoft.com/office/drawing/2014/main" id="{279F4278-1777-4701-B388-6DDE34A30049}"/>
+                      </a:ext>
+                    </a:extLst>
+                  </p:cNvPr>
+                  <p:cNvCxnSpPr>
+                    <a:cxnSpLocks/>
+                  </p:cNvCxnSpPr>
+                  <p:nvPr/>
+                </p:nvCxnSpPr>
+                <p:spPr>
+                  <a:xfrm flipV="1">
+                    <a:off x="5396817" y="2977116"/>
+                    <a:ext cx="0" cy="720000"/>
+                  </a:xfrm>
+                  <a:prstGeom prst="straightConnector1">
+                    <a:avLst/>
+                  </a:prstGeom>
+                  <a:ln w="19050">
+                    <a:solidFill>
+                      <a:schemeClr val="tx1"/>
+                    </a:solidFill>
+                    <a:tailEnd type="triangle"/>
+                  </a:ln>
+                </p:spPr>
+                <p:style>
+                  <a:lnRef idx="1">
+                    <a:schemeClr val="accent2"/>
+                  </a:lnRef>
+                  <a:fillRef idx="0">
+                    <a:schemeClr val="accent2"/>
+                  </a:fillRef>
+                  <a:effectRef idx="0">
+                    <a:schemeClr val="accent2"/>
+                  </a:effectRef>
+                  <a:fontRef idx="minor">
+                    <a:schemeClr val="tx1"/>
+                  </a:fontRef>
+                </p:style>
+              </p:cxnSp>
+              <p:cxnSp>
+                <p:nvCxnSpPr>
+                  <p:cNvPr id="16" name="Straight Arrow Connector 15">
+                    <a:extLst>
+                      <a:ext uri="{FF2B5EF4-FFF2-40B4-BE49-F238E27FC236}">
+                        <a16:creationId xmlns:a16="http://schemas.microsoft.com/office/drawing/2014/main" id="{BEAB7341-B176-4DC7-A1C7-BBC35AD560AA}"/>
+                      </a:ext>
+                    </a:extLst>
+                  </p:cNvPr>
+                  <p:cNvCxnSpPr>
+                    <a:cxnSpLocks/>
+                  </p:cNvCxnSpPr>
+                  <p:nvPr/>
+                </p:nvCxnSpPr>
+                <p:spPr>
+                  <a:xfrm>
+                    <a:off x="5396817" y="3684976"/>
+                    <a:ext cx="720000" cy="0"/>
+                  </a:xfrm>
+                  <a:prstGeom prst="straightConnector1">
+                    <a:avLst/>
+                  </a:prstGeom>
+                  <a:ln w="19050">
+                    <a:solidFill>
+                      <a:schemeClr val="tx1"/>
+                    </a:solidFill>
+                    <a:tailEnd type="triangle"/>
+                  </a:ln>
+                </p:spPr>
+                <p:style>
+                  <a:lnRef idx="1">
+                    <a:schemeClr val="accent2"/>
+                  </a:lnRef>
+                  <a:fillRef idx="0">
+                    <a:schemeClr val="accent2"/>
+                  </a:fillRef>
+                  <a:effectRef idx="0">
+                    <a:schemeClr val="accent2"/>
+                  </a:effectRef>
+                  <a:fontRef idx="minor">
+                    <a:schemeClr val="tx1"/>
+                  </a:fontRef>
+                </p:style>
+              </p:cxnSp>
+              <p:cxnSp>
+                <p:nvCxnSpPr>
+                  <p:cNvPr id="18" name="Straight Arrow Connector 17">
+                    <a:extLst>
+                      <a:ext uri="{FF2B5EF4-FFF2-40B4-BE49-F238E27FC236}">
+                        <a16:creationId xmlns:a16="http://schemas.microsoft.com/office/drawing/2014/main" id="{FD057466-ADB6-424D-8972-F84418BC76C5}"/>
+                      </a:ext>
+                    </a:extLst>
+                  </p:cNvPr>
+                  <p:cNvCxnSpPr>
+                    <a:cxnSpLocks/>
+                  </p:cNvCxnSpPr>
+                  <p:nvPr/>
+                </p:nvCxnSpPr>
+                <p:spPr>
+                  <a:xfrm flipH="1" flipV="1">
+                    <a:off x="5145087" y="3004345"/>
+                    <a:ext cx="252000" cy="684000"/>
+                  </a:xfrm>
+                  <a:prstGeom prst="straightConnector1">
+                    <a:avLst/>
+                  </a:prstGeom>
+                  <a:ln w="19050">
+                    <a:solidFill>
+                      <a:schemeClr val="tx1"/>
+                    </a:solidFill>
+                    <a:tailEnd type="triangle"/>
+                  </a:ln>
+                </p:spPr>
+                <p:style>
+                  <a:lnRef idx="1">
+                    <a:schemeClr val="accent2"/>
+                  </a:lnRef>
+                  <a:fillRef idx="0">
+                    <a:schemeClr val="accent2"/>
+                  </a:fillRef>
+                  <a:effectRef idx="0">
+                    <a:schemeClr val="accent2"/>
+                  </a:effectRef>
+                  <a:fontRef idx="minor">
+                    <a:schemeClr val="tx1"/>
+                  </a:fontRef>
+                </p:style>
+              </p:cxnSp>
+              <p:cxnSp>
+                <p:nvCxnSpPr>
+                  <p:cNvPr id="21" name="Straight Arrow Connector 20">
+                    <a:extLst>
+                      <a:ext uri="{FF2B5EF4-FFF2-40B4-BE49-F238E27FC236}">
+                        <a16:creationId xmlns:a16="http://schemas.microsoft.com/office/drawing/2014/main" id="{0756B9D7-1FF7-482A-9D92-5FDEEFD26943}"/>
+                      </a:ext>
+                    </a:extLst>
+                  </p:cNvPr>
+                  <p:cNvCxnSpPr>
+                    <a:cxnSpLocks/>
+                  </p:cNvCxnSpPr>
+                  <p:nvPr/>
+                </p:nvCxnSpPr>
+                <p:spPr>
+                  <a:xfrm flipV="1">
+                    <a:off x="5396816" y="3429000"/>
+                    <a:ext cx="639653" cy="252000"/>
+                  </a:xfrm>
+                  <a:prstGeom prst="straightConnector1">
+                    <a:avLst/>
+                  </a:prstGeom>
+                  <a:ln w="19050">
+                    <a:solidFill>
+                      <a:schemeClr val="tx1"/>
+                    </a:solidFill>
+                    <a:tailEnd type="triangle"/>
+                  </a:ln>
+                </p:spPr>
+                <p:style>
+                  <a:lnRef idx="1">
+                    <a:schemeClr val="accent2"/>
+                  </a:lnRef>
+                  <a:fillRef idx="0">
+                    <a:schemeClr val="accent2"/>
+                  </a:fillRef>
+                  <a:effectRef idx="0">
+                    <a:schemeClr val="accent2"/>
+                  </a:effectRef>
+                  <a:fontRef idx="minor">
+                    <a:schemeClr val="tx1"/>
+                  </a:fontRef>
+                </p:style>
+              </p:cxnSp>
+              <p:cxnSp>
+                <p:nvCxnSpPr>
+                  <p:cNvPr id="30" name="Straight Connector 29">
+                    <a:extLst>
+                      <a:ext uri="{FF2B5EF4-FFF2-40B4-BE49-F238E27FC236}">
+                        <a16:creationId xmlns:a16="http://schemas.microsoft.com/office/drawing/2014/main" id="{C4DFE6C3-67DE-4328-AFF1-2F84206EFD0C}"/>
+                      </a:ext>
+                    </a:extLst>
+                  </p:cNvPr>
+                  <p:cNvCxnSpPr>
+                    <a:cxnSpLocks/>
+                  </p:cNvCxnSpPr>
+                  <p:nvPr/>
+                </p:nvCxnSpPr>
+                <p:spPr>
+                  <a:xfrm flipH="1" flipV="1">
+                    <a:off x="4321698" y="2470293"/>
+                    <a:ext cx="1075119" cy="1220320"/>
+                  </a:xfrm>
+                  <a:prstGeom prst="line">
+                    <a:avLst/>
+                  </a:prstGeom>
+                  <a:ln w="12700">
+                    <a:solidFill>
+                      <a:schemeClr val="tx1"/>
+                    </a:solidFill>
+                    <a:prstDash val="dash"/>
+                  </a:ln>
+                </p:spPr>
+                <p:style>
+                  <a:lnRef idx="1">
+                    <a:schemeClr val="accent1"/>
+                  </a:lnRef>
+                  <a:fillRef idx="0">
+                    <a:schemeClr val="accent1"/>
+                  </a:fillRef>
+                  <a:effectRef idx="0">
+                    <a:schemeClr val="accent1"/>
+                  </a:effectRef>
+                  <a:fontRef idx="minor">
+                    <a:schemeClr val="tx1"/>
+                  </a:fontRef>
+                </p:style>
+              </p:cxnSp>
+              <p:cxnSp>
+                <p:nvCxnSpPr>
+                  <p:cNvPr id="39" name="Straight Arrow Connector 38">
+                    <a:extLst>
+                      <a:ext uri="{FF2B5EF4-FFF2-40B4-BE49-F238E27FC236}">
+                        <a16:creationId xmlns:a16="http://schemas.microsoft.com/office/drawing/2014/main" id="{B9A052FE-FAD7-4021-917E-862BCE3D0989}"/>
+                      </a:ext>
+                    </a:extLst>
+                  </p:cNvPr>
+                  <p:cNvCxnSpPr>
+                    <a:cxnSpLocks/>
+                  </p:cNvCxnSpPr>
+                  <p:nvPr/>
+                </p:nvCxnSpPr>
+                <p:spPr>
+                  <a:xfrm>
+                    <a:off x="4309540" y="2464345"/>
+                    <a:ext cx="360000" cy="0"/>
+                  </a:xfrm>
+                  <a:prstGeom prst="straightConnector1">
+                    <a:avLst/>
+                  </a:prstGeom>
+                  <a:ln w="19050">
+                    <a:solidFill>
+                      <a:schemeClr val="tx1"/>
+                    </a:solidFill>
+                    <a:tailEnd type="triangle"/>
+                  </a:ln>
+                </p:spPr>
+                <p:style>
+                  <a:lnRef idx="1">
+                    <a:schemeClr val="accent2"/>
+                  </a:lnRef>
+                  <a:fillRef idx="0">
+                    <a:schemeClr val="accent2"/>
+                  </a:fillRef>
+                  <a:effectRef idx="0">
+                    <a:schemeClr val="accent2"/>
+                  </a:effectRef>
+                  <a:fontRef idx="minor">
+                    <a:schemeClr val="tx1"/>
+                  </a:fontRef>
+                </p:style>
+              </p:cxnSp>
+              <p:cxnSp>
+                <p:nvCxnSpPr>
+                  <p:cNvPr id="41" name="Straight Arrow Connector 40">
+                    <a:extLst>
+                      <a:ext uri="{FF2B5EF4-FFF2-40B4-BE49-F238E27FC236}">
+                        <a16:creationId xmlns:a16="http://schemas.microsoft.com/office/drawing/2014/main" id="{B1C212CE-4C3A-4C9E-882A-B3A2EE07541D}"/>
+                      </a:ext>
+                    </a:extLst>
+                  </p:cNvPr>
+                  <p:cNvCxnSpPr>
+                    <a:cxnSpLocks/>
+                  </p:cNvCxnSpPr>
+                  <p:nvPr/>
+                </p:nvCxnSpPr>
+                <p:spPr>
+                  <a:xfrm flipV="1">
+                    <a:off x="4318541" y="2104345"/>
+                    <a:ext cx="0" cy="360000"/>
+                  </a:xfrm>
+                  <a:prstGeom prst="straightConnector1">
+                    <a:avLst/>
+                  </a:prstGeom>
+                  <a:ln w="19050">
+                    <a:solidFill>
+                      <a:schemeClr val="tx1"/>
+                    </a:solidFill>
+                    <a:tailEnd type="triangle"/>
+                  </a:ln>
+                </p:spPr>
+                <p:style>
+                  <a:lnRef idx="1">
+                    <a:schemeClr val="accent2"/>
+                  </a:lnRef>
+                  <a:fillRef idx="0">
+                    <a:schemeClr val="accent2"/>
+                  </a:fillRef>
+                  <a:effectRef idx="0">
+                    <a:schemeClr val="accent2"/>
+                  </a:effectRef>
+                  <a:fontRef idx="minor">
+                    <a:schemeClr val="tx1"/>
+                  </a:fontRef>
+                </p:style>
+              </p:cxnSp>
+              <p:sp>
+                <p:nvSpPr>
+                  <p:cNvPr id="56" name="Arc 55">
+                    <a:extLst>
+                      <a:ext uri="{FF2B5EF4-FFF2-40B4-BE49-F238E27FC236}">
+                        <a16:creationId xmlns:a16="http://schemas.microsoft.com/office/drawing/2014/main" id="{11E3468C-ECBB-4BF4-BB54-3D96C13A264B}"/>
+                      </a:ext>
+                    </a:extLst>
+                  </p:cNvPr>
+                  <p:cNvSpPr/>
+                  <p:nvPr/>
+                </p:nvSpPr>
+                <p:spPr>
+                  <a:xfrm rot="16200000">
+                    <a:off x="4136414" y="2271010"/>
+                    <a:ext cx="360000" cy="360000"/>
+                  </a:xfrm>
+                  <a:prstGeom prst="arc">
+                    <a:avLst>
+                      <a:gd name="adj1" fmla="val 13567190"/>
+                      <a:gd name="adj2" fmla="val 0"/>
+                    </a:avLst>
+                  </a:prstGeom>
+                  <a:ln w="9525">
+                    <a:solidFill>
+                      <a:schemeClr val="tx1"/>
+                    </a:solidFill>
+                  </a:ln>
+                </p:spPr>
+                <p:style>
+                  <a:lnRef idx="1">
+                    <a:schemeClr val="accent1"/>
+                  </a:lnRef>
+                  <a:fillRef idx="0">
+                    <a:schemeClr val="accent1"/>
+                  </a:fillRef>
+                  <a:effectRef idx="0">
+                    <a:schemeClr val="accent1"/>
+                  </a:effectRef>
+                  <a:fontRef idx="minor">
+                    <a:schemeClr val="tx1"/>
+                  </a:fontRef>
+                </p:style>
+                <p:txBody>
+                  <a:bodyPr rtlCol="0" anchor="ctr"/>
+                  <a:lstStyle/>
+                  <a:p>
+                    <a:pPr algn="ctr"/>
+                    <a:endParaRPr lang="en-AU"/>
+                  </a:p>
+                </p:txBody>
+              </p:sp>
+              <p:cxnSp>
+                <p:nvCxnSpPr>
+                  <p:cNvPr id="57" name="Straight Connector 56">
+                    <a:extLst>
+                      <a:ext uri="{FF2B5EF4-FFF2-40B4-BE49-F238E27FC236}">
+                        <a16:creationId xmlns:a16="http://schemas.microsoft.com/office/drawing/2014/main" id="{709C166E-D3D2-4942-8829-0BB9DC0DF0DB}"/>
+                      </a:ext>
+                    </a:extLst>
+                  </p:cNvPr>
+                  <p:cNvCxnSpPr>
+                    <a:cxnSpLocks/>
+                    <a:stCxn id="6" idx="3"/>
+                  </p:cNvCxnSpPr>
+                  <p:nvPr/>
+                </p:nvCxnSpPr>
+                <p:spPr>
+                  <a:xfrm flipV="1">
+                    <a:off x="3934979" y="2451011"/>
+                    <a:ext cx="379981" cy="395172"/>
+                  </a:xfrm>
+                  <a:prstGeom prst="line">
+                    <a:avLst/>
+                  </a:prstGeom>
+                  <a:ln w="12700">
+                    <a:solidFill>
+                      <a:schemeClr val="tx1"/>
+                    </a:solidFill>
+                    <a:prstDash val="dash"/>
+                  </a:ln>
+                </p:spPr>
+                <p:style>
+                  <a:lnRef idx="1">
+                    <a:schemeClr val="accent1"/>
+                  </a:lnRef>
+                  <a:fillRef idx="0">
+                    <a:schemeClr val="accent1"/>
+                  </a:fillRef>
+                  <a:effectRef idx="0">
+                    <a:schemeClr val="accent1"/>
+                  </a:effectRef>
+                  <a:fontRef idx="minor">
+                    <a:schemeClr val="tx1"/>
+                  </a:fontRef>
+                </p:style>
+              </p:cxnSp>
+              <p:sp>
+                <p:nvSpPr>
+                  <p:cNvPr id="60" name="Arc 59">
+                    <a:extLst>
+                      <a:ext uri="{FF2B5EF4-FFF2-40B4-BE49-F238E27FC236}">
+                        <a16:creationId xmlns:a16="http://schemas.microsoft.com/office/drawing/2014/main" id="{5FB71D5E-0977-491A-BF92-E642831A50B8}"/>
+                      </a:ext>
+                    </a:extLst>
+                  </p:cNvPr>
+                  <p:cNvSpPr/>
+                  <p:nvPr/>
+                </p:nvSpPr>
+                <p:spPr>
+                  <a:xfrm rot="16200000">
+                    <a:off x="5286560" y="3069028"/>
+                    <a:ext cx="220244" cy="360000"/>
+                  </a:xfrm>
+                  <a:prstGeom prst="arc">
+                    <a:avLst>
+                      <a:gd name="adj1" fmla="val 16933107"/>
+                      <a:gd name="adj2" fmla="val 0"/>
+                    </a:avLst>
+                  </a:prstGeom>
+                  <a:ln w="9525">
+                    <a:solidFill>
+                      <a:schemeClr val="tx1"/>
+                    </a:solidFill>
+                  </a:ln>
+                </p:spPr>
+                <p:style>
+                  <a:lnRef idx="1">
+                    <a:schemeClr val="accent1"/>
+                  </a:lnRef>
+                  <a:fillRef idx="0">
+                    <a:schemeClr val="accent1"/>
+                  </a:fillRef>
+                  <a:effectRef idx="0">
+                    <a:schemeClr val="accent1"/>
+                  </a:effectRef>
+                  <a:fontRef idx="minor">
+                    <a:schemeClr val="tx1"/>
+                  </a:fontRef>
+                </p:style>
+                <p:txBody>
+                  <a:bodyPr rtlCol="0" anchor="ctr"/>
+                  <a:lstStyle/>
+                  <a:p>
+                    <a:pPr algn="ctr"/>
+                    <a:endParaRPr lang="en-AU"/>
+                  </a:p>
+                </p:txBody>
+              </p:sp>
+              <p:sp>
+                <p:nvSpPr>
+                  <p:cNvPr id="61" name="Arc 60">
+                    <a:extLst>
+                      <a:ext uri="{FF2B5EF4-FFF2-40B4-BE49-F238E27FC236}">
+                        <a16:creationId xmlns:a16="http://schemas.microsoft.com/office/drawing/2014/main" id="{3CFD6A9A-6C8E-4151-8C37-9191920EE621}"/>
+                      </a:ext>
+                    </a:extLst>
+                  </p:cNvPr>
+                  <p:cNvSpPr/>
+                  <p:nvPr/>
+                </p:nvSpPr>
+                <p:spPr>
+                  <a:xfrm rot="16200000">
+                    <a:off x="5178502" y="3287776"/>
+                    <a:ext cx="360000" cy="426830"/>
+                  </a:xfrm>
+                  <a:prstGeom prst="arc">
+                    <a:avLst>
+                      <a:gd name="adj1" fmla="val 17446248"/>
+                      <a:gd name="adj2" fmla="val 874469"/>
+                    </a:avLst>
+                  </a:prstGeom>
+                  <a:ln w="9525">
+                    <a:solidFill>
+                      <a:schemeClr val="tx1"/>
+                    </a:solidFill>
+                  </a:ln>
+                </p:spPr>
+                <p:style>
+                  <a:lnRef idx="1">
+                    <a:schemeClr val="accent1"/>
+                  </a:lnRef>
+                  <a:fillRef idx="0">
+                    <a:schemeClr val="accent1"/>
+                  </a:fillRef>
+                  <a:effectRef idx="0">
+                    <a:schemeClr val="accent1"/>
+                  </a:effectRef>
+                  <a:fontRef idx="minor">
+                    <a:schemeClr val="tx1"/>
+                  </a:fontRef>
+                </p:style>
+                <p:txBody>
+                  <a:bodyPr rtlCol="0" anchor="ctr"/>
+                  <a:lstStyle/>
+                  <a:p>
+                    <a:pPr algn="ctr"/>
+                    <a:endParaRPr lang="en-AU"/>
+                  </a:p>
+                </p:txBody>
+              </p:sp>
+              <p:sp>
+                <p:nvSpPr>
+                  <p:cNvPr id="62" name="Arc 61">
+                    <a:extLst>
+                      <a:ext uri="{FF2B5EF4-FFF2-40B4-BE49-F238E27FC236}">
+                        <a16:creationId xmlns:a16="http://schemas.microsoft.com/office/drawing/2014/main" id="{25D23409-F4ED-45A8-9469-8167BF67D435}"/>
+                      </a:ext>
+                    </a:extLst>
+                  </p:cNvPr>
+                  <p:cNvSpPr/>
+                  <p:nvPr/>
+                </p:nvSpPr>
+                <p:spPr>
+                  <a:xfrm rot="16200000">
+                    <a:off x="5178501" y="2999079"/>
+                    <a:ext cx="360002" cy="639653"/>
+                  </a:xfrm>
+                  <a:prstGeom prst="arc">
+                    <a:avLst>
+                      <a:gd name="adj1" fmla="val 16568432"/>
+                      <a:gd name="adj2" fmla="val 18942459"/>
+                    </a:avLst>
+                  </a:prstGeom>
+                  <a:ln w="9525">
+                    <a:solidFill>
+                      <a:schemeClr val="tx1"/>
+                    </a:solidFill>
+                  </a:ln>
+                </p:spPr>
+                <p:style>
+                  <a:lnRef idx="1">
+                    <a:schemeClr val="accent1"/>
+                  </a:lnRef>
+                  <a:fillRef idx="0">
+                    <a:schemeClr val="accent1"/>
+                  </a:fillRef>
+                  <a:effectRef idx="0">
+                    <a:schemeClr val="accent1"/>
+                  </a:effectRef>
+                  <a:fontRef idx="minor">
+                    <a:schemeClr val="tx1"/>
+                  </a:fontRef>
+                </p:style>
+                <p:txBody>
+                  <a:bodyPr rtlCol="0" anchor="ctr"/>
+                  <a:lstStyle/>
+                  <a:p>
+                    <a:pPr algn="ctr"/>
+                    <a:endParaRPr lang="en-AU"/>
+                  </a:p>
+                </p:txBody>
+              </p:sp>
+              <mc:AlternateContent xmlns:mc="http://schemas.openxmlformats.org/markup-compatibility/2006" xmlns:a14="http://schemas.microsoft.com/office/drawing/2010/main">
+                <mc:Choice Requires="a14">
+                  <p:sp>
+                    <p:nvSpPr>
+                      <p:cNvPr id="63" name="TextBox 62">
+                        <a:extLst>
+                          <a:ext uri="{FF2B5EF4-FFF2-40B4-BE49-F238E27FC236}">
+                            <a16:creationId xmlns:a16="http://schemas.microsoft.com/office/drawing/2014/main" id="{2FE38C87-8474-4333-81E2-0464DB00274B}"/>
+                          </a:ext>
+                        </a:extLst>
+                      </p:cNvPr>
+                      <p:cNvSpPr txBox="1"/>
+                      <p:nvPr/>
+                    </p:nvSpPr>
+                    <p:spPr>
+                      <a:xfrm>
+                        <a:off x="5956366" y="3601764"/>
+                        <a:ext cx="346377" cy="338554"/>
+                      </a:xfrm>
+                      <a:prstGeom prst="rect">
+                        <a:avLst/>
+                      </a:prstGeom>
+                      <a:noFill/>
+                    </p:spPr>
+                    <p:txBody>
+                      <a:bodyPr wrap="none" rtlCol="0">
+                        <a:spAutoFit/>
+                      </a:bodyPr>
+                      <a:lstStyle/>
+                      <a:p>
+                        <a:pPr/>
+                        <a14:m>
+                          <m:oMathPara xmlns:m="http://schemas.openxmlformats.org/officeDocument/2006/math">
+                            <m:oMathParaPr>
+                              <m:jc m:val="centerGroup"/>
+                            </m:oMathParaPr>
+                            <m:oMath xmlns:m="http://schemas.openxmlformats.org/officeDocument/2006/math">
+                              <m:r>
+                                <a:rPr lang="en-AU" sz="1600" b="0" i="1" smtClean="0">
+                                  <a:latin typeface="Cambria Math" panose="02040503050406030204" pitchFamily="18" charset="0"/>
+                                </a:rPr>
+                                <m:t>𝑥</m:t>
+                              </m:r>
+                            </m:oMath>
+                          </m:oMathPara>
+                        </a14:m>
+                        <a:endParaRPr lang="en-AU" dirty="0"/>
+                      </a:p>
+                    </p:txBody>
+                  </p:sp>
+                </mc:Choice>
+                <mc:Fallback xmlns="">
+                  <p:sp>
+                    <p:nvSpPr>
+                      <p:cNvPr id="63" name="TextBox 62">
+                        <a:extLst>
+                          <a:ext uri="{FF2B5EF4-FFF2-40B4-BE49-F238E27FC236}">
+                            <a16:creationId xmlns:a16="http://schemas.microsoft.com/office/drawing/2014/main" id="{2FE38C87-8474-4333-81E2-0464DB00274B}"/>
+                          </a:ext>
+                        </a:extLst>
+                      </p:cNvPr>
+                      <p:cNvSpPr txBox="1">
+                        <a:spLocks noRot="1" noChangeAspect="1" noMove="1" noResize="1" noEditPoints="1" noAdjustHandles="1" noChangeArrowheads="1" noChangeShapeType="1" noTextEdit="1"/>
+                      </p:cNvSpPr>
+                      <p:nvPr/>
+                    </p:nvSpPr>
+                    <p:spPr>
+                      <a:xfrm>
+                        <a:off x="5956366" y="3601764"/>
+                        <a:ext cx="346377" cy="338554"/>
+                      </a:xfrm>
+                      <a:prstGeom prst="rect">
+                        <a:avLst/>
+                      </a:prstGeom>
+                      <a:blipFill>
+                        <a:blip r:embed="rId2"/>
+                        <a:stretch>
+                          <a:fillRect/>
+                        </a:stretch>
+                      </a:blipFill>
+                    </p:spPr>
+                    <p:txBody>
+                      <a:bodyPr/>
+                      <a:lstStyle/>
+                      <a:p>
+                        <a:r>
+                          <a:rPr lang="en-AU">
+                            <a:noFill/>
+                          </a:rPr>
+                          <a:t> </a:t>
+                        </a:r>
+                      </a:p>
+                    </p:txBody>
+                  </p:sp>
+                </mc:Fallback>
+              </mc:AlternateContent>
+              <mc:AlternateContent xmlns:mc="http://schemas.openxmlformats.org/markup-compatibility/2006" xmlns:a14="http://schemas.microsoft.com/office/drawing/2010/main">
+                <mc:Choice Requires="a14">
+                  <p:sp>
+                    <p:nvSpPr>
+                      <p:cNvPr id="64" name="TextBox 63">
+                        <a:extLst>
+                          <a:ext uri="{FF2B5EF4-FFF2-40B4-BE49-F238E27FC236}">
+                            <a16:creationId xmlns:a16="http://schemas.microsoft.com/office/drawing/2014/main" id="{EA195DC6-89F2-49A4-A4FE-7B322F18B49D}"/>
+                          </a:ext>
+                        </a:extLst>
+                      </p:cNvPr>
+                      <p:cNvSpPr txBox="1"/>
+                      <p:nvPr/>
+                    </p:nvSpPr>
+                    <p:spPr>
+                      <a:xfrm>
+                        <a:off x="5345258" y="2708146"/>
+                        <a:ext cx="350096" cy="338554"/>
+                      </a:xfrm>
+                      <a:prstGeom prst="rect">
+                        <a:avLst/>
+                      </a:prstGeom>
+                      <a:noFill/>
+                    </p:spPr>
+                    <p:txBody>
+                      <a:bodyPr wrap="none" rtlCol="0">
+                        <a:spAutoFit/>
+                      </a:bodyPr>
+                      <a:lstStyle/>
+                      <a:p>
+                        <a:pPr/>
+                        <a14:m>
+                          <m:oMathPara xmlns:m="http://schemas.openxmlformats.org/officeDocument/2006/math">
+                            <m:oMathParaPr>
+                              <m:jc m:val="centerGroup"/>
+                            </m:oMathParaPr>
+                            <m:oMath xmlns:m="http://schemas.openxmlformats.org/officeDocument/2006/math">
+                              <m:r>
+                                <a:rPr lang="en-AU" sz="1600" b="0" i="1" smtClean="0">
+                                  <a:latin typeface="Cambria Math" panose="02040503050406030204" pitchFamily="18" charset="0"/>
+                                </a:rPr>
+                                <m:t>𝑦</m:t>
+                              </m:r>
+                            </m:oMath>
+                          </m:oMathPara>
+                        </a14:m>
+                        <a:endParaRPr lang="en-AU" dirty="0"/>
+                      </a:p>
+                    </p:txBody>
+                  </p:sp>
+                </mc:Choice>
+                <mc:Fallback xmlns="">
+                  <p:sp>
+                    <p:nvSpPr>
+                      <p:cNvPr id="64" name="TextBox 63">
+                        <a:extLst>
+                          <a:ext uri="{FF2B5EF4-FFF2-40B4-BE49-F238E27FC236}">
+                            <a16:creationId xmlns:a16="http://schemas.microsoft.com/office/drawing/2014/main" id="{EA195DC6-89F2-49A4-A4FE-7B322F18B49D}"/>
+                          </a:ext>
+                        </a:extLst>
+                      </p:cNvPr>
+                      <p:cNvSpPr txBox="1">
+                        <a:spLocks noRot="1" noChangeAspect="1" noMove="1" noResize="1" noEditPoints="1" noAdjustHandles="1" noChangeArrowheads="1" noChangeShapeType="1" noTextEdit="1"/>
+                      </p:cNvSpPr>
+                      <p:nvPr/>
+                    </p:nvSpPr>
+                    <p:spPr>
+                      <a:xfrm>
+                        <a:off x="5345258" y="2708146"/>
+                        <a:ext cx="350096" cy="338554"/>
+                      </a:xfrm>
+                      <a:prstGeom prst="rect">
+                        <a:avLst/>
+                      </a:prstGeom>
+                      <a:blipFill>
+                        <a:blip r:embed="rId3"/>
+                        <a:stretch>
+                          <a:fillRect b="-3571"/>
+                        </a:stretch>
+                      </a:blipFill>
+                    </p:spPr>
+                    <p:txBody>
+                      <a:bodyPr/>
+                      <a:lstStyle/>
+                      <a:p>
+                        <a:r>
+                          <a:rPr lang="en-AU">
+                            <a:noFill/>
+                          </a:rPr>
+                          <a:t> </a:t>
+                        </a:r>
+                      </a:p>
+                    </p:txBody>
+                  </p:sp>
+                </mc:Fallback>
+              </mc:AlternateContent>
+              <mc:AlternateContent xmlns:mc="http://schemas.openxmlformats.org/markup-compatibility/2006">
+                <mc:Choice xmlns:a14="http://schemas.microsoft.com/office/drawing/2010/main" Requires="a14">
+                  <p:sp>
+                    <p:nvSpPr>
+                      <p:cNvPr id="66" name="TextBox 65">
+                        <a:extLst>
+                          <a:ext uri="{FF2B5EF4-FFF2-40B4-BE49-F238E27FC236}">
+                            <a16:creationId xmlns:a16="http://schemas.microsoft.com/office/drawing/2014/main" id="{5BE0F2DE-DFC6-4419-BF4C-393642AF27F6}"/>
+                          </a:ext>
+                        </a:extLst>
+                      </p:cNvPr>
+                      <p:cNvSpPr txBox="1"/>
+                      <p:nvPr/>
+                    </p:nvSpPr>
+                    <p:spPr>
+                      <a:xfrm>
+                        <a:off x="4864756" y="3286288"/>
+                        <a:ext cx="389450" cy="307777"/>
+                      </a:xfrm>
+                      <a:prstGeom prst="rect">
+                        <a:avLst/>
+                      </a:prstGeom>
+                      <a:noFill/>
+                    </p:spPr>
+                    <p:txBody>
+                      <a:bodyPr wrap="square" rtlCol="0">
+                        <a:spAutoFit/>
+                      </a:bodyPr>
+                      <a:lstStyle/>
+                      <a:p>
+                        <a:pPr/>
+                        <a14:m>
+                          <m:oMathPara xmlns:m="http://schemas.openxmlformats.org/officeDocument/2006/math">
+                            <m:oMathParaPr>
+                              <m:jc m:val="centerGroup"/>
+                            </m:oMathParaPr>
+                            <m:oMath xmlns:m="http://schemas.openxmlformats.org/officeDocument/2006/math">
+                              <m:r>
+                                <a:rPr lang="en-AU" sz="1400" b="0" i="1" smtClean="0">
+                                  <a:latin typeface="Cambria Math" panose="02040503050406030204" pitchFamily="18" charset="0"/>
+                                </a:rPr>
+                                <m:t>𝜙</m:t>
+                              </m:r>
+                            </m:oMath>
+                          </m:oMathPara>
+                        </a14:m>
+                        <a:endParaRPr lang="en-AU" dirty="0"/>
+                      </a:p>
+                    </p:txBody>
+                  </p:sp>
+                </mc:Choice>
+                <mc:Fallback>
+                  <p:sp>
+                    <p:nvSpPr>
+                      <p:cNvPr id="66" name="TextBox 65">
+                        <a:extLst>
+                          <a:ext uri="{FF2B5EF4-FFF2-40B4-BE49-F238E27FC236}">
+                            <a16:creationId xmlns:a16="http://schemas.microsoft.com/office/drawing/2014/main" id="{5BE0F2DE-DFC6-4419-BF4C-393642AF27F6}"/>
+                          </a:ext>
+                        </a:extLst>
+                      </p:cNvPr>
+                      <p:cNvSpPr txBox="1">
+                        <a:spLocks noRot="1" noChangeAspect="1" noMove="1" noResize="1" noEditPoints="1" noAdjustHandles="1" noChangeArrowheads="1" noChangeShapeType="1" noTextEdit="1"/>
+                      </p:cNvSpPr>
+                      <p:nvPr/>
+                    </p:nvSpPr>
+                    <p:spPr>
+                      <a:xfrm>
+                        <a:off x="4864756" y="3286288"/>
+                        <a:ext cx="389450" cy="307777"/>
+                      </a:xfrm>
+                      <a:prstGeom prst="rect">
+                        <a:avLst/>
+                      </a:prstGeom>
+                      <a:blipFill>
+                        <a:blip r:embed="rId4"/>
+                        <a:stretch>
+                          <a:fillRect b="-5882"/>
+                        </a:stretch>
+                      </a:blipFill>
+                    </p:spPr>
+                    <p:txBody>
+                      <a:bodyPr/>
+                      <a:lstStyle/>
+                      <a:p>
+                        <a:r>
+                          <a:rPr lang="en-AU">
+                            <a:noFill/>
+                          </a:rPr>
+                          <a:t> </a:t>
+                        </a:r>
+                      </a:p>
+                    </p:txBody>
+                  </p:sp>
+                </mc:Fallback>
+              </mc:AlternateContent>
+              <mc:AlternateContent xmlns:mc="http://schemas.openxmlformats.org/markup-compatibility/2006" xmlns:a14="http://schemas.microsoft.com/office/drawing/2010/main">
+                <mc:Choice Requires="a14">
+                  <p:sp>
+                    <p:nvSpPr>
+                      <p:cNvPr id="67" name="TextBox 66">
+                        <a:extLst>
+                          <a:ext uri="{FF2B5EF4-FFF2-40B4-BE49-F238E27FC236}">
+                            <a16:creationId xmlns:a16="http://schemas.microsoft.com/office/drawing/2014/main" id="{70EF0D0B-FAC3-4F4B-87EF-326D4B48B4FA}"/>
+                          </a:ext>
+                        </a:extLst>
+                      </p:cNvPr>
+                      <p:cNvSpPr txBox="1"/>
+                      <p:nvPr/>
+                    </p:nvSpPr>
+                    <p:spPr>
+                      <a:xfrm>
+                        <a:off x="4881912" y="2977681"/>
+                        <a:ext cx="389450" cy="307777"/>
+                      </a:xfrm>
+                      <a:prstGeom prst="rect">
+                        <a:avLst/>
+                      </a:prstGeom>
+                      <a:noFill/>
+                    </p:spPr>
+                    <p:txBody>
+                      <a:bodyPr wrap="square" rtlCol="0">
+                        <a:spAutoFit/>
+                      </a:bodyPr>
+                      <a:lstStyle/>
+                      <a:p>
+                        <a:pPr/>
+                        <a14:m>
+                          <m:oMathPara xmlns:m="http://schemas.openxmlformats.org/officeDocument/2006/math">
+                            <m:oMathParaPr>
+                              <m:jc m:val="centerGroup"/>
+                            </m:oMathParaPr>
+                            <m:oMath xmlns:m="http://schemas.openxmlformats.org/officeDocument/2006/math">
+                              <m:r>
+                                <a:rPr lang="en-AU" sz="1400" b="0" i="1" smtClean="0">
+                                  <a:latin typeface="Cambria Math" panose="02040503050406030204" pitchFamily="18" charset="0"/>
+                                </a:rPr>
+                                <m:t>𝛾</m:t>
+                              </m:r>
+                            </m:oMath>
+                          </m:oMathPara>
+                        </a14:m>
+                        <a:endParaRPr lang="en-AU" dirty="0"/>
+                      </a:p>
+                    </p:txBody>
+                  </p:sp>
+                </mc:Choice>
+                <mc:Fallback xmlns="">
+                  <p:sp>
+                    <p:nvSpPr>
+                      <p:cNvPr id="67" name="TextBox 66">
+                        <a:extLst>
+                          <a:ext uri="{FF2B5EF4-FFF2-40B4-BE49-F238E27FC236}">
+                            <a16:creationId xmlns:a16="http://schemas.microsoft.com/office/drawing/2014/main" id="{70EF0D0B-FAC3-4F4B-87EF-326D4B48B4FA}"/>
+                          </a:ext>
+                        </a:extLst>
+                      </p:cNvPr>
+                      <p:cNvSpPr txBox="1">
+                        <a:spLocks noRot="1" noChangeAspect="1" noMove="1" noResize="1" noEditPoints="1" noAdjustHandles="1" noChangeArrowheads="1" noChangeShapeType="1" noTextEdit="1"/>
+                      </p:cNvSpPr>
+                      <p:nvPr/>
+                    </p:nvSpPr>
+                    <p:spPr>
+                      <a:xfrm>
+                        <a:off x="4881912" y="2977681"/>
+                        <a:ext cx="389450" cy="307777"/>
+                      </a:xfrm>
+                      <a:prstGeom prst="rect">
+                        <a:avLst/>
+                      </a:prstGeom>
+                      <a:blipFill>
+                        <a:blip r:embed="rId5"/>
+                        <a:stretch>
+                          <a:fillRect/>
+                        </a:stretch>
+                      </a:blipFill>
+                    </p:spPr>
+                    <p:txBody>
+                      <a:bodyPr/>
+                      <a:lstStyle/>
+                      <a:p>
+                        <a:r>
+                          <a:rPr lang="en-AU">
+                            <a:noFill/>
+                          </a:rPr>
+                          <a:t> </a:t>
+                        </a:r>
+                      </a:p>
+                    </p:txBody>
+                  </p:sp>
+                </mc:Fallback>
+              </mc:AlternateContent>
+              <mc:AlternateContent xmlns:mc="http://schemas.openxmlformats.org/markup-compatibility/2006" xmlns:a14="http://schemas.microsoft.com/office/drawing/2010/main">
+                <mc:Choice Requires="a14">
+                  <p:sp>
+                    <p:nvSpPr>
+                      <p:cNvPr id="68" name="TextBox 67">
+                        <a:extLst>
+                          <a:ext uri="{FF2B5EF4-FFF2-40B4-BE49-F238E27FC236}">
+                            <a16:creationId xmlns:a16="http://schemas.microsoft.com/office/drawing/2014/main" id="{4E263CEE-EC74-43BD-A9D6-1EA2165CFB3C}"/>
+                          </a:ext>
+                        </a:extLst>
+                      </p:cNvPr>
+                      <p:cNvSpPr txBox="1"/>
+                      <p:nvPr/>
+                    </p:nvSpPr>
+                    <p:spPr>
+                      <a:xfrm>
+                        <a:off x="5097165" y="2916255"/>
+                        <a:ext cx="389450" cy="307777"/>
+                      </a:xfrm>
+                      <a:prstGeom prst="rect">
+                        <a:avLst/>
+                      </a:prstGeom>
+                      <a:noFill/>
+                    </p:spPr>
+                    <p:txBody>
+                      <a:bodyPr wrap="square" rtlCol="0">
+                        <a:spAutoFit/>
+                      </a:bodyPr>
+                      <a:lstStyle/>
+                      <a:p>
+                        <a:pPr/>
+                        <a14:m>
+                          <m:oMathPara xmlns:m="http://schemas.openxmlformats.org/officeDocument/2006/math">
+                            <m:oMathParaPr>
+                              <m:jc m:val="centerGroup"/>
+                            </m:oMathParaPr>
+                            <m:oMath xmlns:m="http://schemas.openxmlformats.org/officeDocument/2006/math">
+                              <m:r>
+                                <a:rPr lang="en-AU" sz="1400" b="0" i="1" smtClean="0">
+                                  <a:latin typeface="Cambria Math" panose="02040503050406030204" pitchFamily="18" charset="0"/>
+                                </a:rPr>
+                                <m:t>𝜃</m:t>
+                              </m:r>
+                            </m:oMath>
+                          </m:oMathPara>
+                        </a14:m>
+                        <a:endParaRPr lang="en-AU" dirty="0"/>
+                      </a:p>
+                    </p:txBody>
+                  </p:sp>
+                </mc:Choice>
+                <mc:Fallback xmlns="">
+                  <p:sp>
+                    <p:nvSpPr>
+                      <p:cNvPr id="68" name="TextBox 67">
+                        <a:extLst>
+                          <a:ext uri="{FF2B5EF4-FFF2-40B4-BE49-F238E27FC236}">
+                            <a16:creationId xmlns:a16="http://schemas.microsoft.com/office/drawing/2014/main" id="{4E263CEE-EC74-43BD-A9D6-1EA2165CFB3C}"/>
+                          </a:ext>
+                        </a:extLst>
+                      </p:cNvPr>
+                      <p:cNvSpPr txBox="1">
+                        <a:spLocks noRot="1" noChangeAspect="1" noMove="1" noResize="1" noEditPoints="1" noAdjustHandles="1" noChangeArrowheads="1" noChangeShapeType="1" noTextEdit="1"/>
+                      </p:cNvSpPr>
+                      <p:nvPr/>
+                    </p:nvSpPr>
+                    <p:spPr>
+                      <a:xfrm>
+                        <a:off x="5097165" y="2916255"/>
+                        <a:ext cx="389450" cy="307777"/>
+                      </a:xfrm>
+                      <a:prstGeom prst="rect">
+                        <a:avLst/>
+                      </a:prstGeom>
+                      <a:blipFill>
+                        <a:blip r:embed="rId6"/>
+                        <a:stretch>
+                          <a:fillRect/>
+                        </a:stretch>
+                      </a:blipFill>
+                    </p:spPr>
+                    <p:txBody>
+                      <a:bodyPr/>
+                      <a:lstStyle/>
+                      <a:p>
+                        <a:r>
+                          <a:rPr lang="en-AU">
+                            <a:noFill/>
+                          </a:rPr>
+                          <a:t> </a:t>
+                        </a:r>
+                      </a:p>
+                    </p:txBody>
+                  </p:sp>
+                </mc:Fallback>
+              </mc:AlternateContent>
+              <mc:AlternateContent xmlns:mc="http://schemas.openxmlformats.org/markup-compatibility/2006" xmlns:a14="http://schemas.microsoft.com/office/drawing/2010/main">
+                <mc:Choice Requires="a14">
+                  <p:sp>
+                    <p:nvSpPr>
+                      <p:cNvPr id="69" name="TextBox 68">
+                        <a:extLst>
+                          <a:ext uri="{FF2B5EF4-FFF2-40B4-BE49-F238E27FC236}">
+                            <a16:creationId xmlns:a16="http://schemas.microsoft.com/office/drawing/2014/main" id="{899A26F7-590C-40B3-A04B-4EC2CD070BE6}"/>
+                          </a:ext>
+                        </a:extLst>
+                      </p:cNvPr>
+                      <p:cNvSpPr txBox="1"/>
+                      <p:nvPr/>
+                    </p:nvSpPr>
+                    <p:spPr>
+                      <a:xfrm>
+                        <a:off x="3864506" y="2196033"/>
+                        <a:ext cx="389450" cy="307777"/>
+                      </a:xfrm>
+                      <a:prstGeom prst="rect">
+                        <a:avLst/>
+                      </a:prstGeom>
+                      <a:noFill/>
+                    </p:spPr>
+                    <p:txBody>
+                      <a:bodyPr wrap="square" rtlCol="0">
+                        <a:spAutoFit/>
+                      </a:bodyPr>
+                      <a:lstStyle/>
+                      <a:p>
+                        <a:pPr/>
+                        <a14:m>
+                          <m:oMathPara xmlns:m="http://schemas.openxmlformats.org/officeDocument/2006/math">
+                            <m:oMathParaPr>
+                              <m:jc m:val="centerGroup"/>
+                            </m:oMathParaPr>
+                            <m:oMath xmlns:m="http://schemas.openxmlformats.org/officeDocument/2006/math">
+                              <m:r>
+                                <a:rPr lang="en-AU" sz="1400" b="0" i="1" smtClean="0">
+                                  <a:latin typeface="Cambria Math" panose="02040503050406030204" pitchFamily="18" charset="0"/>
+                                </a:rPr>
+                                <m:t>𝛼</m:t>
+                              </m:r>
+                            </m:oMath>
+                          </m:oMathPara>
+                        </a14:m>
+                        <a:endParaRPr lang="en-AU" dirty="0"/>
+                      </a:p>
+                    </p:txBody>
+                  </p:sp>
+                </mc:Choice>
+                <mc:Fallback xmlns="">
+                  <p:sp>
+                    <p:nvSpPr>
+                      <p:cNvPr id="69" name="TextBox 68">
+                        <a:extLst>
+                          <a:ext uri="{FF2B5EF4-FFF2-40B4-BE49-F238E27FC236}">
+                            <a16:creationId xmlns:a16="http://schemas.microsoft.com/office/drawing/2014/main" id="{899A26F7-590C-40B3-A04B-4EC2CD070BE6}"/>
+                          </a:ext>
+                        </a:extLst>
+                      </p:cNvPr>
+                      <p:cNvSpPr txBox="1">
+                        <a:spLocks noRot="1" noChangeAspect="1" noMove="1" noResize="1" noEditPoints="1" noAdjustHandles="1" noChangeArrowheads="1" noChangeShapeType="1" noTextEdit="1"/>
+                      </p:cNvSpPr>
+                      <p:nvPr/>
+                    </p:nvSpPr>
+                    <p:spPr>
+                      <a:xfrm>
+                        <a:off x="3864506" y="2196033"/>
+                        <a:ext cx="389450" cy="307777"/>
+                      </a:xfrm>
+                      <a:prstGeom prst="rect">
+                        <a:avLst/>
+                      </a:prstGeom>
+                      <a:blipFill>
+                        <a:blip r:embed="rId7"/>
+                        <a:stretch>
+                          <a:fillRect/>
+                        </a:stretch>
+                      </a:blipFill>
+                    </p:spPr>
+                    <p:txBody>
+                      <a:bodyPr/>
+                      <a:lstStyle/>
+                      <a:p>
+                        <a:r>
+                          <a:rPr lang="en-AU">
+                            <a:noFill/>
+                          </a:rPr>
+                          <a:t> </a:t>
+                        </a:r>
+                      </a:p>
+                    </p:txBody>
+                  </p:sp>
+                </mc:Fallback>
+              </mc:AlternateContent>
+              <mc:AlternateContent xmlns:mc="http://schemas.openxmlformats.org/markup-compatibility/2006">
+                <mc:Choice xmlns:a14="http://schemas.microsoft.com/office/drawing/2010/main" Requires="a14">
+                  <p:sp>
+                    <p:nvSpPr>
+                      <p:cNvPr id="73" name="TextBox 72">
+                        <a:extLst>
+                          <a:ext uri="{FF2B5EF4-FFF2-40B4-BE49-F238E27FC236}">
+                            <a16:creationId xmlns:a16="http://schemas.microsoft.com/office/drawing/2014/main" id="{08C3AB82-6923-422E-A16D-119E9B063574}"/>
+                          </a:ext>
+                        </a:extLst>
+                      </p:cNvPr>
+                      <p:cNvSpPr txBox="1"/>
+                      <p:nvPr/>
+                    </p:nvSpPr>
+                    <p:spPr>
+                      <a:xfrm>
+                        <a:off x="5281063" y="3632414"/>
+                        <a:ext cx="385875" cy="369332"/>
+                      </a:xfrm>
+                      <a:prstGeom prst="rect">
+                        <a:avLst/>
+                      </a:prstGeom>
+                      <a:noFill/>
+                    </p:spPr>
+                    <p:txBody>
+                      <a:bodyPr wrap="none" rtlCol="0">
+                        <a:spAutoFit/>
+                      </a:bodyPr>
+                      <a:lstStyle/>
+                      <a:p>
+                        <a:pPr/>
+                        <a14:m>
+                          <m:oMathPara xmlns:m="http://schemas.openxmlformats.org/officeDocument/2006/math">
+                            <m:oMathParaPr>
+                              <m:jc m:val="centerGroup"/>
+                            </m:oMathParaPr>
+                            <m:oMath xmlns:m="http://schemas.openxmlformats.org/officeDocument/2006/math">
+                              <m:r>
+                                <a:rPr lang="en-AU" b="0" i="1" smtClean="0">
+                                  <a:latin typeface="Cambria Math" panose="02040503050406030204" pitchFamily="18" charset="0"/>
+                                </a:rPr>
+                                <m:t>𝑃</m:t>
+                              </m:r>
+                            </m:oMath>
+                          </m:oMathPara>
+                        </a14:m>
+                        <a:endParaRPr lang="en-AU" dirty="0"/>
+                      </a:p>
+                    </p:txBody>
+                  </p:sp>
+                </mc:Choice>
+                <mc:Fallback>
+                  <p:sp>
+                    <p:nvSpPr>
+                      <p:cNvPr id="73" name="TextBox 72">
+                        <a:extLst>
+                          <a:ext uri="{FF2B5EF4-FFF2-40B4-BE49-F238E27FC236}">
+                            <a16:creationId xmlns:a16="http://schemas.microsoft.com/office/drawing/2014/main" id="{08C3AB82-6923-422E-A16D-119E9B063574}"/>
+                          </a:ext>
+                        </a:extLst>
+                      </p:cNvPr>
+                      <p:cNvSpPr txBox="1">
+                        <a:spLocks noRot="1" noChangeAspect="1" noMove="1" noResize="1" noEditPoints="1" noAdjustHandles="1" noChangeArrowheads="1" noChangeShapeType="1" noTextEdit="1"/>
+                      </p:cNvSpPr>
+                      <p:nvPr/>
+                    </p:nvSpPr>
+                    <p:spPr>
+                      <a:xfrm>
+                        <a:off x="5281063" y="3632414"/>
+                        <a:ext cx="385875" cy="369332"/>
+                      </a:xfrm>
+                      <a:prstGeom prst="rect">
+                        <a:avLst/>
+                      </a:prstGeom>
+                      <a:blipFill>
+                        <a:blip r:embed="rId8"/>
+                        <a:stretch>
+                          <a:fillRect/>
+                        </a:stretch>
+                      </a:blipFill>
+                    </p:spPr>
+                    <p:txBody>
+                      <a:bodyPr/>
+                      <a:lstStyle/>
+                      <a:p>
+                        <a:r>
+                          <a:rPr lang="en-AU">
+                            <a:noFill/>
+                          </a:rPr>
+                          <a:t> </a:t>
+                        </a:r>
+                      </a:p>
+                    </p:txBody>
+                  </p:sp>
+                </mc:Fallback>
+              </mc:AlternateContent>
+            </p:grpSp>
+            <p:cxnSp>
+              <p:nvCxnSpPr>
+                <p:cNvPr id="75" name="Straight Arrow Connector 74">
                   <a:extLst>
                     <a:ext uri="{FF2B5EF4-FFF2-40B4-BE49-F238E27FC236}">
-                      <a16:creationId xmlns:a16="http://schemas.microsoft.com/office/drawing/2014/main" id="{4B86FA2E-8825-4DB5-A12B-168614AF73EA}"/>
-                    </a:ext>
-                  </a:extLst>
-                </p:cNvPr>
-                <p:cNvSpPr/>
-                <p:nvPr/>
-              </p:nvSpPr>
-              <p:spPr>
-                <a:xfrm>
-                  <a:off x="3776817" y="1924345"/>
-                  <a:ext cx="1080000" cy="1080000"/>
-                </a:xfrm>
-                <a:prstGeom prst="ellipse">
-                  <a:avLst/>
-                </a:prstGeom>
-                <a:noFill/>
-                <a:ln w="28575">
-                  <a:solidFill>
-                    <a:schemeClr val="tx1"/>
-                  </a:solidFill>
-                </a:ln>
-              </p:spPr>
-              <p:style>
-                <a:lnRef idx="2">
-                  <a:schemeClr val="accent1">
-                    <a:shade val="50000"/>
-                  </a:schemeClr>
-                </a:lnRef>
-                <a:fillRef idx="1">
-                  <a:schemeClr val="accent1"/>
-                </a:fillRef>
-                <a:effectRef idx="0">
-                  <a:schemeClr val="accent1"/>
-                </a:effectRef>
-                <a:fontRef idx="minor">
-                  <a:schemeClr val="lt1"/>
-                </a:fontRef>
-              </p:style>
-              <p:txBody>
-                <a:bodyPr rtlCol="0" anchor="ctr"/>
-                <a:lstStyle/>
-                <a:p>
-                  <a:pPr algn="ctr"/>
-                  <a:endParaRPr lang="en-AU"/>
-                </a:p>
-              </p:txBody>
-            </p:sp>
-            <p:cxnSp>
-              <p:nvCxnSpPr>
-                <p:cNvPr id="10" name="Straight Connector 9">
-                  <a:extLst>
-                    <a:ext uri="{FF2B5EF4-FFF2-40B4-BE49-F238E27FC236}">
-                      <a16:creationId xmlns:a16="http://schemas.microsoft.com/office/drawing/2014/main" id="{293CE433-AFE5-40EA-8087-4D1ABFA1ED09}"/>
+                      <a16:creationId xmlns:a16="http://schemas.microsoft.com/office/drawing/2014/main" id="{CD585D47-3109-4F77-A2D6-3ADAE84E4398}"/>
                     </a:ext>
                   </a:extLst>
                 </p:cNvPr>
                 <p:cNvCxnSpPr>
                   <a:cxnSpLocks/>
-                </p:cNvCxnSpPr>
-                <p:nvPr/>
-              </p:nvCxnSpPr>
-              <p:spPr>
-                <a:xfrm>
-                  <a:off x="5396817" y="2184400"/>
-                  <a:ext cx="0" cy="1496600"/>
-                </a:xfrm>
-                <a:prstGeom prst="line">
-                  <a:avLst/>
-                </a:prstGeom>
-                <a:ln w="12700">
-                  <a:solidFill>
-                    <a:schemeClr val="tx1"/>
-                  </a:solidFill>
-                  <a:prstDash val="dash"/>
-                </a:ln>
-              </p:spPr>
-              <p:style>
-                <a:lnRef idx="1">
-                  <a:schemeClr val="accent1"/>
-                </a:lnRef>
-                <a:fillRef idx="0">
-                  <a:schemeClr val="accent1"/>
-                </a:fillRef>
-                <a:effectRef idx="0">
-                  <a:schemeClr val="accent1"/>
-                </a:effectRef>
-                <a:fontRef idx="minor">
-                  <a:schemeClr val="tx1"/>
-                </a:fontRef>
-              </p:style>
-            </p:cxnSp>
-            <p:cxnSp>
-              <p:nvCxnSpPr>
-                <p:cNvPr id="14" name="Straight Arrow Connector 13">
-                  <a:extLst>
-                    <a:ext uri="{FF2B5EF4-FFF2-40B4-BE49-F238E27FC236}">
-                      <a16:creationId xmlns:a16="http://schemas.microsoft.com/office/drawing/2014/main" id="{279F4278-1777-4701-B388-6DDE34A30049}"/>
-                    </a:ext>
-                  </a:extLst>
-                </p:cNvPr>
-                <p:cNvCxnSpPr>
-                  <a:cxnSpLocks/>
+                  <a:endCxn id="6" idx="7"/>
                 </p:cNvCxnSpPr>
                 <p:nvPr/>
               </p:nvCxnSpPr>
               <p:spPr>
                 <a:xfrm flipV="1">
-                  <a:off x="5396817" y="2977116"/>
-                  <a:ext cx="0" cy="720000"/>
+                  <a:off x="4316817" y="2082507"/>
+                  <a:ext cx="381838" cy="381838"/>
                 </a:xfrm>
                 <a:prstGeom prst="straightConnector1">
                   <a:avLst/>
                 </a:prstGeom>
-                <a:ln w="19050">
+                <a:ln w="9525">
                   <a:solidFill>
                     <a:schemeClr val="tx1"/>
                   </a:solidFill>
@@ -3600,29 +4855,145 @@
                 </a:fontRef>
               </p:style>
             </p:cxnSp>
+            <mc:AlternateContent xmlns:mc="http://schemas.openxmlformats.org/markup-compatibility/2006" xmlns:a14="http://schemas.microsoft.com/office/drawing/2010/main">
+              <mc:Choice Requires="a14">
+                <p:sp>
+                  <p:nvSpPr>
+                    <p:cNvPr id="76" name="TextBox 75">
+                      <a:extLst>
+                        <a:ext uri="{FF2B5EF4-FFF2-40B4-BE49-F238E27FC236}">
+                          <a16:creationId xmlns:a16="http://schemas.microsoft.com/office/drawing/2014/main" id="{74ED2A7B-C1C6-4ABA-8A3A-CCA339131C8E}"/>
+                        </a:ext>
+                      </a:extLst>
+                    </p:cNvPr>
+                    <p:cNvSpPr txBox="1"/>
+                    <p:nvPr/>
+                  </p:nvSpPr>
+                  <p:spPr>
+                    <a:xfrm>
+                      <a:off x="4353502" y="1945713"/>
+                      <a:ext cx="408530" cy="276999"/>
+                    </a:xfrm>
+                    <a:prstGeom prst="rect">
+                      <a:avLst/>
+                    </a:prstGeom>
+                    <a:noFill/>
+                  </p:spPr>
+                  <p:txBody>
+                    <a:bodyPr wrap="square" rtlCol="0">
+                      <a:spAutoFit/>
+                    </a:bodyPr>
+                    <a:lstStyle/>
+                    <a:p>
+                      <a:pPr/>
+                      <a14:m>
+                        <m:oMathPara xmlns:m="http://schemas.openxmlformats.org/officeDocument/2006/math">
+                          <m:oMathParaPr>
+                            <m:jc m:val="centerGroup"/>
+                          </m:oMathParaPr>
+                          <m:oMath xmlns:m="http://schemas.openxmlformats.org/officeDocument/2006/math">
+                            <m:sSub>
+                              <m:sSubPr>
+                                <m:ctrlPr>
+                                  <a:rPr lang="en-AU" sz="1200" b="0" i="1" smtClean="0">
+                                    <a:latin typeface="Cambria Math" panose="02040503050406030204" pitchFamily="18" charset="0"/>
+                                  </a:rPr>
+                                </m:ctrlPr>
+                              </m:sSubPr>
+                              <m:e>
+                                <m:r>
+                                  <a:rPr lang="en-AU" sz="1200" b="0" i="1" smtClean="0">
+                                    <a:latin typeface="Cambria Math" panose="02040503050406030204" pitchFamily="18" charset="0"/>
+                                  </a:rPr>
+                                  <m:t>𝑟</m:t>
+                                </m:r>
+                              </m:e>
+                              <m:sub>
+                                <m:r>
+                                  <a:rPr lang="en-AU" sz="1200" b="0" i="1" smtClean="0">
+                                    <a:latin typeface="Cambria Math" panose="02040503050406030204" pitchFamily="18" charset="0"/>
+                                  </a:rPr>
+                                  <m:t>𝑜</m:t>
+                                </m:r>
+                              </m:sub>
+                            </m:sSub>
+                          </m:oMath>
+                        </m:oMathPara>
+                      </a14:m>
+                      <a:endParaRPr lang="en-AU" b="0" dirty="0"/>
+                    </a:p>
+                  </p:txBody>
+                </p:sp>
+              </mc:Choice>
+              <mc:Fallback xmlns="">
+                <p:sp>
+                  <p:nvSpPr>
+                    <p:cNvPr id="76" name="TextBox 75">
+                      <a:extLst>
+                        <a:ext uri="{FF2B5EF4-FFF2-40B4-BE49-F238E27FC236}">
+                          <a16:creationId xmlns:a16="http://schemas.microsoft.com/office/drawing/2014/main" id="{74ED2A7B-C1C6-4ABA-8A3A-CCA339131C8E}"/>
+                        </a:ext>
+                      </a:extLst>
+                    </p:cNvPr>
+                    <p:cNvSpPr txBox="1">
+                      <a:spLocks noRot="1" noChangeAspect="1" noMove="1" noResize="1" noEditPoints="1" noAdjustHandles="1" noChangeArrowheads="1" noChangeShapeType="1" noTextEdit="1"/>
+                    </p:cNvSpPr>
+                    <p:nvPr/>
+                  </p:nvSpPr>
+                  <p:spPr>
+                    <a:xfrm>
+                      <a:off x="4353502" y="1945713"/>
+                      <a:ext cx="408530" cy="276999"/>
+                    </a:xfrm>
+                    <a:prstGeom prst="rect">
+                      <a:avLst/>
+                    </a:prstGeom>
+                    <a:blipFill>
+                      <a:blip r:embed="rId9"/>
+                      <a:stretch>
+                        <a:fillRect/>
+                      </a:stretch>
+                    </a:blipFill>
+                  </p:spPr>
+                  <p:txBody>
+                    <a:bodyPr/>
+                    <a:lstStyle/>
+                    <a:p>
+                      <a:r>
+                        <a:rPr lang="en-AU">
+                          <a:noFill/>
+                        </a:rPr>
+                        <a:t> </a:t>
+                      </a:r>
+                    </a:p>
+                  </p:txBody>
+                </p:sp>
+              </mc:Fallback>
+            </mc:AlternateContent>
             <p:cxnSp>
               <p:nvCxnSpPr>
-                <p:cNvPr id="16" name="Straight Arrow Connector 15">
+                <p:cNvPr id="78" name="Straight Arrow Connector 77">
                   <a:extLst>
                     <a:ext uri="{FF2B5EF4-FFF2-40B4-BE49-F238E27FC236}">
-                      <a16:creationId xmlns:a16="http://schemas.microsoft.com/office/drawing/2014/main" id="{BEAB7341-B176-4DC7-A1C7-BBC35AD560AA}"/>
+                      <a16:creationId xmlns:a16="http://schemas.microsoft.com/office/drawing/2014/main" id="{49D6DFE7-D429-4C8B-828E-22C0FE688B6E}"/>
                     </a:ext>
                   </a:extLst>
                 </p:cNvPr>
                 <p:cNvCxnSpPr>
                   <a:cxnSpLocks/>
+                  <a:endCxn id="4" idx="7"/>
                 </p:cNvCxnSpPr>
                 <p:nvPr/>
               </p:nvCxnSpPr>
               <p:spPr>
-                <a:xfrm>
-                  <a:off x="5396817" y="3684976"/>
-                  <a:ext cx="720000" cy="0"/>
+                <a:xfrm flipV="1">
+                  <a:off x="5387620" y="2921301"/>
+                  <a:ext cx="772872" cy="761220"/>
                 </a:xfrm>
                 <a:prstGeom prst="straightConnector1">
                   <a:avLst/>
                 </a:prstGeom>
-                <a:ln w="19050">
+                <a:ln w="9525">
                   <a:solidFill>
                     <a:schemeClr val="tx1"/>
                   </a:solidFill>
@@ -3644,487 +5015,14 @@
                 </a:fontRef>
               </p:style>
             </p:cxnSp>
-            <p:cxnSp>
-              <p:nvCxnSpPr>
-                <p:cNvPr id="18" name="Straight Arrow Connector 17">
-                  <a:extLst>
-                    <a:ext uri="{FF2B5EF4-FFF2-40B4-BE49-F238E27FC236}">
-                      <a16:creationId xmlns:a16="http://schemas.microsoft.com/office/drawing/2014/main" id="{FD057466-ADB6-424D-8972-F84418BC76C5}"/>
-                    </a:ext>
-                  </a:extLst>
-                </p:cNvPr>
-                <p:cNvCxnSpPr>
-                  <a:cxnSpLocks/>
-                </p:cNvCxnSpPr>
-                <p:nvPr/>
-              </p:nvCxnSpPr>
-              <p:spPr>
-                <a:xfrm flipH="1" flipV="1">
-                  <a:off x="5145087" y="3004345"/>
-                  <a:ext cx="252000" cy="684000"/>
-                </a:xfrm>
-                <a:prstGeom prst="straightConnector1">
-                  <a:avLst/>
-                </a:prstGeom>
-                <a:ln w="19050">
-                  <a:solidFill>
-                    <a:schemeClr val="tx1"/>
-                  </a:solidFill>
-                  <a:tailEnd type="triangle"/>
-                </a:ln>
-              </p:spPr>
-              <p:style>
-                <a:lnRef idx="1">
-                  <a:schemeClr val="accent2"/>
-                </a:lnRef>
-                <a:fillRef idx="0">
-                  <a:schemeClr val="accent2"/>
-                </a:fillRef>
-                <a:effectRef idx="0">
-                  <a:schemeClr val="accent2"/>
-                </a:effectRef>
-                <a:fontRef idx="minor">
-                  <a:schemeClr val="tx1"/>
-                </a:fontRef>
-              </p:style>
-            </p:cxnSp>
-            <p:cxnSp>
-              <p:nvCxnSpPr>
-                <p:cNvPr id="21" name="Straight Arrow Connector 20">
-                  <a:extLst>
-                    <a:ext uri="{FF2B5EF4-FFF2-40B4-BE49-F238E27FC236}">
-                      <a16:creationId xmlns:a16="http://schemas.microsoft.com/office/drawing/2014/main" id="{0756B9D7-1FF7-482A-9D92-5FDEEFD26943}"/>
-                    </a:ext>
-                  </a:extLst>
-                </p:cNvPr>
-                <p:cNvCxnSpPr>
-                  <a:cxnSpLocks/>
-                </p:cNvCxnSpPr>
-                <p:nvPr/>
-              </p:nvCxnSpPr>
-              <p:spPr>
-                <a:xfrm flipV="1">
-                  <a:off x="5396816" y="3429000"/>
-                  <a:ext cx="639653" cy="252000"/>
-                </a:xfrm>
-                <a:prstGeom prst="straightConnector1">
-                  <a:avLst/>
-                </a:prstGeom>
-                <a:ln w="19050">
-                  <a:solidFill>
-                    <a:schemeClr val="tx1"/>
-                  </a:solidFill>
-                  <a:tailEnd type="triangle"/>
-                </a:ln>
-              </p:spPr>
-              <p:style>
-                <a:lnRef idx="1">
-                  <a:schemeClr val="accent2"/>
-                </a:lnRef>
-                <a:fillRef idx="0">
-                  <a:schemeClr val="accent2"/>
-                </a:fillRef>
-                <a:effectRef idx="0">
-                  <a:schemeClr val="accent2"/>
-                </a:effectRef>
-                <a:fontRef idx="minor">
-                  <a:schemeClr val="tx1"/>
-                </a:fontRef>
-              </p:style>
-            </p:cxnSp>
-            <p:cxnSp>
-              <p:nvCxnSpPr>
-                <p:cNvPr id="30" name="Straight Connector 29">
-                  <a:extLst>
-                    <a:ext uri="{FF2B5EF4-FFF2-40B4-BE49-F238E27FC236}">
-                      <a16:creationId xmlns:a16="http://schemas.microsoft.com/office/drawing/2014/main" id="{C4DFE6C3-67DE-4328-AFF1-2F84206EFD0C}"/>
-                    </a:ext>
-                  </a:extLst>
-                </p:cNvPr>
-                <p:cNvCxnSpPr>
-                  <a:cxnSpLocks/>
-                </p:cNvCxnSpPr>
-                <p:nvPr/>
-              </p:nvCxnSpPr>
-              <p:spPr>
-                <a:xfrm flipH="1" flipV="1">
-                  <a:off x="4321698" y="2470293"/>
-                  <a:ext cx="1075119" cy="1220320"/>
-                </a:xfrm>
-                <a:prstGeom prst="line">
-                  <a:avLst/>
-                </a:prstGeom>
-                <a:ln w="12700">
-                  <a:solidFill>
-                    <a:schemeClr val="tx1"/>
-                  </a:solidFill>
-                  <a:prstDash val="dash"/>
-                </a:ln>
-              </p:spPr>
-              <p:style>
-                <a:lnRef idx="1">
-                  <a:schemeClr val="accent1"/>
-                </a:lnRef>
-                <a:fillRef idx="0">
-                  <a:schemeClr val="accent1"/>
-                </a:fillRef>
-                <a:effectRef idx="0">
-                  <a:schemeClr val="accent1"/>
-                </a:effectRef>
-                <a:fontRef idx="minor">
-                  <a:schemeClr val="tx1"/>
-                </a:fontRef>
-              </p:style>
-            </p:cxnSp>
-            <p:cxnSp>
-              <p:nvCxnSpPr>
-                <p:cNvPr id="39" name="Straight Arrow Connector 38">
-                  <a:extLst>
-                    <a:ext uri="{FF2B5EF4-FFF2-40B4-BE49-F238E27FC236}">
-                      <a16:creationId xmlns:a16="http://schemas.microsoft.com/office/drawing/2014/main" id="{B9A052FE-FAD7-4021-917E-862BCE3D0989}"/>
-                    </a:ext>
-                  </a:extLst>
-                </p:cNvPr>
-                <p:cNvCxnSpPr>
-                  <a:cxnSpLocks/>
-                </p:cNvCxnSpPr>
-                <p:nvPr/>
-              </p:nvCxnSpPr>
-              <p:spPr>
-                <a:xfrm>
-                  <a:off x="4309540" y="2464345"/>
-                  <a:ext cx="360000" cy="0"/>
-                </a:xfrm>
-                <a:prstGeom prst="straightConnector1">
-                  <a:avLst/>
-                </a:prstGeom>
-                <a:ln w="19050">
-                  <a:solidFill>
-                    <a:schemeClr val="tx1"/>
-                  </a:solidFill>
-                  <a:tailEnd type="triangle"/>
-                </a:ln>
-              </p:spPr>
-              <p:style>
-                <a:lnRef idx="1">
-                  <a:schemeClr val="accent2"/>
-                </a:lnRef>
-                <a:fillRef idx="0">
-                  <a:schemeClr val="accent2"/>
-                </a:fillRef>
-                <a:effectRef idx="0">
-                  <a:schemeClr val="accent2"/>
-                </a:effectRef>
-                <a:fontRef idx="minor">
-                  <a:schemeClr val="tx1"/>
-                </a:fontRef>
-              </p:style>
-            </p:cxnSp>
-            <p:cxnSp>
-              <p:nvCxnSpPr>
-                <p:cNvPr id="41" name="Straight Arrow Connector 40">
-                  <a:extLst>
-                    <a:ext uri="{FF2B5EF4-FFF2-40B4-BE49-F238E27FC236}">
-                      <a16:creationId xmlns:a16="http://schemas.microsoft.com/office/drawing/2014/main" id="{B1C212CE-4C3A-4C9E-882A-B3A2EE07541D}"/>
-                    </a:ext>
-                  </a:extLst>
-                </p:cNvPr>
-                <p:cNvCxnSpPr>
-                  <a:cxnSpLocks/>
-                </p:cNvCxnSpPr>
-                <p:nvPr/>
-              </p:nvCxnSpPr>
-              <p:spPr>
-                <a:xfrm flipV="1">
-                  <a:off x="4318541" y="2104345"/>
-                  <a:ext cx="0" cy="360000"/>
-                </a:xfrm>
-                <a:prstGeom prst="straightConnector1">
-                  <a:avLst/>
-                </a:prstGeom>
-                <a:ln w="19050">
-                  <a:solidFill>
-                    <a:schemeClr val="tx1"/>
-                  </a:solidFill>
-                  <a:tailEnd type="triangle"/>
-                </a:ln>
-              </p:spPr>
-              <p:style>
-                <a:lnRef idx="1">
-                  <a:schemeClr val="accent2"/>
-                </a:lnRef>
-                <a:fillRef idx="0">
-                  <a:schemeClr val="accent2"/>
-                </a:fillRef>
-                <a:effectRef idx="0">
-                  <a:schemeClr val="accent2"/>
-                </a:effectRef>
-                <a:fontRef idx="minor">
-                  <a:schemeClr val="tx1"/>
-                </a:fontRef>
-              </p:style>
-            </p:cxnSp>
-            <p:sp>
-              <p:nvSpPr>
-                <p:cNvPr id="56" name="Arc 55">
-                  <a:extLst>
-                    <a:ext uri="{FF2B5EF4-FFF2-40B4-BE49-F238E27FC236}">
-                      <a16:creationId xmlns:a16="http://schemas.microsoft.com/office/drawing/2014/main" id="{11E3468C-ECBB-4BF4-BB54-3D96C13A264B}"/>
-                    </a:ext>
-                  </a:extLst>
-                </p:cNvPr>
-                <p:cNvSpPr/>
-                <p:nvPr/>
-              </p:nvSpPr>
-              <p:spPr>
-                <a:xfrm rot="16200000">
-                  <a:off x="4136414" y="2271010"/>
-                  <a:ext cx="360000" cy="360000"/>
-                </a:xfrm>
-                <a:prstGeom prst="arc">
-                  <a:avLst>
-                    <a:gd name="adj1" fmla="val 13567190"/>
-                    <a:gd name="adj2" fmla="val 0"/>
-                  </a:avLst>
-                </a:prstGeom>
-                <a:ln w="9525">
-                  <a:solidFill>
-                    <a:schemeClr val="tx1"/>
-                  </a:solidFill>
-                </a:ln>
-              </p:spPr>
-              <p:style>
-                <a:lnRef idx="1">
-                  <a:schemeClr val="accent1"/>
-                </a:lnRef>
-                <a:fillRef idx="0">
-                  <a:schemeClr val="accent1"/>
-                </a:fillRef>
-                <a:effectRef idx="0">
-                  <a:schemeClr val="accent1"/>
-                </a:effectRef>
-                <a:fontRef idx="minor">
-                  <a:schemeClr val="tx1"/>
-                </a:fontRef>
-              </p:style>
-              <p:txBody>
-                <a:bodyPr rtlCol="0" anchor="ctr"/>
-                <a:lstStyle/>
-                <a:p>
-                  <a:pPr algn="ctr"/>
-                  <a:endParaRPr lang="en-AU"/>
-                </a:p>
-              </p:txBody>
-            </p:sp>
-            <p:cxnSp>
-              <p:nvCxnSpPr>
-                <p:cNvPr id="57" name="Straight Connector 56">
-                  <a:extLst>
-                    <a:ext uri="{FF2B5EF4-FFF2-40B4-BE49-F238E27FC236}">
-                      <a16:creationId xmlns:a16="http://schemas.microsoft.com/office/drawing/2014/main" id="{709C166E-D3D2-4942-8829-0BB9DC0DF0DB}"/>
-                    </a:ext>
-                  </a:extLst>
-                </p:cNvPr>
-                <p:cNvCxnSpPr>
-                  <a:cxnSpLocks/>
-                  <a:stCxn id="6" idx="3"/>
-                </p:cNvCxnSpPr>
-                <p:nvPr/>
-              </p:nvCxnSpPr>
-              <p:spPr>
-                <a:xfrm flipV="1">
-                  <a:off x="3934979" y="2451011"/>
-                  <a:ext cx="379981" cy="395172"/>
-                </a:xfrm>
-                <a:prstGeom prst="line">
-                  <a:avLst/>
-                </a:prstGeom>
-                <a:ln w="12700">
-                  <a:solidFill>
-                    <a:schemeClr val="tx1"/>
-                  </a:solidFill>
-                  <a:prstDash val="dash"/>
-                </a:ln>
-              </p:spPr>
-              <p:style>
-                <a:lnRef idx="1">
-                  <a:schemeClr val="accent1"/>
-                </a:lnRef>
-                <a:fillRef idx="0">
-                  <a:schemeClr val="accent1"/>
-                </a:fillRef>
-                <a:effectRef idx="0">
-                  <a:schemeClr val="accent1"/>
-                </a:effectRef>
-                <a:fontRef idx="minor">
-                  <a:schemeClr val="tx1"/>
-                </a:fontRef>
-              </p:style>
-            </p:cxnSp>
-            <p:sp>
-              <p:nvSpPr>
-                <p:cNvPr id="60" name="Arc 59">
-                  <a:extLst>
-                    <a:ext uri="{FF2B5EF4-FFF2-40B4-BE49-F238E27FC236}">
-                      <a16:creationId xmlns:a16="http://schemas.microsoft.com/office/drawing/2014/main" id="{5FB71D5E-0977-491A-BF92-E642831A50B8}"/>
-                    </a:ext>
-                  </a:extLst>
-                </p:cNvPr>
-                <p:cNvSpPr/>
-                <p:nvPr/>
-              </p:nvSpPr>
-              <p:spPr>
-                <a:xfrm rot="16200000">
-                  <a:off x="5286560" y="3069028"/>
-                  <a:ext cx="220244" cy="360000"/>
-                </a:xfrm>
-                <a:prstGeom prst="arc">
-                  <a:avLst>
-                    <a:gd name="adj1" fmla="val 16933107"/>
-                    <a:gd name="adj2" fmla="val 0"/>
-                  </a:avLst>
-                </a:prstGeom>
-                <a:ln w="9525">
-                  <a:solidFill>
-                    <a:schemeClr val="tx1"/>
-                  </a:solidFill>
-                </a:ln>
-              </p:spPr>
-              <p:style>
-                <a:lnRef idx="1">
-                  <a:schemeClr val="accent1"/>
-                </a:lnRef>
-                <a:fillRef idx="0">
-                  <a:schemeClr val="accent1"/>
-                </a:fillRef>
-                <a:effectRef idx="0">
-                  <a:schemeClr val="accent1"/>
-                </a:effectRef>
-                <a:fontRef idx="minor">
-                  <a:schemeClr val="tx1"/>
-                </a:fontRef>
-              </p:style>
-              <p:txBody>
-                <a:bodyPr rtlCol="0" anchor="ctr"/>
-                <a:lstStyle/>
-                <a:p>
-                  <a:pPr algn="ctr"/>
-                  <a:endParaRPr lang="en-AU"/>
-                </a:p>
-              </p:txBody>
-            </p:sp>
-            <p:sp>
-              <p:nvSpPr>
-                <p:cNvPr id="61" name="Arc 60">
-                  <a:extLst>
-                    <a:ext uri="{FF2B5EF4-FFF2-40B4-BE49-F238E27FC236}">
-                      <a16:creationId xmlns:a16="http://schemas.microsoft.com/office/drawing/2014/main" id="{3CFD6A9A-6C8E-4151-8C37-9191920EE621}"/>
-                    </a:ext>
-                  </a:extLst>
-                </p:cNvPr>
-                <p:cNvSpPr/>
-                <p:nvPr/>
-              </p:nvSpPr>
-              <p:spPr>
-                <a:xfrm rot="16200000">
-                  <a:off x="5178502" y="3287776"/>
-                  <a:ext cx="360000" cy="426830"/>
-                </a:xfrm>
-                <a:prstGeom prst="arc">
-                  <a:avLst>
-                    <a:gd name="adj1" fmla="val 17446248"/>
-                    <a:gd name="adj2" fmla="val 874469"/>
-                  </a:avLst>
-                </a:prstGeom>
-                <a:ln w="9525">
-                  <a:solidFill>
-                    <a:schemeClr val="tx1"/>
-                  </a:solidFill>
-                </a:ln>
-              </p:spPr>
-              <p:style>
-                <a:lnRef idx="1">
-                  <a:schemeClr val="accent1"/>
-                </a:lnRef>
-                <a:fillRef idx="0">
-                  <a:schemeClr val="accent1"/>
-                </a:fillRef>
-                <a:effectRef idx="0">
-                  <a:schemeClr val="accent1"/>
-                </a:effectRef>
-                <a:fontRef idx="minor">
-                  <a:schemeClr val="tx1"/>
-                </a:fontRef>
-              </p:style>
-              <p:txBody>
-                <a:bodyPr rtlCol="0" anchor="ctr"/>
-                <a:lstStyle/>
-                <a:p>
-                  <a:pPr algn="ctr"/>
-                  <a:endParaRPr lang="en-AU"/>
-                </a:p>
-              </p:txBody>
-            </p:sp>
-            <p:sp>
-              <p:nvSpPr>
-                <p:cNvPr id="62" name="Arc 61">
-                  <a:extLst>
-                    <a:ext uri="{FF2B5EF4-FFF2-40B4-BE49-F238E27FC236}">
-                      <a16:creationId xmlns:a16="http://schemas.microsoft.com/office/drawing/2014/main" id="{25D23409-F4ED-45A8-9469-8167BF67D435}"/>
-                    </a:ext>
-                  </a:extLst>
-                </p:cNvPr>
-                <p:cNvSpPr/>
-                <p:nvPr/>
-              </p:nvSpPr>
-              <p:spPr>
-                <a:xfrm rot="16200000">
-                  <a:off x="5178501" y="2999079"/>
-                  <a:ext cx="360002" cy="639653"/>
-                </a:xfrm>
-                <a:prstGeom prst="arc">
-                  <a:avLst>
-                    <a:gd name="adj1" fmla="val 16568432"/>
-                    <a:gd name="adj2" fmla="val 18942459"/>
-                  </a:avLst>
-                </a:prstGeom>
-                <a:ln w="9525">
-                  <a:solidFill>
-                    <a:schemeClr val="tx1"/>
-                  </a:solidFill>
-                </a:ln>
-              </p:spPr>
-              <p:style>
-                <a:lnRef idx="1">
-                  <a:schemeClr val="accent1"/>
-                </a:lnRef>
-                <a:fillRef idx="0">
-                  <a:schemeClr val="accent1"/>
-                </a:fillRef>
-                <a:effectRef idx="0">
-                  <a:schemeClr val="accent1"/>
-                </a:effectRef>
-                <a:fontRef idx="minor">
-                  <a:schemeClr val="tx1"/>
-                </a:fontRef>
-              </p:style>
-              <p:txBody>
-                <a:bodyPr rtlCol="0" anchor="ctr"/>
-                <a:lstStyle/>
-                <a:p>
-                  <a:pPr algn="ctr"/>
-                  <a:endParaRPr lang="en-AU"/>
-                </a:p>
-              </p:txBody>
-            </p:sp>
             <mc:AlternateContent xmlns:mc="http://schemas.openxmlformats.org/markup-compatibility/2006" xmlns:a14="http://schemas.microsoft.com/office/drawing/2010/main">
               <mc:Choice Requires="a14">
                 <p:sp>
                   <p:nvSpPr>
-                    <p:cNvPr id="63" name="TextBox 62">
+                    <p:cNvPr id="80" name="TextBox 79">
                       <a:extLst>
                         <a:ext uri="{FF2B5EF4-FFF2-40B4-BE49-F238E27FC236}">
-                          <a16:creationId xmlns:a16="http://schemas.microsoft.com/office/drawing/2014/main" id="{2FE38C87-8474-4333-81E2-0464DB00274B}"/>
+                          <a16:creationId xmlns:a16="http://schemas.microsoft.com/office/drawing/2014/main" id="{470C78FF-1A71-4FA9-8DCC-6643C4C3C862}"/>
                         </a:ext>
                       </a:extLst>
                     </p:cNvPr>
@@ -4133,8 +5031,8 @@
                   </p:nvSpPr>
                   <p:spPr>
                     <a:xfrm>
-                      <a:off x="5956366" y="3601764"/>
-                      <a:ext cx="346377" cy="338554"/>
+                      <a:off x="5743110" y="2826371"/>
+                      <a:ext cx="408530" cy="276999"/>
                     </a:xfrm>
                     <a:prstGeom prst="rect">
                       <a:avLst/>
@@ -4142,7 +5040,7 @@
                     <a:noFill/>
                   </p:spPr>
                   <p:txBody>
-                    <a:bodyPr wrap="none" rtlCol="0">
+                    <a:bodyPr wrap="square" rtlCol="0">
                       <a:spAutoFit/>
                     </a:bodyPr>
                     <a:lstStyle/>
@@ -4154,16 +5052,35 @@
                             <m:jc m:val="centerGroup"/>
                           </m:oMathParaPr>
                           <m:oMath xmlns:m="http://schemas.openxmlformats.org/officeDocument/2006/math">
-                            <m:r>
-                              <a:rPr lang="en-AU" sz="1600" b="0" i="1" smtClean="0">
-                                <a:latin typeface="Cambria Math" panose="02040503050406030204" pitchFamily="18" charset="0"/>
-                              </a:rPr>
-                              <m:t>𝑥</m:t>
-                            </m:r>
+                            <m:sSub>
+                              <m:sSubPr>
+                                <m:ctrlPr>
+                                  <a:rPr lang="en-AU" sz="1200" b="0" i="1" smtClean="0">
+                                    <a:latin typeface="Cambria Math" panose="02040503050406030204" pitchFamily="18" charset="0"/>
+                                  </a:rPr>
+                                </m:ctrlPr>
+                              </m:sSubPr>
+                              <m:e>
+                                <m:r>
+                                  <a:rPr lang="en-AU" sz="1200" b="0" i="1" smtClean="0">
+                                    <a:latin typeface="Cambria Math" panose="02040503050406030204" pitchFamily="18" charset="0"/>
+                                  </a:rPr>
+                                  <m:t>𝑟</m:t>
+                                </m:r>
+                              </m:e>
+                              <m:sub>
+                                <m:r>
+                                  <a:rPr lang="en-AU" sz="1200" b="0" i="1" smtClean="0">
+                                    <a:latin typeface="Cambria Math" panose="02040503050406030204" pitchFamily="18" charset="0"/>
+                                  </a:rPr>
+                                  <m:t>h</m:t>
+                                </m:r>
+                              </m:sub>
+                            </m:sSub>
                           </m:oMath>
                         </m:oMathPara>
                       </a14:m>
-                      <a:endParaRPr lang="en-AU" dirty="0"/>
+                      <a:endParaRPr lang="en-AU" b="0" dirty="0"/>
                     </a:p>
                   </p:txBody>
                 </p:sp>
@@ -4171,10 +5088,10 @@
               <mc:Fallback xmlns="">
                 <p:sp>
                   <p:nvSpPr>
-                    <p:cNvPr id="63" name="TextBox 62">
+                    <p:cNvPr id="80" name="TextBox 79">
                       <a:extLst>
                         <a:ext uri="{FF2B5EF4-FFF2-40B4-BE49-F238E27FC236}">
-                          <a16:creationId xmlns:a16="http://schemas.microsoft.com/office/drawing/2014/main" id="{2FE38C87-8474-4333-81E2-0464DB00274B}"/>
+                          <a16:creationId xmlns:a16="http://schemas.microsoft.com/office/drawing/2014/main" id="{470C78FF-1A71-4FA9-8DCC-6643C4C3C862}"/>
                         </a:ext>
                       </a:extLst>
                     </p:cNvPr>
@@ -4185,14 +5102,14 @@
                   </p:nvSpPr>
                   <p:spPr>
                     <a:xfrm>
-                      <a:off x="5956366" y="3601764"/>
-                      <a:ext cx="346377" cy="338554"/>
+                      <a:off x="5743110" y="2826371"/>
+                      <a:ext cx="408530" cy="276999"/>
                     </a:xfrm>
                     <a:prstGeom prst="rect">
                       <a:avLst/>
                     </a:prstGeom>
                     <a:blipFill>
-                      <a:blip r:embed="rId2"/>
+                      <a:blip r:embed="rId10"/>
                       <a:stretch>
                         <a:fillRect/>
                       </a:stretch>
@@ -4217,28 +5134,27 @@
               <mc:Choice Requires="a14">
                 <p:sp>
                   <p:nvSpPr>
-                    <p:cNvPr id="64" name="TextBox 63">
+                    <p:cNvPr id="81" name="Rectangle 80">
                       <a:extLst>
                         <a:ext uri="{FF2B5EF4-FFF2-40B4-BE49-F238E27FC236}">
-                          <a16:creationId xmlns:a16="http://schemas.microsoft.com/office/drawing/2014/main" id="{EA195DC6-89F2-49A4-A4FE-7B322F18B49D}"/>
+                          <a16:creationId xmlns:a16="http://schemas.microsoft.com/office/drawing/2014/main" id="{2CD23148-22DF-410B-B1CC-1460F606FD9D}"/>
                         </a:ext>
                       </a:extLst>
                     </p:cNvPr>
-                    <p:cNvSpPr txBox="1"/>
+                    <p:cNvSpPr/>
                     <p:nvPr/>
                   </p:nvSpPr>
                   <p:spPr>
                     <a:xfrm>
-                      <a:off x="5345258" y="2708146"/>
-                      <a:ext cx="350096" cy="338554"/>
+                      <a:off x="3261102" y="2678735"/>
+                      <a:ext cx="673581" cy="307777"/>
                     </a:xfrm>
                     <a:prstGeom prst="rect">
                       <a:avLst/>
                     </a:prstGeom>
-                    <a:noFill/>
                   </p:spPr>
                   <p:txBody>
-                    <a:bodyPr wrap="none" rtlCol="0">
+                    <a:bodyPr wrap="none">
                       <a:spAutoFit/>
                     </a:bodyPr>
                     <a:lstStyle/>
@@ -4250,12 +5166,62 @@
                             <m:jc m:val="centerGroup"/>
                           </m:oMathParaPr>
                           <m:oMath xmlns:m="http://schemas.openxmlformats.org/officeDocument/2006/math">
+                            <m:sSub>
+                              <m:sSubPr>
+                                <m:ctrlPr>
+                                  <a:rPr lang="en-AU" sz="1400" b="0" i="1" smtClean="0">
+                                    <a:latin typeface="Cambria Math" panose="02040503050406030204" pitchFamily="18" charset="0"/>
+                                  </a:rPr>
+                                </m:ctrlPr>
+                              </m:sSubPr>
+                              <m:e>
+                                <m:r>
+                                  <a:rPr lang="en-AU" sz="1400" b="0" i="1" smtClean="0">
+                                    <a:latin typeface="Cambria Math" panose="02040503050406030204" pitchFamily="18" charset="0"/>
+                                  </a:rPr>
+                                  <m:t>𝑚</m:t>
+                                </m:r>
+                              </m:e>
+                              <m:sub>
+                                <m:r>
+                                  <a:rPr lang="en-AU" sz="1400" b="0" i="1" smtClean="0">
+                                    <a:latin typeface="Cambria Math" panose="02040503050406030204" pitchFamily="18" charset="0"/>
+                                  </a:rPr>
+                                  <m:t>𝑜</m:t>
+                                </m:r>
+                              </m:sub>
+                            </m:sSub>
                             <m:r>
-                              <a:rPr lang="en-AU" sz="1600" b="0" i="1" smtClean="0">
+                              <a:rPr lang="en-AU" sz="1400" b="0" i="1" smtClean="0">
                                 <a:latin typeface="Cambria Math" panose="02040503050406030204" pitchFamily="18" charset="0"/>
                               </a:rPr>
-                              <m:t>𝑦</m:t>
+                              <m:t>, </m:t>
                             </m:r>
+                            <m:sSub>
+                              <m:sSubPr>
+                                <m:ctrlPr>
+                                  <a:rPr lang="en-AU" sz="1400" b="0" i="1" smtClean="0">
+                                    <a:latin typeface="Cambria Math" panose="02040503050406030204" pitchFamily="18" charset="0"/>
+                                  </a:rPr>
+                                </m:ctrlPr>
+                              </m:sSubPr>
+                              <m:e>
+                                <m:r>
+                                  <a:rPr lang="en-AU" sz="1400" b="0" i="1" smtClean="0">
+                                    <a:latin typeface="Cambria Math" panose="02040503050406030204" pitchFamily="18" charset="0"/>
+                                  </a:rPr>
+                                  <m:t>𝐼</m:t>
+                                </m:r>
+                              </m:e>
+                              <m:sub>
+                                <m:r>
+                                  <a:rPr lang="en-AU" sz="1400" b="0" i="1" smtClean="0">
+                                    <a:latin typeface="Cambria Math" panose="02040503050406030204" pitchFamily="18" charset="0"/>
+                                  </a:rPr>
+                                  <m:t>𝑜</m:t>
+                                </m:r>
+                              </m:sub>
+                            </m:sSub>
                           </m:oMath>
                         </m:oMathPara>
                       </a14:m>
@@ -4267,220 +5233,28 @@
               <mc:Fallback xmlns="">
                 <p:sp>
                   <p:nvSpPr>
-                    <p:cNvPr id="64" name="TextBox 63">
+                    <p:cNvPr id="81" name="Rectangle 80">
                       <a:extLst>
                         <a:ext uri="{FF2B5EF4-FFF2-40B4-BE49-F238E27FC236}">
-                          <a16:creationId xmlns:a16="http://schemas.microsoft.com/office/drawing/2014/main" id="{EA195DC6-89F2-49A4-A4FE-7B322F18B49D}"/>
+                          <a16:creationId xmlns:a16="http://schemas.microsoft.com/office/drawing/2014/main" id="{2CD23148-22DF-410B-B1CC-1460F606FD9D}"/>
                         </a:ext>
                       </a:extLst>
                     </p:cNvPr>
-                    <p:cNvSpPr txBox="1">
+                    <p:cNvSpPr>
                       <a:spLocks noRot="1" noChangeAspect="1" noMove="1" noResize="1" noEditPoints="1" noAdjustHandles="1" noChangeArrowheads="1" noChangeShapeType="1" noTextEdit="1"/>
                     </p:cNvSpPr>
                     <p:nvPr/>
                   </p:nvSpPr>
                   <p:spPr>
                     <a:xfrm>
-                      <a:off x="5345258" y="2708146"/>
-                      <a:ext cx="350096" cy="338554"/>
+                      <a:off x="3261102" y="2678735"/>
+                      <a:ext cx="673581" cy="307777"/>
                     </a:xfrm>
                     <a:prstGeom prst="rect">
                       <a:avLst/>
                     </a:prstGeom>
                     <a:blipFill>
-                      <a:blip r:embed="rId3"/>
-                      <a:stretch>
-                        <a:fillRect b="-3571"/>
-                      </a:stretch>
-                    </a:blipFill>
-                  </p:spPr>
-                  <p:txBody>
-                    <a:bodyPr/>
-                    <a:lstStyle/>
-                    <a:p>
-                      <a:r>
-                        <a:rPr lang="en-AU">
-                          <a:noFill/>
-                        </a:rPr>
-                        <a:t> </a:t>
-                      </a:r>
-                    </a:p>
-                  </p:txBody>
-                </p:sp>
-              </mc:Fallback>
-            </mc:AlternateContent>
-            <mc:AlternateContent xmlns:mc="http://schemas.openxmlformats.org/markup-compatibility/2006" xmlns:a14="http://schemas.microsoft.com/office/drawing/2010/main">
-              <mc:Choice Requires="a14">
-                <p:sp>
-                  <p:nvSpPr>
-                    <p:cNvPr id="66" name="TextBox 65">
-                      <a:extLst>
-                        <a:ext uri="{FF2B5EF4-FFF2-40B4-BE49-F238E27FC236}">
-                          <a16:creationId xmlns:a16="http://schemas.microsoft.com/office/drawing/2014/main" id="{5BE0F2DE-DFC6-4419-BF4C-393642AF27F6}"/>
-                        </a:ext>
-                      </a:extLst>
-                    </p:cNvPr>
-                    <p:cNvSpPr txBox="1"/>
-                    <p:nvPr/>
-                  </p:nvSpPr>
-                  <p:spPr>
-                    <a:xfrm>
-                      <a:off x="4946162" y="3362585"/>
-                      <a:ext cx="389450" cy="307777"/>
-                    </a:xfrm>
-                    <a:prstGeom prst="rect">
-                      <a:avLst/>
-                    </a:prstGeom>
-                    <a:noFill/>
-                  </p:spPr>
-                  <p:txBody>
-                    <a:bodyPr wrap="square" rtlCol="0">
-                      <a:spAutoFit/>
-                    </a:bodyPr>
-                    <a:lstStyle/>
-                    <a:p>
-                      <a:pPr/>
-                      <a14:m>
-                        <m:oMathPara xmlns:m="http://schemas.openxmlformats.org/officeDocument/2006/math">
-                          <m:oMathParaPr>
-                            <m:jc m:val="centerGroup"/>
-                          </m:oMathParaPr>
-                          <m:oMath xmlns:m="http://schemas.openxmlformats.org/officeDocument/2006/math">
-                            <m:r>
-                              <a:rPr lang="en-AU" sz="1400" b="0" i="1" smtClean="0">
-                                <a:latin typeface="Cambria Math" panose="02040503050406030204" pitchFamily="18" charset="0"/>
-                              </a:rPr>
-                              <m:t>𝜙</m:t>
-                            </m:r>
-                          </m:oMath>
-                        </m:oMathPara>
-                      </a14:m>
-                      <a:endParaRPr lang="en-AU" dirty="0"/>
-                    </a:p>
-                  </p:txBody>
-                </p:sp>
-              </mc:Choice>
-              <mc:Fallback xmlns="">
-                <p:sp>
-                  <p:nvSpPr>
-                    <p:cNvPr id="66" name="TextBox 65">
-                      <a:extLst>
-                        <a:ext uri="{FF2B5EF4-FFF2-40B4-BE49-F238E27FC236}">
-                          <a16:creationId xmlns:a16="http://schemas.microsoft.com/office/drawing/2014/main" id="{5BE0F2DE-DFC6-4419-BF4C-393642AF27F6}"/>
-                        </a:ext>
-                      </a:extLst>
-                    </p:cNvPr>
-                    <p:cNvSpPr txBox="1">
-                      <a:spLocks noRot="1" noChangeAspect="1" noMove="1" noResize="1" noEditPoints="1" noAdjustHandles="1" noChangeArrowheads="1" noChangeShapeType="1" noTextEdit="1"/>
-                    </p:cNvSpPr>
-                    <p:nvPr/>
-                  </p:nvSpPr>
-                  <p:spPr>
-                    <a:xfrm>
-                      <a:off x="4946162" y="3362585"/>
-                      <a:ext cx="389450" cy="307777"/>
-                    </a:xfrm>
-                    <a:prstGeom prst="rect">
-                      <a:avLst/>
-                    </a:prstGeom>
-                    <a:blipFill>
-                      <a:blip r:embed="rId4"/>
-                      <a:stretch>
-                        <a:fillRect b="-8000"/>
-                      </a:stretch>
-                    </a:blipFill>
-                  </p:spPr>
-                  <p:txBody>
-                    <a:bodyPr/>
-                    <a:lstStyle/>
-                    <a:p>
-                      <a:r>
-                        <a:rPr lang="en-AU">
-                          <a:noFill/>
-                        </a:rPr>
-                        <a:t> </a:t>
-                      </a:r>
-                    </a:p>
-                  </p:txBody>
-                </p:sp>
-              </mc:Fallback>
-            </mc:AlternateContent>
-            <mc:AlternateContent xmlns:mc="http://schemas.openxmlformats.org/markup-compatibility/2006" xmlns:a14="http://schemas.microsoft.com/office/drawing/2010/main">
-              <mc:Choice Requires="a14">
-                <p:sp>
-                  <p:nvSpPr>
-                    <p:cNvPr id="67" name="TextBox 66">
-                      <a:extLst>
-                        <a:ext uri="{FF2B5EF4-FFF2-40B4-BE49-F238E27FC236}">
-                          <a16:creationId xmlns:a16="http://schemas.microsoft.com/office/drawing/2014/main" id="{70EF0D0B-FAC3-4F4B-87EF-326D4B48B4FA}"/>
-                        </a:ext>
-                      </a:extLst>
-                    </p:cNvPr>
-                    <p:cNvSpPr txBox="1"/>
-                    <p:nvPr/>
-                  </p:nvSpPr>
-                  <p:spPr>
-                    <a:xfrm>
-                      <a:off x="4881912" y="2977681"/>
-                      <a:ext cx="389450" cy="307777"/>
-                    </a:xfrm>
-                    <a:prstGeom prst="rect">
-                      <a:avLst/>
-                    </a:prstGeom>
-                    <a:noFill/>
-                  </p:spPr>
-                  <p:txBody>
-                    <a:bodyPr wrap="square" rtlCol="0">
-                      <a:spAutoFit/>
-                    </a:bodyPr>
-                    <a:lstStyle/>
-                    <a:p>
-                      <a:pPr/>
-                      <a14:m>
-                        <m:oMathPara xmlns:m="http://schemas.openxmlformats.org/officeDocument/2006/math">
-                          <m:oMathParaPr>
-                            <m:jc m:val="centerGroup"/>
-                          </m:oMathParaPr>
-                          <m:oMath xmlns:m="http://schemas.openxmlformats.org/officeDocument/2006/math">
-                            <m:r>
-                              <a:rPr lang="en-AU" sz="1400" b="0" i="1" smtClean="0">
-                                <a:latin typeface="Cambria Math" panose="02040503050406030204" pitchFamily="18" charset="0"/>
-                              </a:rPr>
-                              <m:t>𝛾</m:t>
-                            </m:r>
-                          </m:oMath>
-                        </m:oMathPara>
-                      </a14:m>
-                      <a:endParaRPr lang="en-AU" dirty="0"/>
-                    </a:p>
-                  </p:txBody>
-                </p:sp>
-              </mc:Choice>
-              <mc:Fallback xmlns="">
-                <p:sp>
-                  <p:nvSpPr>
-                    <p:cNvPr id="67" name="TextBox 66">
-                      <a:extLst>
-                        <a:ext uri="{FF2B5EF4-FFF2-40B4-BE49-F238E27FC236}">
-                          <a16:creationId xmlns:a16="http://schemas.microsoft.com/office/drawing/2014/main" id="{70EF0D0B-FAC3-4F4B-87EF-326D4B48B4FA}"/>
-                        </a:ext>
-                      </a:extLst>
-                    </p:cNvPr>
-                    <p:cNvSpPr txBox="1">
-                      <a:spLocks noRot="1" noChangeAspect="1" noMove="1" noResize="1" noEditPoints="1" noAdjustHandles="1" noChangeArrowheads="1" noChangeShapeType="1" noTextEdit="1"/>
-                    </p:cNvSpPr>
-                    <p:nvPr/>
-                  </p:nvSpPr>
-                  <p:spPr>
-                    <a:xfrm>
-                      <a:off x="4881912" y="2977681"/>
-                      <a:ext cx="389450" cy="307777"/>
-                    </a:xfrm>
-                    <a:prstGeom prst="rect">
-                      <a:avLst/>
-                    </a:prstGeom>
-                    <a:blipFill>
-                      <a:blip r:embed="rId5"/>
+                      <a:blip r:embed="rId11"/>
                       <a:stretch>
                         <a:fillRect/>
                       </a:stretch>
@@ -4505,28 +5279,27 @@
               <mc:Choice Requires="a14">
                 <p:sp>
                   <p:nvSpPr>
-                    <p:cNvPr id="68" name="TextBox 67">
+                    <p:cNvPr id="82" name="Rectangle 81">
                       <a:extLst>
                         <a:ext uri="{FF2B5EF4-FFF2-40B4-BE49-F238E27FC236}">
-                          <a16:creationId xmlns:a16="http://schemas.microsoft.com/office/drawing/2014/main" id="{4E263CEE-EC74-43BD-A9D6-1EA2165CFB3C}"/>
+                          <a16:creationId xmlns:a16="http://schemas.microsoft.com/office/drawing/2014/main" id="{8E1876E5-AC03-4BD2-BF4E-06B929BAADB4}"/>
                         </a:ext>
                       </a:extLst>
                     </p:cNvPr>
-                    <p:cNvSpPr txBox="1"/>
+                    <p:cNvSpPr/>
                     <p:nvPr/>
                   </p:nvSpPr>
                   <p:spPr>
                     <a:xfrm>
-                      <a:off x="5097165" y="2916255"/>
-                      <a:ext cx="389450" cy="307777"/>
+                      <a:off x="6192242" y="4232933"/>
+                      <a:ext cx="684098" cy="307777"/>
                     </a:xfrm>
                     <a:prstGeom prst="rect">
                       <a:avLst/>
                     </a:prstGeom>
-                    <a:noFill/>
                   </p:spPr>
                   <p:txBody>
-                    <a:bodyPr wrap="square" rtlCol="0">
+                    <a:bodyPr wrap="none">
                       <a:spAutoFit/>
                     </a:bodyPr>
                     <a:lstStyle/>
@@ -4538,12 +5311,62 @@
                             <m:jc m:val="centerGroup"/>
                           </m:oMathParaPr>
                           <m:oMath xmlns:m="http://schemas.openxmlformats.org/officeDocument/2006/math">
+                            <m:sSub>
+                              <m:sSubPr>
+                                <m:ctrlPr>
+                                  <a:rPr lang="en-AU" sz="1400" b="0" i="1" smtClean="0">
+                                    <a:latin typeface="Cambria Math" panose="02040503050406030204" pitchFamily="18" charset="0"/>
+                                  </a:rPr>
+                                </m:ctrlPr>
+                              </m:sSubPr>
+                              <m:e>
+                                <m:r>
+                                  <a:rPr lang="en-AU" sz="1400" b="0" i="1" smtClean="0">
+                                    <a:latin typeface="Cambria Math" panose="02040503050406030204" pitchFamily="18" charset="0"/>
+                                  </a:rPr>
+                                  <m:t>𝑚</m:t>
+                                </m:r>
+                              </m:e>
+                              <m:sub>
+                                <m:r>
+                                  <a:rPr lang="en-AU" sz="1400" b="0" i="1" smtClean="0">
+                                    <a:latin typeface="Cambria Math" panose="02040503050406030204" pitchFamily="18" charset="0"/>
+                                  </a:rPr>
+                                  <m:t>h</m:t>
+                                </m:r>
+                              </m:sub>
+                            </m:sSub>
                             <m:r>
                               <a:rPr lang="en-AU" sz="1400" b="0" i="1" smtClean="0">
                                 <a:latin typeface="Cambria Math" panose="02040503050406030204" pitchFamily="18" charset="0"/>
                               </a:rPr>
-                              <m:t>𝜃</m:t>
+                              <m:t>, </m:t>
                             </m:r>
+                            <m:sSub>
+                              <m:sSubPr>
+                                <m:ctrlPr>
+                                  <a:rPr lang="en-AU" sz="1400" b="0" i="1" smtClean="0">
+                                    <a:latin typeface="Cambria Math" panose="02040503050406030204" pitchFamily="18" charset="0"/>
+                                  </a:rPr>
+                                </m:ctrlPr>
+                              </m:sSubPr>
+                              <m:e>
+                                <m:r>
+                                  <a:rPr lang="en-AU" sz="1400" b="0" i="1" smtClean="0">
+                                    <a:latin typeface="Cambria Math" panose="02040503050406030204" pitchFamily="18" charset="0"/>
+                                  </a:rPr>
+                                  <m:t>𝐼</m:t>
+                                </m:r>
+                              </m:e>
+                              <m:sub>
+                                <m:r>
+                                  <a:rPr lang="en-AU" sz="1400" b="0" i="1" smtClean="0">
+                                    <a:latin typeface="Cambria Math" panose="02040503050406030204" pitchFamily="18" charset="0"/>
+                                  </a:rPr>
+                                  <m:t>h</m:t>
+                                </m:r>
+                              </m:sub>
+                            </m:sSub>
                           </m:oMath>
                         </m:oMathPara>
                       </a14:m>
@@ -4555,220 +5378,28 @@
               <mc:Fallback xmlns="">
                 <p:sp>
                   <p:nvSpPr>
-                    <p:cNvPr id="68" name="TextBox 67">
+                    <p:cNvPr id="82" name="Rectangle 81">
                       <a:extLst>
                         <a:ext uri="{FF2B5EF4-FFF2-40B4-BE49-F238E27FC236}">
-                          <a16:creationId xmlns:a16="http://schemas.microsoft.com/office/drawing/2014/main" id="{4E263CEE-EC74-43BD-A9D6-1EA2165CFB3C}"/>
+                          <a16:creationId xmlns:a16="http://schemas.microsoft.com/office/drawing/2014/main" id="{8E1876E5-AC03-4BD2-BF4E-06B929BAADB4}"/>
                         </a:ext>
                       </a:extLst>
                     </p:cNvPr>
-                    <p:cNvSpPr txBox="1">
+                    <p:cNvSpPr>
                       <a:spLocks noRot="1" noChangeAspect="1" noMove="1" noResize="1" noEditPoints="1" noAdjustHandles="1" noChangeArrowheads="1" noChangeShapeType="1" noTextEdit="1"/>
                     </p:cNvSpPr>
                     <p:nvPr/>
                   </p:nvSpPr>
                   <p:spPr>
                     <a:xfrm>
-                      <a:off x="5097165" y="2916255"/>
-                      <a:ext cx="389450" cy="307777"/>
+                      <a:off x="6192242" y="4232933"/>
+                      <a:ext cx="684098" cy="307777"/>
                     </a:xfrm>
                     <a:prstGeom prst="rect">
                       <a:avLst/>
                     </a:prstGeom>
                     <a:blipFill>
-                      <a:blip r:embed="rId6"/>
-                      <a:stretch>
-                        <a:fillRect/>
-                      </a:stretch>
-                    </a:blipFill>
-                  </p:spPr>
-                  <p:txBody>
-                    <a:bodyPr/>
-                    <a:lstStyle/>
-                    <a:p>
-                      <a:r>
-                        <a:rPr lang="en-AU">
-                          <a:noFill/>
-                        </a:rPr>
-                        <a:t> </a:t>
-                      </a:r>
-                    </a:p>
-                  </p:txBody>
-                </p:sp>
-              </mc:Fallback>
-            </mc:AlternateContent>
-            <mc:AlternateContent xmlns:mc="http://schemas.openxmlformats.org/markup-compatibility/2006" xmlns:a14="http://schemas.microsoft.com/office/drawing/2010/main">
-              <mc:Choice Requires="a14">
-                <p:sp>
-                  <p:nvSpPr>
-                    <p:cNvPr id="69" name="TextBox 68">
-                      <a:extLst>
-                        <a:ext uri="{FF2B5EF4-FFF2-40B4-BE49-F238E27FC236}">
-                          <a16:creationId xmlns:a16="http://schemas.microsoft.com/office/drawing/2014/main" id="{899A26F7-590C-40B3-A04B-4EC2CD070BE6}"/>
-                        </a:ext>
-                      </a:extLst>
-                    </p:cNvPr>
-                    <p:cNvSpPr txBox="1"/>
-                    <p:nvPr/>
-                  </p:nvSpPr>
-                  <p:spPr>
-                    <a:xfrm>
-                      <a:off x="3864506" y="2196033"/>
-                      <a:ext cx="389450" cy="307777"/>
-                    </a:xfrm>
-                    <a:prstGeom prst="rect">
-                      <a:avLst/>
-                    </a:prstGeom>
-                    <a:noFill/>
-                  </p:spPr>
-                  <p:txBody>
-                    <a:bodyPr wrap="square" rtlCol="0">
-                      <a:spAutoFit/>
-                    </a:bodyPr>
-                    <a:lstStyle/>
-                    <a:p>
-                      <a:pPr/>
-                      <a14:m>
-                        <m:oMathPara xmlns:m="http://schemas.openxmlformats.org/officeDocument/2006/math">
-                          <m:oMathParaPr>
-                            <m:jc m:val="centerGroup"/>
-                          </m:oMathParaPr>
-                          <m:oMath xmlns:m="http://schemas.openxmlformats.org/officeDocument/2006/math">
-                            <m:r>
-                              <a:rPr lang="en-AU" sz="1400" b="0" i="1" smtClean="0">
-                                <a:latin typeface="Cambria Math" panose="02040503050406030204" pitchFamily="18" charset="0"/>
-                              </a:rPr>
-                              <m:t>𝛼</m:t>
-                            </m:r>
-                          </m:oMath>
-                        </m:oMathPara>
-                      </a14:m>
-                      <a:endParaRPr lang="en-AU" dirty="0"/>
-                    </a:p>
-                  </p:txBody>
-                </p:sp>
-              </mc:Choice>
-              <mc:Fallback xmlns="">
-                <p:sp>
-                  <p:nvSpPr>
-                    <p:cNvPr id="69" name="TextBox 68">
-                      <a:extLst>
-                        <a:ext uri="{FF2B5EF4-FFF2-40B4-BE49-F238E27FC236}">
-                          <a16:creationId xmlns:a16="http://schemas.microsoft.com/office/drawing/2014/main" id="{899A26F7-590C-40B3-A04B-4EC2CD070BE6}"/>
-                        </a:ext>
-                      </a:extLst>
-                    </p:cNvPr>
-                    <p:cNvSpPr txBox="1">
-                      <a:spLocks noRot="1" noChangeAspect="1" noMove="1" noResize="1" noEditPoints="1" noAdjustHandles="1" noChangeArrowheads="1" noChangeShapeType="1" noTextEdit="1"/>
-                    </p:cNvSpPr>
-                    <p:nvPr/>
-                  </p:nvSpPr>
-                  <p:spPr>
-                    <a:xfrm>
-                      <a:off x="3864506" y="2196033"/>
-                      <a:ext cx="389450" cy="307777"/>
-                    </a:xfrm>
-                    <a:prstGeom prst="rect">
-                      <a:avLst/>
-                    </a:prstGeom>
-                    <a:blipFill>
-                      <a:blip r:embed="rId7"/>
-                      <a:stretch>
-                        <a:fillRect/>
-                      </a:stretch>
-                    </a:blipFill>
-                  </p:spPr>
-                  <p:txBody>
-                    <a:bodyPr/>
-                    <a:lstStyle/>
-                    <a:p>
-                      <a:r>
-                        <a:rPr lang="en-AU">
-                          <a:noFill/>
-                        </a:rPr>
-                        <a:t> </a:t>
-                      </a:r>
-                    </a:p>
-                  </p:txBody>
-                </p:sp>
-              </mc:Fallback>
-            </mc:AlternateContent>
-            <mc:AlternateContent xmlns:mc="http://schemas.openxmlformats.org/markup-compatibility/2006" xmlns:a14="http://schemas.microsoft.com/office/drawing/2010/main">
-              <mc:Choice Requires="a14">
-                <p:sp>
-                  <p:nvSpPr>
-                    <p:cNvPr id="73" name="TextBox 72">
-                      <a:extLst>
-                        <a:ext uri="{FF2B5EF4-FFF2-40B4-BE49-F238E27FC236}">
-                          <a16:creationId xmlns:a16="http://schemas.microsoft.com/office/drawing/2014/main" id="{08C3AB82-6923-422E-A16D-119E9B063574}"/>
-                        </a:ext>
-                      </a:extLst>
-                    </p:cNvPr>
-                    <p:cNvSpPr txBox="1"/>
-                    <p:nvPr/>
-                  </p:nvSpPr>
-                  <p:spPr>
-                    <a:xfrm>
-                      <a:off x="5140322" y="3646577"/>
-                      <a:ext cx="385875" cy="369332"/>
-                    </a:xfrm>
-                    <a:prstGeom prst="rect">
-                      <a:avLst/>
-                    </a:prstGeom>
-                    <a:noFill/>
-                  </p:spPr>
-                  <p:txBody>
-                    <a:bodyPr wrap="none" rtlCol="0">
-                      <a:spAutoFit/>
-                    </a:bodyPr>
-                    <a:lstStyle/>
-                    <a:p>
-                      <a:pPr/>
-                      <a14:m>
-                        <m:oMathPara xmlns:m="http://schemas.openxmlformats.org/officeDocument/2006/math">
-                          <m:oMathParaPr>
-                            <m:jc m:val="centerGroup"/>
-                          </m:oMathParaPr>
-                          <m:oMath xmlns:m="http://schemas.openxmlformats.org/officeDocument/2006/math">
-                            <m:r>
-                              <a:rPr lang="en-AU" b="0" i="1" smtClean="0">
-                                <a:latin typeface="Cambria Math" panose="02040503050406030204" pitchFamily="18" charset="0"/>
-                              </a:rPr>
-                              <m:t>𝑃</m:t>
-                            </m:r>
-                          </m:oMath>
-                        </m:oMathPara>
-                      </a14:m>
-                      <a:endParaRPr lang="en-AU" dirty="0"/>
-                    </a:p>
-                  </p:txBody>
-                </p:sp>
-              </mc:Choice>
-              <mc:Fallback xmlns="">
-                <p:sp>
-                  <p:nvSpPr>
-                    <p:cNvPr id="73" name="TextBox 72">
-                      <a:extLst>
-                        <a:ext uri="{FF2B5EF4-FFF2-40B4-BE49-F238E27FC236}">
-                          <a16:creationId xmlns:a16="http://schemas.microsoft.com/office/drawing/2014/main" id="{08C3AB82-6923-422E-A16D-119E9B063574}"/>
-                        </a:ext>
-                      </a:extLst>
-                    </p:cNvPr>
-                    <p:cNvSpPr txBox="1">
-                      <a:spLocks noRot="1" noChangeAspect="1" noMove="1" noResize="1" noEditPoints="1" noAdjustHandles="1" noChangeArrowheads="1" noChangeShapeType="1" noTextEdit="1"/>
-                    </p:cNvSpPr>
-                    <p:nvPr/>
-                  </p:nvSpPr>
-                  <p:spPr>
-                    <a:xfrm>
-                      <a:off x="5140322" y="3646577"/>
-                      <a:ext cx="385875" cy="369332"/>
-                    </a:xfrm>
-                    <a:prstGeom prst="rect">
-                      <a:avLst/>
-                    </a:prstGeom>
-                    <a:blipFill>
-                      <a:blip r:embed="rId8"/>
+                      <a:blip r:embed="rId12"/>
                       <a:stretch>
                         <a:fillRect/>
                       </a:stretch>
@@ -4792,28 +5423,27 @@
           </p:grpSp>
           <p:cxnSp>
             <p:nvCxnSpPr>
-              <p:cNvPr id="75" name="Straight Arrow Connector 74">
+              <p:cNvPr id="32" name="Straight Arrow Connector 31">
                 <a:extLst>
                   <a:ext uri="{FF2B5EF4-FFF2-40B4-BE49-F238E27FC236}">
-                    <a16:creationId xmlns:a16="http://schemas.microsoft.com/office/drawing/2014/main" id="{CD585D47-3109-4F77-A2D6-3ADAE84E4398}"/>
+                    <a16:creationId xmlns:a16="http://schemas.microsoft.com/office/drawing/2014/main" id="{12E00646-C673-4EBD-AB21-A05F2C7D3881}"/>
                   </a:ext>
                 </a:extLst>
               </p:cNvPr>
               <p:cNvCxnSpPr>
                 <a:cxnSpLocks/>
-                <a:endCxn id="6" idx="7"/>
               </p:cNvCxnSpPr>
               <p:nvPr/>
             </p:nvCxnSpPr>
             <p:spPr>
-              <a:xfrm flipV="1">
-                <a:off x="4316817" y="2082507"/>
-                <a:ext cx="381838" cy="381838"/>
+              <a:xfrm>
+                <a:off x="5735993" y="1978265"/>
+                <a:ext cx="0" cy="522469"/>
               </a:xfrm>
               <a:prstGeom prst="straightConnector1">
                 <a:avLst/>
               </a:prstGeom>
-              <a:ln w="9525">
+              <a:ln w="19050">
                 <a:solidFill>
                   <a:schemeClr val="tx1"/>
                 </a:solidFill>
@@ -4835,14 +5465,14 @@
               </a:fontRef>
             </p:style>
           </p:cxnSp>
-          <mc:AlternateContent xmlns:mc="http://schemas.openxmlformats.org/markup-compatibility/2006" xmlns:a14="http://schemas.microsoft.com/office/drawing/2010/main">
-            <mc:Choice Requires="a14">
+          <mc:AlternateContent xmlns:mc="http://schemas.openxmlformats.org/markup-compatibility/2006">
+            <mc:Choice xmlns:a14="http://schemas.microsoft.com/office/drawing/2010/main" Requires="a14">
               <p:sp>
                 <p:nvSpPr>
-                  <p:cNvPr id="76" name="TextBox 75">
+                  <p:cNvPr id="35" name="TextBox 34">
                     <a:extLst>
                       <a:ext uri="{FF2B5EF4-FFF2-40B4-BE49-F238E27FC236}">
-                        <a16:creationId xmlns:a16="http://schemas.microsoft.com/office/drawing/2014/main" id="{74ED2A7B-C1C6-4ABA-8A3A-CCA339131C8E}"/>
+                        <a16:creationId xmlns:a16="http://schemas.microsoft.com/office/drawing/2014/main" id="{4E69C83C-1895-4DAC-BD0D-C9BD5146AF7F}"/>
                       </a:ext>
                     </a:extLst>
                   </p:cNvPr>
@@ -4851,7 +5481,7 @@
                 </p:nvSpPr>
                 <p:spPr>
                   <a:xfrm>
-                    <a:off x="4353502" y="1945713"/>
+                    <a:off x="5629581" y="2043451"/>
                     <a:ext cx="408530" cy="276999"/>
                   </a:xfrm>
                   <a:prstGeom prst="rect">
@@ -4872,31 +5502,12 @@
                           <m:jc m:val="centerGroup"/>
                         </m:oMathParaPr>
                         <m:oMath xmlns:m="http://schemas.openxmlformats.org/officeDocument/2006/math">
-                          <m:sSub>
-                            <m:sSubPr>
-                              <m:ctrlPr>
-                                <a:rPr lang="en-AU" sz="1200" b="0" i="1" smtClean="0">
-                                  <a:latin typeface="Cambria Math" panose="02040503050406030204" pitchFamily="18" charset="0"/>
-                                </a:rPr>
-                              </m:ctrlPr>
-                            </m:sSubPr>
-                            <m:e>
-                              <m:r>
-                                <a:rPr lang="en-AU" sz="1200" b="0" i="1" smtClean="0">
-                                  <a:latin typeface="Cambria Math" panose="02040503050406030204" pitchFamily="18" charset="0"/>
-                                </a:rPr>
-                                <m:t>𝑟</m:t>
-                              </m:r>
-                            </m:e>
-                            <m:sub>
-                              <m:r>
-                                <a:rPr lang="en-AU" sz="1200" b="0" i="1" smtClean="0">
-                                  <a:latin typeface="Cambria Math" panose="02040503050406030204" pitchFamily="18" charset="0"/>
-                                </a:rPr>
-                                <m:t>𝑜</m:t>
-                              </m:r>
-                            </m:sub>
-                          </m:sSub>
+                          <m:r>
+                            <a:rPr lang="en-AU" sz="1200" b="0" i="1" smtClean="0">
+                              <a:latin typeface="Cambria Math" panose="02040503050406030204" pitchFamily="18" charset="0"/>
+                            </a:rPr>
+                            <m:t>𝑔</m:t>
+                          </m:r>
                         </m:oMath>
                       </m:oMathPara>
                     </a14:m>
@@ -4905,13 +5516,13 @@
                 </p:txBody>
               </p:sp>
             </mc:Choice>
-            <mc:Fallback xmlns="">
+            <mc:Fallback>
               <p:sp>
                 <p:nvSpPr>
-                  <p:cNvPr id="76" name="TextBox 75">
+                  <p:cNvPr id="35" name="TextBox 34">
                     <a:extLst>
                       <a:ext uri="{FF2B5EF4-FFF2-40B4-BE49-F238E27FC236}">
-                        <a16:creationId xmlns:a16="http://schemas.microsoft.com/office/drawing/2014/main" id="{74ED2A7B-C1C6-4ABA-8A3A-CCA339131C8E}"/>
+                        <a16:creationId xmlns:a16="http://schemas.microsoft.com/office/drawing/2014/main" id="{4E69C83C-1895-4DAC-BD0D-C9BD5146AF7F}"/>
                       </a:ext>
                     </a:extLst>
                   </p:cNvPr>
@@ -4922,464 +5533,14 @@
                 </p:nvSpPr>
                 <p:spPr>
                   <a:xfrm>
-                    <a:off x="4353502" y="1945713"/>
+                    <a:off x="5629581" y="2043451"/>
                     <a:ext cx="408530" cy="276999"/>
                   </a:xfrm>
                   <a:prstGeom prst="rect">
                     <a:avLst/>
                   </a:prstGeom>
                   <a:blipFill>
-                    <a:blip r:embed="rId9"/>
-                    <a:stretch>
-                      <a:fillRect/>
-                    </a:stretch>
-                  </a:blipFill>
-                </p:spPr>
-                <p:txBody>
-                  <a:bodyPr/>
-                  <a:lstStyle/>
-                  <a:p>
-                    <a:r>
-                      <a:rPr lang="en-AU">
-                        <a:noFill/>
-                      </a:rPr>
-                      <a:t> </a:t>
-                    </a:r>
-                  </a:p>
-                </p:txBody>
-              </p:sp>
-            </mc:Fallback>
-          </mc:AlternateContent>
-          <p:cxnSp>
-            <p:nvCxnSpPr>
-              <p:cNvPr id="78" name="Straight Arrow Connector 77">
-                <a:extLst>
-                  <a:ext uri="{FF2B5EF4-FFF2-40B4-BE49-F238E27FC236}">
-                    <a16:creationId xmlns:a16="http://schemas.microsoft.com/office/drawing/2014/main" id="{49D6DFE7-D429-4C8B-828E-22C0FE688B6E}"/>
-                  </a:ext>
-                </a:extLst>
-              </p:cNvPr>
-              <p:cNvCxnSpPr>
-                <a:cxnSpLocks/>
-                <a:endCxn id="4" idx="7"/>
-              </p:cNvCxnSpPr>
-              <p:nvPr/>
-            </p:nvCxnSpPr>
-            <p:spPr>
-              <a:xfrm flipV="1">
-                <a:off x="5387620" y="2921301"/>
-                <a:ext cx="772872" cy="761220"/>
-              </a:xfrm>
-              <a:prstGeom prst="straightConnector1">
-                <a:avLst/>
-              </a:prstGeom>
-              <a:ln w="9525">
-                <a:solidFill>
-                  <a:schemeClr val="tx1"/>
-                </a:solidFill>
-                <a:tailEnd type="triangle"/>
-              </a:ln>
-            </p:spPr>
-            <p:style>
-              <a:lnRef idx="1">
-                <a:schemeClr val="accent2"/>
-              </a:lnRef>
-              <a:fillRef idx="0">
-                <a:schemeClr val="accent2"/>
-              </a:fillRef>
-              <a:effectRef idx="0">
-                <a:schemeClr val="accent2"/>
-              </a:effectRef>
-              <a:fontRef idx="minor">
-                <a:schemeClr val="tx1"/>
-              </a:fontRef>
-            </p:style>
-          </p:cxnSp>
-          <mc:AlternateContent xmlns:mc="http://schemas.openxmlformats.org/markup-compatibility/2006" xmlns:a14="http://schemas.microsoft.com/office/drawing/2010/main">
-            <mc:Choice Requires="a14">
-              <p:sp>
-                <p:nvSpPr>
-                  <p:cNvPr id="80" name="TextBox 79">
-                    <a:extLst>
-                      <a:ext uri="{FF2B5EF4-FFF2-40B4-BE49-F238E27FC236}">
-                        <a16:creationId xmlns:a16="http://schemas.microsoft.com/office/drawing/2014/main" id="{470C78FF-1A71-4FA9-8DCC-6643C4C3C862}"/>
-                      </a:ext>
-                    </a:extLst>
-                  </p:cNvPr>
-                  <p:cNvSpPr txBox="1"/>
-                  <p:nvPr/>
-                </p:nvSpPr>
-                <p:spPr>
-                  <a:xfrm>
-                    <a:off x="5743110" y="2826371"/>
-                    <a:ext cx="408530" cy="276999"/>
-                  </a:xfrm>
-                  <a:prstGeom prst="rect">
-                    <a:avLst/>
-                  </a:prstGeom>
-                  <a:noFill/>
-                </p:spPr>
-                <p:txBody>
-                  <a:bodyPr wrap="square" rtlCol="0">
-                    <a:spAutoFit/>
-                  </a:bodyPr>
-                  <a:lstStyle/>
-                  <a:p>
-                    <a:pPr/>
-                    <a14:m>
-                      <m:oMathPara xmlns:m="http://schemas.openxmlformats.org/officeDocument/2006/math">
-                        <m:oMathParaPr>
-                          <m:jc m:val="centerGroup"/>
-                        </m:oMathParaPr>
-                        <m:oMath xmlns:m="http://schemas.openxmlformats.org/officeDocument/2006/math">
-                          <m:sSub>
-                            <m:sSubPr>
-                              <m:ctrlPr>
-                                <a:rPr lang="en-AU" sz="1200" b="0" i="1" smtClean="0">
-                                  <a:latin typeface="Cambria Math" panose="02040503050406030204" pitchFamily="18" charset="0"/>
-                                </a:rPr>
-                              </m:ctrlPr>
-                            </m:sSubPr>
-                            <m:e>
-                              <m:r>
-                                <a:rPr lang="en-AU" sz="1200" b="0" i="1" smtClean="0">
-                                  <a:latin typeface="Cambria Math" panose="02040503050406030204" pitchFamily="18" charset="0"/>
-                                </a:rPr>
-                                <m:t>𝑟</m:t>
-                              </m:r>
-                            </m:e>
-                            <m:sub>
-                              <m:r>
-                                <a:rPr lang="en-AU" sz="1200" b="0" i="1" smtClean="0">
-                                  <a:latin typeface="Cambria Math" panose="02040503050406030204" pitchFamily="18" charset="0"/>
-                                </a:rPr>
-                                <m:t>h</m:t>
-                              </m:r>
-                            </m:sub>
-                          </m:sSub>
-                        </m:oMath>
-                      </m:oMathPara>
-                    </a14:m>
-                    <a:endParaRPr lang="en-AU" b="0" dirty="0"/>
-                  </a:p>
-                </p:txBody>
-              </p:sp>
-            </mc:Choice>
-            <mc:Fallback xmlns="">
-              <p:sp>
-                <p:nvSpPr>
-                  <p:cNvPr id="80" name="TextBox 79">
-                    <a:extLst>
-                      <a:ext uri="{FF2B5EF4-FFF2-40B4-BE49-F238E27FC236}">
-                        <a16:creationId xmlns:a16="http://schemas.microsoft.com/office/drawing/2014/main" id="{470C78FF-1A71-4FA9-8DCC-6643C4C3C862}"/>
-                      </a:ext>
-                    </a:extLst>
-                  </p:cNvPr>
-                  <p:cNvSpPr txBox="1">
-                    <a:spLocks noRot="1" noChangeAspect="1" noMove="1" noResize="1" noEditPoints="1" noAdjustHandles="1" noChangeArrowheads="1" noChangeShapeType="1" noTextEdit="1"/>
-                  </p:cNvSpPr>
-                  <p:nvPr/>
-                </p:nvSpPr>
-                <p:spPr>
-                  <a:xfrm>
-                    <a:off x="5743110" y="2826371"/>
-                    <a:ext cx="408530" cy="276999"/>
-                  </a:xfrm>
-                  <a:prstGeom prst="rect">
-                    <a:avLst/>
-                  </a:prstGeom>
-                  <a:blipFill>
-                    <a:blip r:embed="rId10"/>
-                    <a:stretch>
-                      <a:fillRect/>
-                    </a:stretch>
-                  </a:blipFill>
-                </p:spPr>
-                <p:txBody>
-                  <a:bodyPr/>
-                  <a:lstStyle/>
-                  <a:p>
-                    <a:r>
-                      <a:rPr lang="en-AU">
-                        <a:noFill/>
-                      </a:rPr>
-                      <a:t> </a:t>
-                    </a:r>
-                  </a:p>
-                </p:txBody>
-              </p:sp>
-            </mc:Fallback>
-          </mc:AlternateContent>
-          <mc:AlternateContent xmlns:mc="http://schemas.openxmlformats.org/markup-compatibility/2006" xmlns:a14="http://schemas.microsoft.com/office/drawing/2010/main">
-            <mc:Choice Requires="a14">
-              <p:sp>
-                <p:nvSpPr>
-                  <p:cNvPr id="81" name="Rectangle 80">
-                    <a:extLst>
-                      <a:ext uri="{FF2B5EF4-FFF2-40B4-BE49-F238E27FC236}">
-                        <a16:creationId xmlns:a16="http://schemas.microsoft.com/office/drawing/2014/main" id="{2CD23148-22DF-410B-B1CC-1460F606FD9D}"/>
-                      </a:ext>
-                    </a:extLst>
-                  </p:cNvPr>
-                  <p:cNvSpPr/>
-                  <p:nvPr/>
-                </p:nvSpPr>
-                <p:spPr>
-                  <a:xfrm>
-                    <a:off x="3261102" y="2678735"/>
-                    <a:ext cx="673581" cy="307777"/>
-                  </a:xfrm>
-                  <a:prstGeom prst="rect">
-                    <a:avLst/>
-                  </a:prstGeom>
-                </p:spPr>
-                <p:txBody>
-                  <a:bodyPr wrap="none">
-                    <a:spAutoFit/>
-                  </a:bodyPr>
-                  <a:lstStyle/>
-                  <a:p>
-                    <a:pPr/>
-                    <a14:m>
-                      <m:oMathPara xmlns:m="http://schemas.openxmlformats.org/officeDocument/2006/math">
-                        <m:oMathParaPr>
-                          <m:jc m:val="centerGroup"/>
-                        </m:oMathParaPr>
-                        <m:oMath xmlns:m="http://schemas.openxmlformats.org/officeDocument/2006/math">
-                          <m:sSub>
-                            <m:sSubPr>
-                              <m:ctrlPr>
-                                <a:rPr lang="en-AU" sz="1400" b="0" i="1" smtClean="0">
-                                  <a:latin typeface="Cambria Math" panose="02040503050406030204" pitchFamily="18" charset="0"/>
-                                </a:rPr>
-                              </m:ctrlPr>
-                            </m:sSubPr>
-                            <m:e>
-                              <m:r>
-                                <a:rPr lang="en-AU" sz="1400" b="0" i="1" smtClean="0">
-                                  <a:latin typeface="Cambria Math" panose="02040503050406030204" pitchFamily="18" charset="0"/>
-                                </a:rPr>
-                                <m:t>𝑚</m:t>
-                              </m:r>
-                            </m:e>
-                            <m:sub>
-                              <m:r>
-                                <a:rPr lang="en-AU" sz="1400" b="0" i="1" smtClean="0">
-                                  <a:latin typeface="Cambria Math" panose="02040503050406030204" pitchFamily="18" charset="0"/>
-                                </a:rPr>
-                                <m:t>𝑜</m:t>
-                              </m:r>
-                            </m:sub>
-                          </m:sSub>
-                          <m:r>
-                            <a:rPr lang="en-AU" sz="1400" b="0" i="1" smtClean="0">
-                              <a:latin typeface="Cambria Math" panose="02040503050406030204" pitchFamily="18" charset="0"/>
-                            </a:rPr>
-                            <m:t>, </m:t>
-                          </m:r>
-                          <m:sSub>
-                            <m:sSubPr>
-                              <m:ctrlPr>
-                                <a:rPr lang="en-AU" sz="1400" b="0" i="1" smtClean="0">
-                                  <a:latin typeface="Cambria Math" panose="02040503050406030204" pitchFamily="18" charset="0"/>
-                                </a:rPr>
-                              </m:ctrlPr>
-                            </m:sSubPr>
-                            <m:e>
-                              <m:r>
-                                <a:rPr lang="en-AU" sz="1400" b="0" i="1" smtClean="0">
-                                  <a:latin typeface="Cambria Math" panose="02040503050406030204" pitchFamily="18" charset="0"/>
-                                </a:rPr>
-                                <m:t>𝐼</m:t>
-                              </m:r>
-                            </m:e>
-                            <m:sub>
-                              <m:r>
-                                <a:rPr lang="en-AU" sz="1400" b="0" i="1" smtClean="0">
-                                  <a:latin typeface="Cambria Math" panose="02040503050406030204" pitchFamily="18" charset="0"/>
-                                </a:rPr>
-                                <m:t>𝑜</m:t>
-                              </m:r>
-                            </m:sub>
-                          </m:sSub>
-                        </m:oMath>
-                      </m:oMathPara>
-                    </a14:m>
-                    <a:endParaRPr lang="en-AU" dirty="0"/>
-                  </a:p>
-                </p:txBody>
-              </p:sp>
-            </mc:Choice>
-            <mc:Fallback xmlns="">
-              <p:sp>
-                <p:nvSpPr>
-                  <p:cNvPr id="81" name="Rectangle 80">
-                    <a:extLst>
-                      <a:ext uri="{FF2B5EF4-FFF2-40B4-BE49-F238E27FC236}">
-                        <a16:creationId xmlns:a16="http://schemas.microsoft.com/office/drawing/2014/main" id="{2CD23148-22DF-410B-B1CC-1460F606FD9D}"/>
-                      </a:ext>
-                    </a:extLst>
-                  </p:cNvPr>
-                  <p:cNvSpPr>
-                    <a:spLocks noRot="1" noChangeAspect="1" noMove="1" noResize="1" noEditPoints="1" noAdjustHandles="1" noChangeArrowheads="1" noChangeShapeType="1" noTextEdit="1"/>
-                  </p:cNvSpPr>
-                  <p:nvPr/>
-                </p:nvSpPr>
-                <p:spPr>
-                  <a:xfrm>
-                    <a:off x="3261102" y="2678735"/>
-                    <a:ext cx="673581" cy="307777"/>
-                  </a:xfrm>
-                  <a:prstGeom prst="rect">
-                    <a:avLst/>
-                  </a:prstGeom>
-                  <a:blipFill>
-                    <a:blip r:embed="rId11"/>
-                    <a:stretch>
-                      <a:fillRect/>
-                    </a:stretch>
-                  </a:blipFill>
-                </p:spPr>
-                <p:txBody>
-                  <a:bodyPr/>
-                  <a:lstStyle/>
-                  <a:p>
-                    <a:r>
-                      <a:rPr lang="en-AU">
-                        <a:noFill/>
-                      </a:rPr>
-                      <a:t> </a:t>
-                    </a:r>
-                  </a:p>
-                </p:txBody>
-              </p:sp>
-            </mc:Fallback>
-          </mc:AlternateContent>
-          <mc:AlternateContent xmlns:mc="http://schemas.openxmlformats.org/markup-compatibility/2006" xmlns:a14="http://schemas.microsoft.com/office/drawing/2010/main">
-            <mc:Choice Requires="a14">
-              <p:sp>
-                <p:nvSpPr>
-                  <p:cNvPr id="82" name="Rectangle 81">
-                    <a:extLst>
-                      <a:ext uri="{FF2B5EF4-FFF2-40B4-BE49-F238E27FC236}">
-                        <a16:creationId xmlns:a16="http://schemas.microsoft.com/office/drawing/2014/main" id="{8E1876E5-AC03-4BD2-BF4E-06B929BAADB4}"/>
-                      </a:ext>
-                    </a:extLst>
-                  </p:cNvPr>
-                  <p:cNvSpPr/>
-                  <p:nvPr/>
-                </p:nvSpPr>
-                <p:spPr>
-                  <a:xfrm>
-                    <a:off x="6192242" y="4232933"/>
-                    <a:ext cx="684098" cy="307777"/>
-                  </a:xfrm>
-                  <a:prstGeom prst="rect">
-                    <a:avLst/>
-                  </a:prstGeom>
-                </p:spPr>
-                <p:txBody>
-                  <a:bodyPr wrap="none">
-                    <a:spAutoFit/>
-                  </a:bodyPr>
-                  <a:lstStyle/>
-                  <a:p>
-                    <a:pPr/>
-                    <a14:m>
-                      <m:oMathPara xmlns:m="http://schemas.openxmlformats.org/officeDocument/2006/math">
-                        <m:oMathParaPr>
-                          <m:jc m:val="centerGroup"/>
-                        </m:oMathParaPr>
-                        <m:oMath xmlns:m="http://schemas.openxmlformats.org/officeDocument/2006/math">
-                          <m:sSub>
-                            <m:sSubPr>
-                              <m:ctrlPr>
-                                <a:rPr lang="en-AU" sz="1400" b="0" i="1" smtClean="0">
-                                  <a:latin typeface="Cambria Math" panose="02040503050406030204" pitchFamily="18" charset="0"/>
-                                </a:rPr>
-                              </m:ctrlPr>
-                            </m:sSubPr>
-                            <m:e>
-                              <m:r>
-                                <a:rPr lang="en-AU" sz="1400" b="0" i="1" smtClean="0">
-                                  <a:latin typeface="Cambria Math" panose="02040503050406030204" pitchFamily="18" charset="0"/>
-                                </a:rPr>
-                                <m:t>𝑚</m:t>
-                              </m:r>
-                            </m:e>
-                            <m:sub>
-                              <m:r>
-                                <a:rPr lang="en-AU" sz="1400" b="0" i="1" smtClean="0">
-                                  <a:latin typeface="Cambria Math" panose="02040503050406030204" pitchFamily="18" charset="0"/>
-                                </a:rPr>
-                                <m:t>h</m:t>
-                              </m:r>
-                            </m:sub>
-                          </m:sSub>
-                          <m:r>
-                            <a:rPr lang="en-AU" sz="1400" b="0" i="1" smtClean="0">
-                              <a:latin typeface="Cambria Math" panose="02040503050406030204" pitchFamily="18" charset="0"/>
-                            </a:rPr>
-                            <m:t>, </m:t>
-                          </m:r>
-                          <m:sSub>
-                            <m:sSubPr>
-                              <m:ctrlPr>
-                                <a:rPr lang="en-AU" sz="1400" b="0" i="1" smtClean="0">
-                                  <a:latin typeface="Cambria Math" panose="02040503050406030204" pitchFamily="18" charset="0"/>
-                                </a:rPr>
-                              </m:ctrlPr>
-                            </m:sSubPr>
-                            <m:e>
-                              <m:r>
-                                <a:rPr lang="en-AU" sz="1400" b="0" i="1" smtClean="0">
-                                  <a:latin typeface="Cambria Math" panose="02040503050406030204" pitchFamily="18" charset="0"/>
-                                </a:rPr>
-                                <m:t>𝐼</m:t>
-                              </m:r>
-                            </m:e>
-                            <m:sub>
-                              <m:r>
-                                <a:rPr lang="en-AU" sz="1400" b="0" i="1" smtClean="0">
-                                  <a:latin typeface="Cambria Math" panose="02040503050406030204" pitchFamily="18" charset="0"/>
-                                </a:rPr>
-                                <m:t>h</m:t>
-                              </m:r>
-                            </m:sub>
-                          </m:sSub>
-                        </m:oMath>
-                      </m:oMathPara>
-                    </a14:m>
-                    <a:endParaRPr lang="en-AU" dirty="0"/>
-                  </a:p>
-                </p:txBody>
-              </p:sp>
-            </mc:Choice>
-            <mc:Fallback xmlns="">
-              <p:sp>
-                <p:nvSpPr>
-                  <p:cNvPr id="82" name="Rectangle 81">
-                    <a:extLst>
-                      <a:ext uri="{FF2B5EF4-FFF2-40B4-BE49-F238E27FC236}">
-                        <a16:creationId xmlns:a16="http://schemas.microsoft.com/office/drawing/2014/main" id="{8E1876E5-AC03-4BD2-BF4E-06B929BAADB4}"/>
-                      </a:ext>
-                    </a:extLst>
-                  </p:cNvPr>
-                  <p:cNvSpPr>
-                    <a:spLocks noRot="1" noChangeAspect="1" noMove="1" noResize="1" noEditPoints="1" noAdjustHandles="1" noChangeArrowheads="1" noChangeShapeType="1" noTextEdit="1"/>
-                  </p:cNvSpPr>
-                  <p:nvPr/>
-                </p:nvSpPr>
-                <p:spPr>
-                  <a:xfrm>
-                    <a:off x="6192242" y="4232933"/>
-                    <a:ext cx="684098" cy="307777"/>
-                  </a:xfrm>
-                  <a:prstGeom prst="rect">
-                    <a:avLst/>
-                  </a:prstGeom>
-                  <a:blipFill>
-                    <a:blip r:embed="rId12"/>
+                    <a:blip r:embed="rId13"/>
                     <a:stretch>
                       <a:fillRect/>
                     </a:stretch>
@@ -5401,58 +5562,132 @@
             </mc:Fallback>
           </mc:AlternateContent>
         </p:grpSp>
-        <p:cxnSp>
-          <p:nvCxnSpPr>
-            <p:cNvPr id="32" name="Straight Arrow Connector 31">
+        <p:grpSp>
+          <p:nvGrpSpPr>
+            <p:cNvPr id="26" name="Group 25">
               <a:extLst>
                 <a:ext uri="{FF2B5EF4-FFF2-40B4-BE49-F238E27FC236}">
-                  <a16:creationId xmlns:a16="http://schemas.microsoft.com/office/drawing/2014/main" id="{12E00646-C673-4EBD-AB21-A05F2C7D3881}"/>
+                  <a16:creationId xmlns:a16="http://schemas.microsoft.com/office/drawing/2014/main" id="{368EB450-D1E9-4F0F-B633-EB8CCE30395D}"/>
                 </a:ext>
               </a:extLst>
             </p:cNvPr>
-            <p:cNvCxnSpPr>
-              <a:cxnSpLocks/>
-            </p:cNvCxnSpPr>
+            <p:cNvGrpSpPr/>
             <p:nvPr/>
-          </p:nvCxnSpPr>
-          <p:spPr>
+          </p:nvGrpSpPr>
+          <p:grpSpPr>
             <a:xfrm>
-              <a:off x="5735993" y="1978265"/>
-              <a:ext cx="0" cy="522469"/>
+              <a:off x="5203776" y="3411662"/>
+              <a:ext cx="333375" cy="345454"/>
+              <a:chOff x="7569200" y="2826371"/>
+              <a:chExt cx="333375" cy="345454"/>
             </a:xfrm>
-            <a:prstGeom prst="straightConnector1">
-              <a:avLst/>
-            </a:prstGeom>
-            <a:ln w="19050">
-              <a:solidFill>
+          </p:grpSpPr>
+          <p:sp>
+            <p:nvSpPr>
+              <p:cNvPr id="23" name="Arc 22">
+                <a:extLst>
+                  <a:ext uri="{FF2B5EF4-FFF2-40B4-BE49-F238E27FC236}">
+                    <a16:creationId xmlns:a16="http://schemas.microsoft.com/office/drawing/2014/main" id="{0A820F01-0D16-42CE-A7C5-4C926BD1B76D}"/>
+                  </a:ext>
+                </a:extLst>
+              </p:cNvPr>
+              <p:cNvSpPr/>
+              <p:nvPr/>
+            </p:nvSpPr>
+            <p:spPr>
+              <a:xfrm>
+                <a:off x="7569200" y="2826371"/>
+                <a:ext cx="333375" cy="345454"/>
+              </a:xfrm>
+              <a:prstGeom prst="arc">
+                <a:avLst>
+                  <a:gd name="adj1" fmla="val 9718028"/>
+                  <a:gd name="adj2" fmla="val 16569310"/>
+                </a:avLst>
+              </a:prstGeom>
+              <a:ln w="19050">
+                <a:solidFill>
+                  <a:schemeClr val="tx1"/>
+                </a:solidFill>
+              </a:ln>
+            </p:spPr>
+            <p:style>
+              <a:lnRef idx="1">
+                <a:schemeClr val="accent1"/>
+              </a:lnRef>
+              <a:fillRef idx="0">
+                <a:schemeClr val="accent1"/>
+              </a:fillRef>
+              <a:effectRef idx="0">
+                <a:schemeClr val="accent1"/>
+              </a:effectRef>
+              <a:fontRef idx="minor">
                 <a:schemeClr val="tx1"/>
-              </a:solidFill>
-              <a:tailEnd type="triangle"/>
-            </a:ln>
-          </p:spPr>
-          <p:style>
-            <a:lnRef idx="1">
-              <a:schemeClr val="accent2"/>
-            </a:lnRef>
-            <a:fillRef idx="0">
-              <a:schemeClr val="accent2"/>
-            </a:fillRef>
-            <a:effectRef idx="0">
-              <a:schemeClr val="accent2"/>
-            </a:effectRef>
-            <a:fontRef idx="minor">
-              <a:schemeClr val="tx1"/>
-            </a:fontRef>
-          </p:style>
-        </p:cxnSp>
+              </a:fontRef>
+            </p:style>
+            <p:txBody>
+              <a:bodyPr rtlCol="0" anchor="ctr"/>
+              <a:lstStyle/>
+              <a:p>
+                <a:pPr algn="ctr"/>
+                <a:endParaRPr lang="en-AU"/>
+              </a:p>
+            </p:txBody>
+          </p:sp>
+          <p:cxnSp>
+            <p:nvCxnSpPr>
+              <p:cNvPr id="25" name="Straight Arrow Connector 24">
+                <a:extLst>
+                  <a:ext uri="{FF2B5EF4-FFF2-40B4-BE49-F238E27FC236}">
+                    <a16:creationId xmlns:a16="http://schemas.microsoft.com/office/drawing/2014/main" id="{E71615AB-99A1-4E2F-9064-2B1FBDA8C40C}"/>
+                  </a:ext>
+                </a:extLst>
+              </p:cNvPr>
+              <p:cNvCxnSpPr>
+                <a:cxnSpLocks/>
+                <a:stCxn id="23" idx="0"/>
+              </p:cNvCxnSpPr>
+              <p:nvPr/>
+            </p:nvCxnSpPr>
+            <p:spPr>
+              <a:xfrm>
+                <a:off x="7576863" y="3050869"/>
+                <a:ext cx="27262" cy="60379"/>
+              </a:xfrm>
+              <a:prstGeom prst="straightConnector1">
+                <a:avLst/>
+              </a:prstGeom>
+              <a:ln>
+                <a:solidFill>
+                  <a:schemeClr val="tx1"/>
+                </a:solidFill>
+                <a:tailEnd type="triangle"/>
+              </a:ln>
+            </p:spPr>
+            <p:style>
+              <a:lnRef idx="1">
+                <a:schemeClr val="accent1"/>
+              </a:lnRef>
+              <a:fillRef idx="0">
+                <a:schemeClr val="accent1"/>
+              </a:fillRef>
+              <a:effectRef idx="0">
+                <a:schemeClr val="accent1"/>
+              </a:effectRef>
+              <a:fontRef idx="minor">
+                <a:schemeClr val="tx1"/>
+              </a:fontRef>
+            </p:style>
+          </p:cxnSp>
+        </p:grpSp>
         <mc:AlternateContent xmlns:mc="http://schemas.openxmlformats.org/markup-compatibility/2006">
           <mc:Choice xmlns:a14="http://schemas.microsoft.com/office/drawing/2010/main" Requires="a14">
             <p:sp>
               <p:nvSpPr>
-                <p:cNvPr id="35" name="TextBox 34">
+                <p:cNvPr id="54" name="TextBox 53">
                   <a:extLst>
                     <a:ext uri="{FF2B5EF4-FFF2-40B4-BE49-F238E27FC236}">
-                      <a16:creationId xmlns:a16="http://schemas.microsoft.com/office/drawing/2014/main" id="{4E69C83C-1895-4DAC-BD0D-C9BD5146AF7F}"/>
+                      <a16:creationId xmlns:a16="http://schemas.microsoft.com/office/drawing/2014/main" id="{AF054CAF-975D-4C5B-8BB5-43DC3124A7AB}"/>
                     </a:ext>
                   </a:extLst>
                 </p:cNvPr>
@@ -5461,7 +5696,7 @@
               </p:nvSpPr>
               <p:spPr>
                 <a:xfrm>
-                  <a:off x="5629581" y="2043451"/>
+                  <a:off x="4960868" y="3567534"/>
                   <a:ext cx="408530" cy="276999"/>
                 </a:xfrm>
                 <a:prstGeom prst="rect">
@@ -5486,7 +5721,7 @@
                           <a:rPr lang="en-AU" sz="1200" b="0" i="1" smtClean="0">
                             <a:latin typeface="Cambria Math" panose="02040503050406030204" pitchFamily="18" charset="0"/>
                           </a:rPr>
-                          <m:t>𝑔</m:t>
+                          <m:t>𝜏</m:t>
                         </m:r>
                       </m:oMath>
                     </m:oMathPara>
@@ -5499,10 +5734,10 @@
           <mc:Fallback>
             <p:sp>
               <p:nvSpPr>
-                <p:cNvPr id="35" name="TextBox 34">
+                <p:cNvPr id="54" name="TextBox 53">
                   <a:extLst>
                     <a:ext uri="{FF2B5EF4-FFF2-40B4-BE49-F238E27FC236}">
-                      <a16:creationId xmlns:a16="http://schemas.microsoft.com/office/drawing/2014/main" id="{4E69C83C-1895-4DAC-BD0D-C9BD5146AF7F}"/>
+                      <a16:creationId xmlns:a16="http://schemas.microsoft.com/office/drawing/2014/main" id="{AF054CAF-975D-4C5B-8BB5-43DC3124A7AB}"/>
                     </a:ext>
                   </a:extLst>
                 </p:cNvPr>
@@ -5513,14 +5748,14 @@
               </p:nvSpPr>
               <p:spPr>
                 <a:xfrm>
-                  <a:off x="5629581" y="2043451"/>
+                  <a:off x="4960868" y="3567534"/>
                   <a:ext cx="408530" cy="276999"/>
                 </a:xfrm>
                 <a:prstGeom prst="rect">
                   <a:avLst/>
                 </a:prstGeom>
                 <a:blipFill>
-                  <a:blip r:embed="rId13"/>
+                  <a:blip r:embed="rId14"/>
                   <a:stretch>
                     <a:fillRect/>
                   </a:stretch>

</xml_diff>

<commit_message>
Backup FYP B Report.
</commit_message>
<xml_diff>
--- a/Report/Figures.pptx
+++ b/Report/Figures.pptx
@@ -6,8 +6,9 @@
   </p:sldMasterIdLst>
   <p:sldIdLst>
     <p:sldId id="256" r:id="rId2"/>
-    <p:sldId id="258" r:id="rId3"/>
-    <p:sldId id="257" r:id="rId4"/>
+    <p:sldId id="259" r:id="rId3"/>
+    <p:sldId id="258" r:id="rId4"/>
+    <p:sldId id="257" r:id="rId5"/>
   </p:sldIdLst>
   <p:sldSz cx="12192000" cy="6858000"/>
   <p:notesSz cx="6858000" cy="9144000"/>
@@ -1445,7 +1446,7 @@
           <a:p>
             <a:fld id="{CD8A8668-38E6-4869-B909-2A20D69E4707}" type="datetimeFigureOut">
               <a:rPr lang="en-AU" smtClean="0"/>
-              <a:t>1/06/2020</a:t>
+              <a:t>12/10/2020</a:t>
             </a:fld>
             <a:endParaRPr lang="en-AU"/>
           </a:p>
@@ -1645,7 +1646,7 @@
           <a:p>
             <a:fld id="{CD8A8668-38E6-4869-B909-2A20D69E4707}" type="datetimeFigureOut">
               <a:rPr lang="en-AU" smtClean="0"/>
-              <a:t>1/06/2020</a:t>
+              <a:t>12/10/2020</a:t>
             </a:fld>
             <a:endParaRPr lang="en-AU"/>
           </a:p>
@@ -1855,7 +1856,7 @@
           <a:p>
             <a:fld id="{CD8A8668-38E6-4869-B909-2A20D69E4707}" type="datetimeFigureOut">
               <a:rPr lang="en-AU" smtClean="0"/>
-              <a:t>1/06/2020</a:t>
+              <a:t>12/10/2020</a:t>
             </a:fld>
             <a:endParaRPr lang="en-AU"/>
           </a:p>
@@ -2055,7 +2056,7 @@
           <a:p>
             <a:fld id="{CD8A8668-38E6-4869-B909-2A20D69E4707}" type="datetimeFigureOut">
               <a:rPr lang="en-AU" smtClean="0"/>
-              <a:t>1/06/2020</a:t>
+              <a:t>12/10/2020</a:t>
             </a:fld>
             <a:endParaRPr lang="en-AU"/>
           </a:p>
@@ -2331,7 +2332,7 @@
           <a:p>
             <a:fld id="{CD8A8668-38E6-4869-B909-2A20D69E4707}" type="datetimeFigureOut">
               <a:rPr lang="en-AU" smtClean="0"/>
-              <a:t>1/06/2020</a:t>
+              <a:t>12/10/2020</a:t>
             </a:fld>
             <a:endParaRPr lang="en-AU"/>
           </a:p>
@@ -2599,7 +2600,7 @@
           <a:p>
             <a:fld id="{CD8A8668-38E6-4869-B909-2A20D69E4707}" type="datetimeFigureOut">
               <a:rPr lang="en-AU" smtClean="0"/>
-              <a:t>1/06/2020</a:t>
+              <a:t>12/10/2020</a:t>
             </a:fld>
             <a:endParaRPr lang="en-AU"/>
           </a:p>
@@ -3014,7 +3015,7 @@
           <a:p>
             <a:fld id="{CD8A8668-38E6-4869-B909-2A20D69E4707}" type="datetimeFigureOut">
               <a:rPr lang="en-AU" smtClean="0"/>
-              <a:t>1/06/2020</a:t>
+              <a:t>12/10/2020</a:t>
             </a:fld>
             <a:endParaRPr lang="en-AU"/>
           </a:p>
@@ -3156,7 +3157,7 @@
           <a:p>
             <a:fld id="{CD8A8668-38E6-4869-B909-2A20D69E4707}" type="datetimeFigureOut">
               <a:rPr lang="en-AU" smtClean="0"/>
-              <a:t>1/06/2020</a:t>
+              <a:t>12/10/2020</a:t>
             </a:fld>
             <a:endParaRPr lang="en-AU"/>
           </a:p>
@@ -3269,7 +3270,7 @@
           <a:p>
             <a:fld id="{CD8A8668-38E6-4869-B909-2A20D69E4707}" type="datetimeFigureOut">
               <a:rPr lang="en-AU" smtClean="0"/>
-              <a:t>1/06/2020</a:t>
+              <a:t>12/10/2020</a:t>
             </a:fld>
             <a:endParaRPr lang="en-AU"/>
           </a:p>
@@ -3582,7 +3583,7 @@
           <a:p>
             <a:fld id="{CD8A8668-38E6-4869-B909-2A20D69E4707}" type="datetimeFigureOut">
               <a:rPr lang="en-AU" smtClean="0"/>
-              <a:t>1/06/2020</a:t>
+              <a:t>12/10/2020</a:t>
             </a:fld>
             <a:endParaRPr lang="en-AU"/>
           </a:p>
@@ -3871,7 +3872,7 @@
           <a:p>
             <a:fld id="{CD8A8668-38E6-4869-B909-2A20D69E4707}" type="datetimeFigureOut">
               <a:rPr lang="en-AU" smtClean="0"/>
-              <a:t>1/06/2020</a:t>
+              <a:t>12/10/2020</a:t>
             </a:fld>
             <a:endParaRPr lang="en-AU"/>
           </a:p>
@@ -4114,7 +4115,7 @@
           <a:p>
             <a:fld id="{CD8A8668-38E6-4869-B909-2A20D69E4707}" type="datetimeFigureOut">
               <a:rPr lang="en-AU" smtClean="0"/>
-              <a:t>1/06/2020</a:t>
+              <a:t>12/10/2020</a:t>
             </a:fld>
             <a:endParaRPr lang="en-AU"/>
           </a:p>
@@ -6992,6 +6993,877 @@
       </p:grpSpPr>
       <p:grpSp>
         <p:nvGrpSpPr>
+          <p:cNvPr id="42" name="Group 41">
+            <a:extLst>
+              <a:ext uri="{FF2B5EF4-FFF2-40B4-BE49-F238E27FC236}">
+                <a16:creationId xmlns:a16="http://schemas.microsoft.com/office/drawing/2014/main" id="{3212F07F-EC0B-45AB-9E8E-1E75FE7054A3}"/>
+              </a:ext>
+            </a:extLst>
+          </p:cNvPr>
+          <p:cNvGrpSpPr/>
+          <p:nvPr/>
+        </p:nvGrpSpPr>
+        <p:grpSpPr>
+          <a:xfrm>
+            <a:off x="3776817" y="1646316"/>
+            <a:ext cx="2033432" cy="1358029"/>
+            <a:chOff x="3776817" y="1646316"/>
+            <a:chExt cx="2033432" cy="1358029"/>
+          </a:xfrm>
+        </p:grpSpPr>
+        <mc:AlternateContent xmlns:mc="http://schemas.openxmlformats.org/markup-compatibility/2006">
+          <mc:Choice xmlns:a14="http://schemas.microsoft.com/office/drawing/2010/main" Requires="a14">
+            <p:sp>
+              <p:nvSpPr>
+                <p:cNvPr id="13" name="TextBox 12">
+                  <a:extLst>
+                    <a:ext uri="{FF2B5EF4-FFF2-40B4-BE49-F238E27FC236}">
+                      <a16:creationId xmlns:a16="http://schemas.microsoft.com/office/drawing/2014/main" id="{B4A0EB81-290E-4740-B1DB-CBCC450ACA69}"/>
+                    </a:ext>
+                  </a:extLst>
+                </p:cNvPr>
+                <p:cNvSpPr txBox="1"/>
+                <p:nvPr/>
+              </p:nvSpPr>
+              <p:spPr>
+                <a:xfrm>
+                  <a:off x="3895617" y="2464345"/>
+                  <a:ext cx="408530" cy="276999"/>
+                </a:xfrm>
+                <a:prstGeom prst="rect">
+                  <a:avLst/>
+                </a:prstGeom>
+                <a:noFill/>
+              </p:spPr>
+              <p:txBody>
+                <a:bodyPr wrap="square" rtlCol="0">
+                  <a:spAutoFit/>
+                </a:bodyPr>
+                <a:lstStyle/>
+                <a:p>
+                  <a:pPr/>
+                  <a14:m>
+                    <m:oMathPara xmlns:m="http://schemas.openxmlformats.org/officeDocument/2006/math">
+                      <m:oMathParaPr>
+                        <m:jc m:val="centerGroup"/>
+                      </m:oMathParaPr>
+                      <m:oMath xmlns:m="http://schemas.openxmlformats.org/officeDocument/2006/math">
+                        <m:r>
+                          <a:rPr lang="en-AU" sz="1200" b="0" i="1" smtClean="0">
+                            <a:latin typeface="Cambria Math" panose="02040503050406030204" pitchFamily="18" charset="0"/>
+                          </a:rPr>
+                          <m:t>𝜏</m:t>
+                        </m:r>
+                      </m:oMath>
+                    </m:oMathPara>
+                  </a14:m>
+                  <a:endParaRPr lang="en-AU" b="0" dirty="0"/>
+                </a:p>
+              </p:txBody>
+            </p:sp>
+          </mc:Choice>
+          <mc:Fallback>
+            <p:sp>
+              <p:nvSpPr>
+                <p:cNvPr id="13" name="TextBox 12">
+                  <a:extLst>
+                    <a:ext uri="{FF2B5EF4-FFF2-40B4-BE49-F238E27FC236}">
+                      <a16:creationId xmlns:a16="http://schemas.microsoft.com/office/drawing/2014/main" id="{B4A0EB81-290E-4740-B1DB-CBCC450ACA69}"/>
+                    </a:ext>
+                  </a:extLst>
+                </p:cNvPr>
+                <p:cNvSpPr txBox="1">
+                  <a:spLocks noRot="1" noChangeAspect="1" noMove="1" noResize="1" noEditPoints="1" noAdjustHandles="1" noChangeArrowheads="1" noChangeShapeType="1" noTextEdit="1"/>
+                </p:cNvSpPr>
+                <p:nvPr/>
+              </p:nvSpPr>
+              <p:spPr>
+                <a:xfrm>
+                  <a:off x="3895617" y="2464345"/>
+                  <a:ext cx="408530" cy="276999"/>
+                </a:xfrm>
+                <a:prstGeom prst="rect">
+                  <a:avLst/>
+                </a:prstGeom>
+                <a:blipFill>
+                  <a:blip r:embed="rId2"/>
+                  <a:stretch>
+                    <a:fillRect/>
+                  </a:stretch>
+                </a:blipFill>
+              </p:spPr>
+              <p:txBody>
+                <a:bodyPr/>
+                <a:lstStyle/>
+                <a:p>
+                  <a:r>
+                    <a:rPr lang="en-AU">
+                      <a:noFill/>
+                    </a:rPr>
+                    <a:t> </a:t>
+                  </a:r>
+                </a:p>
+              </p:txBody>
+            </p:sp>
+          </mc:Fallback>
+        </mc:AlternateContent>
+        <p:sp>
+          <p:nvSpPr>
+            <p:cNvPr id="5" name="Oval 4">
+              <a:extLst>
+                <a:ext uri="{FF2B5EF4-FFF2-40B4-BE49-F238E27FC236}">
+                  <a16:creationId xmlns:a16="http://schemas.microsoft.com/office/drawing/2014/main" id="{CA261D28-E182-473D-B813-949C23C142C9}"/>
+                </a:ext>
+              </a:extLst>
+            </p:cNvPr>
+            <p:cNvSpPr/>
+            <p:nvPr/>
+          </p:nvSpPr>
+          <p:spPr>
+            <a:xfrm>
+              <a:off x="3776817" y="1924345"/>
+              <a:ext cx="1080000" cy="1080000"/>
+            </a:xfrm>
+            <a:prstGeom prst="ellipse">
+              <a:avLst/>
+            </a:prstGeom>
+            <a:noFill/>
+            <a:ln w="28575">
+              <a:solidFill>
+                <a:schemeClr val="tx1"/>
+              </a:solidFill>
+            </a:ln>
+          </p:spPr>
+          <p:style>
+            <a:lnRef idx="2">
+              <a:schemeClr val="accent1">
+                <a:shade val="50000"/>
+              </a:schemeClr>
+            </a:lnRef>
+            <a:fillRef idx="1">
+              <a:schemeClr val="accent1"/>
+            </a:fillRef>
+            <a:effectRef idx="0">
+              <a:schemeClr val="accent1"/>
+            </a:effectRef>
+            <a:fontRef idx="minor">
+              <a:schemeClr val="lt1"/>
+            </a:fontRef>
+          </p:style>
+          <p:txBody>
+            <a:bodyPr rtlCol="0" anchor="ctr"/>
+            <a:lstStyle/>
+            <a:p>
+              <a:pPr algn="ctr"/>
+              <a:endParaRPr lang="en-AU"/>
+            </a:p>
+          </p:txBody>
+        </p:sp>
+        <p:sp>
+          <p:nvSpPr>
+            <p:cNvPr id="7" name="Oval 6">
+              <a:extLst>
+                <a:ext uri="{FF2B5EF4-FFF2-40B4-BE49-F238E27FC236}">
+                  <a16:creationId xmlns:a16="http://schemas.microsoft.com/office/drawing/2014/main" id="{325D926D-9A60-4E64-B0BF-1BC2EFD3DAFC}"/>
+                </a:ext>
+              </a:extLst>
+            </p:cNvPr>
+            <p:cNvSpPr/>
+            <p:nvPr/>
+          </p:nvSpPr>
+          <p:spPr>
+            <a:xfrm>
+              <a:off x="4262817" y="2410345"/>
+              <a:ext cx="108000" cy="108000"/>
+            </a:xfrm>
+            <a:prstGeom prst="ellipse">
+              <a:avLst/>
+            </a:prstGeom>
+            <a:solidFill>
+              <a:schemeClr val="tx1"/>
+            </a:solidFill>
+            <a:ln w="28575">
+              <a:solidFill>
+                <a:schemeClr val="tx1"/>
+              </a:solidFill>
+            </a:ln>
+          </p:spPr>
+          <p:style>
+            <a:lnRef idx="2">
+              <a:schemeClr val="accent1">
+                <a:shade val="50000"/>
+              </a:schemeClr>
+            </a:lnRef>
+            <a:fillRef idx="1">
+              <a:schemeClr val="accent1"/>
+            </a:fillRef>
+            <a:effectRef idx="0">
+              <a:schemeClr val="accent1"/>
+            </a:effectRef>
+            <a:fontRef idx="minor">
+              <a:schemeClr val="lt1"/>
+            </a:fontRef>
+          </p:style>
+          <p:txBody>
+            <a:bodyPr rtlCol="0" anchor="ctr"/>
+            <a:lstStyle/>
+            <a:p>
+              <a:pPr algn="ctr"/>
+              <a:endParaRPr lang="en-AU" dirty="0"/>
+            </a:p>
+          </p:txBody>
+        </p:sp>
+        <mc:AlternateContent xmlns:mc="http://schemas.openxmlformats.org/markup-compatibility/2006">
+          <mc:Choice xmlns:a14="http://schemas.microsoft.com/office/drawing/2010/main" Requires="a14">
+            <p:sp>
+              <p:nvSpPr>
+                <p:cNvPr id="9" name="Rectangle 8">
+                  <a:extLst>
+                    <a:ext uri="{FF2B5EF4-FFF2-40B4-BE49-F238E27FC236}">
+                      <a16:creationId xmlns:a16="http://schemas.microsoft.com/office/drawing/2014/main" id="{D6E4C78C-1CC2-4263-884F-9A1D6A95FB3B}"/>
+                    </a:ext>
+                  </a:extLst>
+                </p:cNvPr>
+                <p:cNvSpPr/>
+                <p:nvPr/>
+              </p:nvSpPr>
+              <p:spPr>
+                <a:xfrm>
+                  <a:off x="3939720" y="1646316"/>
+                  <a:ext cx="728854" cy="307777"/>
+                </a:xfrm>
+                <a:prstGeom prst="rect">
+                  <a:avLst/>
+                </a:prstGeom>
+              </p:spPr>
+              <p:txBody>
+                <a:bodyPr wrap="none">
+                  <a:spAutoFit/>
+                </a:bodyPr>
+                <a:lstStyle/>
+                <a:p>
+                  <a:pPr/>
+                  <a14:m>
+                    <m:oMathPara xmlns:m="http://schemas.openxmlformats.org/officeDocument/2006/math">
+                      <m:oMathParaPr>
+                        <m:jc m:val="centerGroup"/>
+                      </m:oMathParaPr>
+                      <m:oMath xmlns:m="http://schemas.openxmlformats.org/officeDocument/2006/math">
+                        <m:r>
+                          <a:rPr lang="en-AU" sz="1400" b="0" i="1" smtClean="0">
+                            <a:latin typeface="Cambria Math" panose="02040503050406030204" pitchFamily="18" charset="0"/>
+                          </a:rPr>
+                          <m:t>𝑀𝑜𝑡𝑜𝑟</m:t>
+                        </m:r>
+                      </m:oMath>
+                    </m:oMathPara>
+                  </a14:m>
+                  <a:endParaRPr lang="en-AU" dirty="0"/>
+                </a:p>
+              </p:txBody>
+            </p:sp>
+          </mc:Choice>
+          <mc:Fallback>
+            <p:sp>
+              <p:nvSpPr>
+                <p:cNvPr id="9" name="Rectangle 8">
+                  <a:extLst>
+                    <a:ext uri="{FF2B5EF4-FFF2-40B4-BE49-F238E27FC236}">
+                      <a16:creationId xmlns:a16="http://schemas.microsoft.com/office/drawing/2014/main" id="{D6E4C78C-1CC2-4263-884F-9A1D6A95FB3B}"/>
+                    </a:ext>
+                  </a:extLst>
+                </p:cNvPr>
+                <p:cNvSpPr>
+                  <a:spLocks noRot="1" noChangeAspect="1" noMove="1" noResize="1" noEditPoints="1" noAdjustHandles="1" noChangeArrowheads="1" noChangeShapeType="1" noTextEdit="1"/>
+                </p:cNvSpPr>
+                <p:nvPr/>
+              </p:nvSpPr>
+              <p:spPr>
+                <a:xfrm>
+                  <a:off x="3939720" y="1646316"/>
+                  <a:ext cx="728854" cy="307777"/>
+                </a:xfrm>
+                <a:prstGeom prst="rect">
+                  <a:avLst/>
+                </a:prstGeom>
+                <a:blipFill>
+                  <a:blip r:embed="rId3"/>
+                  <a:stretch>
+                    <a:fillRect/>
+                  </a:stretch>
+                </a:blipFill>
+              </p:spPr>
+              <p:txBody>
+                <a:bodyPr/>
+                <a:lstStyle/>
+                <a:p>
+                  <a:r>
+                    <a:rPr lang="en-AU">
+                      <a:noFill/>
+                    </a:rPr>
+                    <a:t> </a:t>
+                  </a:r>
+                </a:p>
+              </p:txBody>
+            </p:sp>
+          </mc:Fallback>
+        </mc:AlternateContent>
+        <p:sp>
+          <p:nvSpPr>
+            <p:cNvPr id="23" name="Arc 22">
+              <a:extLst>
+                <a:ext uri="{FF2B5EF4-FFF2-40B4-BE49-F238E27FC236}">
+                  <a16:creationId xmlns:a16="http://schemas.microsoft.com/office/drawing/2014/main" id="{557D2636-BA57-4A62-8D4D-884E63340D83}"/>
+                </a:ext>
+              </a:extLst>
+            </p:cNvPr>
+            <p:cNvSpPr/>
+            <p:nvPr/>
+          </p:nvSpPr>
+          <p:spPr>
+            <a:xfrm>
+              <a:off x="4144017" y="2291618"/>
+              <a:ext cx="345600" cy="345454"/>
+            </a:xfrm>
+            <a:prstGeom prst="arc">
+              <a:avLst>
+                <a:gd name="adj1" fmla="val 5055781"/>
+                <a:gd name="adj2" fmla="val 15121694"/>
+              </a:avLst>
+            </a:prstGeom>
+            <a:ln w="19050">
+              <a:solidFill>
+                <a:schemeClr val="tx1"/>
+              </a:solidFill>
+              <a:headEnd type="none" w="med" len="med"/>
+              <a:tailEnd type="triangle" w="med" len="med"/>
+            </a:ln>
+          </p:spPr>
+          <p:style>
+            <a:lnRef idx="1">
+              <a:schemeClr val="accent1"/>
+            </a:lnRef>
+            <a:fillRef idx="0">
+              <a:schemeClr val="accent1"/>
+            </a:fillRef>
+            <a:effectRef idx="0">
+              <a:schemeClr val="accent1"/>
+            </a:effectRef>
+            <a:fontRef idx="minor">
+              <a:schemeClr val="tx1"/>
+            </a:fontRef>
+          </p:style>
+          <p:txBody>
+            <a:bodyPr rtlCol="0" anchor="ctr"/>
+            <a:lstStyle/>
+            <a:p>
+              <a:pPr algn="ctr"/>
+              <a:endParaRPr lang="en-AU"/>
+            </a:p>
+          </p:txBody>
+        </p:sp>
+        <p:cxnSp>
+          <p:nvCxnSpPr>
+            <p:cNvPr id="25" name="Straight Connector 24">
+              <a:extLst>
+                <a:ext uri="{FF2B5EF4-FFF2-40B4-BE49-F238E27FC236}">
+                  <a16:creationId xmlns:a16="http://schemas.microsoft.com/office/drawing/2014/main" id="{60D8E63D-2658-4EDD-AE9A-D5CE76296E50}"/>
+                </a:ext>
+              </a:extLst>
+            </p:cNvPr>
+            <p:cNvCxnSpPr>
+              <a:cxnSpLocks/>
+              <a:endCxn id="7" idx="6"/>
+            </p:cNvCxnSpPr>
+            <p:nvPr/>
+          </p:nvCxnSpPr>
+          <p:spPr>
+            <a:xfrm flipH="1">
+              <a:off x="4370817" y="2464345"/>
+              <a:ext cx="1140984" cy="0"/>
+            </a:xfrm>
+            <a:prstGeom prst="line">
+              <a:avLst/>
+            </a:prstGeom>
+            <a:ln w="57150">
+              <a:solidFill>
+                <a:schemeClr val="tx1"/>
+              </a:solidFill>
+            </a:ln>
+          </p:spPr>
+          <p:style>
+            <a:lnRef idx="1">
+              <a:schemeClr val="accent1"/>
+            </a:lnRef>
+            <a:fillRef idx="0">
+              <a:schemeClr val="accent1"/>
+            </a:fillRef>
+            <a:effectRef idx="0">
+              <a:schemeClr val="accent1"/>
+            </a:effectRef>
+            <a:fontRef idx="minor">
+              <a:schemeClr val="tx1"/>
+            </a:fontRef>
+          </p:style>
+        </p:cxnSp>
+        <p:cxnSp>
+          <p:nvCxnSpPr>
+            <p:cNvPr id="28" name="Straight Arrow Connector 27">
+              <a:extLst>
+                <a:ext uri="{FF2B5EF4-FFF2-40B4-BE49-F238E27FC236}">
+                  <a16:creationId xmlns:a16="http://schemas.microsoft.com/office/drawing/2014/main" id="{B8BA578F-73CB-4522-9DF3-4F9A30A049B6}"/>
+                </a:ext>
+              </a:extLst>
+            </p:cNvPr>
+            <p:cNvCxnSpPr/>
+            <p:nvPr/>
+          </p:nvCxnSpPr>
+          <p:spPr>
+            <a:xfrm>
+              <a:off x="5508626" y="2045765"/>
+              <a:ext cx="0" cy="393155"/>
+            </a:xfrm>
+            <a:prstGeom prst="straightConnector1">
+              <a:avLst/>
+            </a:prstGeom>
+            <a:ln w="19050">
+              <a:solidFill>
+                <a:schemeClr val="tx1"/>
+              </a:solidFill>
+              <a:tailEnd type="triangle"/>
+            </a:ln>
+          </p:spPr>
+          <p:style>
+            <a:lnRef idx="1">
+              <a:schemeClr val="accent1"/>
+            </a:lnRef>
+            <a:fillRef idx="0">
+              <a:schemeClr val="accent1"/>
+            </a:fillRef>
+            <a:effectRef idx="0">
+              <a:schemeClr val="accent1"/>
+            </a:effectRef>
+            <a:fontRef idx="minor">
+              <a:schemeClr val="tx1"/>
+            </a:fontRef>
+          </p:style>
+        </p:cxnSp>
+        <mc:AlternateContent xmlns:mc="http://schemas.openxmlformats.org/markup-compatibility/2006">
+          <mc:Choice xmlns:a14="http://schemas.microsoft.com/office/drawing/2010/main" Requires="a14">
+            <p:sp>
+              <p:nvSpPr>
+                <p:cNvPr id="30" name="TextBox 29">
+                  <a:extLst>
+                    <a:ext uri="{FF2B5EF4-FFF2-40B4-BE49-F238E27FC236}">
+                      <a16:creationId xmlns:a16="http://schemas.microsoft.com/office/drawing/2014/main" id="{9BB9C976-A7E9-4E64-A605-113446C6496C}"/>
+                    </a:ext>
+                  </a:extLst>
+                </p:cNvPr>
+                <p:cNvSpPr txBox="1"/>
+                <p:nvPr/>
+              </p:nvSpPr>
+              <p:spPr>
+                <a:xfrm>
+                  <a:off x="5382515" y="2146509"/>
+                  <a:ext cx="408530" cy="276999"/>
+                </a:xfrm>
+                <a:prstGeom prst="rect">
+                  <a:avLst/>
+                </a:prstGeom>
+                <a:noFill/>
+              </p:spPr>
+              <p:txBody>
+                <a:bodyPr wrap="square" rtlCol="0">
+                  <a:spAutoFit/>
+                </a:bodyPr>
+                <a:lstStyle/>
+                <a:p>
+                  <a:pPr/>
+                  <a14:m>
+                    <m:oMathPara xmlns:m="http://schemas.openxmlformats.org/officeDocument/2006/math">
+                      <m:oMathParaPr>
+                        <m:jc m:val="centerGroup"/>
+                      </m:oMathParaPr>
+                      <m:oMath xmlns:m="http://schemas.openxmlformats.org/officeDocument/2006/math">
+                        <m:r>
+                          <a:rPr lang="en-AU" sz="1200" b="0" i="1" smtClean="0">
+                            <a:latin typeface="Cambria Math" panose="02040503050406030204" pitchFamily="18" charset="0"/>
+                          </a:rPr>
+                          <m:t>𝐹</m:t>
+                        </m:r>
+                      </m:oMath>
+                    </m:oMathPara>
+                  </a14:m>
+                  <a:endParaRPr lang="en-AU" sz="1200" b="0" dirty="0"/>
+                </a:p>
+              </p:txBody>
+            </p:sp>
+          </mc:Choice>
+          <mc:Fallback>
+            <p:sp>
+              <p:nvSpPr>
+                <p:cNvPr id="30" name="TextBox 29">
+                  <a:extLst>
+                    <a:ext uri="{FF2B5EF4-FFF2-40B4-BE49-F238E27FC236}">
+                      <a16:creationId xmlns:a16="http://schemas.microsoft.com/office/drawing/2014/main" id="{9BB9C976-A7E9-4E64-A605-113446C6496C}"/>
+                    </a:ext>
+                  </a:extLst>
+                </p:cNvPr>
+                <p:cNvSpPr txBox="1">
+                  <a:spLocks noRot="1" noChangeAspect="1" noMove="1" noResize="1" noEditPoints="1" noAdjustHandles="1" noChangeArrowheads="1" noChangeShapeType="1" noTextEdit="1"/>
+                </p:cNvSpPr>
+                <p:nvPr/>
+              </p:nvSpPr>
+              <p:spPr>
+                <a:xfrm>
+                  <a:off x="5382515" y="2146509"/>
+                  <a:ext cx="408530" cy="276999"/>
+                </a:xfrm>
+                <a:prstGeom prst="rect">
+                  <a:avLst/>
+                </a:prstGeom>
+                <a:blipFill>
+                  <a:blip r:embed="rId4"/>
+                  <a:stretch>
+                    <a:fillRect/>
+                  </a:stretch>
+                </a:blipFill>
+              </p:spPr>
+              <p:txBody>
+                <a:bodyPr/>
+                <a:lstStyle/>
+                <a:p>
+                  <a:r>
+                    <a:rPr lang="en-AU">
+                      <a:noFill/>
+                    </a:rPr>
+                    <a:t> </a:t>
+                  </a:r>
+                </a:p>
+              </p:txBody>
+            </p:sp>
+          </mc:Fallback>
+        </mc:AlternateContent>
+        <mc:AlternateContent xmlns:mc="http://schemas.openxmlformats.org/markup-compatibility/2006">
+          <mc:Choice xmlns:a14="http://schemas.microsoft.com/office/drawing/2010/main" Requires="a14">
+            <p:sp>
+              <p:nvSpPr>
+                <p:cNvPr id="32" name="Rectangle 31">
+                  <a:extLst>
+                    <a:ext uri="{FF2B5EF4-FFF2-40B4-BE49-F238E27FC236}">
+                      <a16:creationId xmlns:a16="http://schemas.microsoft.com/office/drawing/2014/main" id="{AE90BB8E-DB51-4F08-9070-A29A55BEEADD}"/>
+                    </a:ext>
+                  </a:extLst>
+                </p:cNvPr>
+                <p:cNvSpPr/>
+                <p:nvPr/>
+              </p:nvSpPr>
+              <p:spPr>
+                <a:xfrm>
+                  <a:off x="5158339" y="2540075"/>
+                  <a:ext cx="651910" cy="307777"/>
+                </a:xfrm>
+                <a:prstGeom prst="rect">
+                  <a:avLst/>
+                </a:prstGeom>
+              </p:spPr>
+              <p:txBody>
+                <a:bodyPr wrap="none">
+                  <a:spAutoFit/>
+                </a:bodyPr>
+                <a:lstStyle/>
+                <a:p>
+                  <a:pPr/>
+                  <a14:m>
+                    <m:oMathPara xmlns:m="http://schemas.openxmlformats.org/officeDocument/2006/math">
+                      <m:oMathParaPr>
+                        <m:jc m:val="centerGroup"/>
+                      </m:oMathParaPr>
+                      <m:oMath xmlns:m="http://schemas.openxmlformats.org/officeDocument/2006/math">
+                        <m:r>
+                          <a:rPr lang="en-AU" sz="1400" b="0" i="1" smtClean="0">
+                            <a:latin typeface="Cambria Math" panose="02040503050406030204" pitchFamily="18" charset="0"/>
+                          </a:rPr>
+                          <m:t>𝑆𝑐𝑎𝑙𝑒</m:t>
+                        </m:r>
+                      </m:oMath>
+                    </m:oMathPara>
+                  </a14:m>
+                  <a:endParaRPr lang="en-AU" dirty="0"/>
+                </a:p>
+              </p:txBody>
+            </p:sp>
+          </mc:Choice>
+          <mc:Fallback>
+            <p:sp>
+              <p:nvSpPr>
+                <p:cNvPr id="32" name="Rectangle 31">
+                  <a:extLst>
+                    <a:ext uri="{FF2B5EF4-FFF2-40B4-BE49-F238E27FC236}">
+                      <a16:creationId xmlns:a16="http://schemas.microsoft.com/office/drawing/2014/main" id="{AE90BB8E-DB51-4F08-9070-A29A55BEEADD}"/>
+                    </a:ext>
+                  </a:extLst>
+                </p:cNvPr>
+                <p:cNvSpPr>
+                  <a:spLocks noRot="1" noChangeAspect="1" noMove="1" noResize="1" noEditPoints="1" noAdjustHandles="1" noChangeArrowheads="1" noChangeShapeType="1" noTextEdit="1"/>
+                </p:cNvSpPr>
+                <p:nvPr/>
+              </p:nvSpPr>
+              <p:spPr>
+                <a:xfrm>
+                  <a:off x="5158339" y="2540075"/>
+                  <a:ext cx="651910" cy="307777"/>
+                </a:xfrm>
+                <a:prstGeom prst="rect">
+                  <a:avLst/>
+                </a:prstGeom>
+                <a:blipFill>
+                  <a:blip r:embed="rId5"/>
+                  <a:stretch>
+                    <a:fillRect/>
+                  </a:stretch>
+                </a:blipFill>
+              </p:spPr>
+              <p:txBody>
+                <a:bodyPr/>
+                <a:lstStyle/>
+                <a:p>
+                  <a:r>
+                    <a:rPr lang="en-AU">
+                      <a:noFill/>
+                    </a:rPr>
+                    <a:t> </a:t>
+                  </a:r>
+                </a:p>
+              </p:txBody>
+            </p:sp>
+          </mc:Fallback>
+        </mc:AlternateContent>
+        <p:sp>
+          <p:nvSpPr>
+            <p:cNvPr id="33" name="Rectangle 32">
+              <a:extLst>
+                <a:ext uri="{FF2B5EF4-FFF2-40B4-BE49-F238E27FC236}">
+                  <a16:creationId xmlns:a16="http://schemas.microsoft.com/office/drawing/2014/main" id="{15F3304A-11AB-4FCD-BDB6-005CDD256236}"/>
+                </a:ext>
+              </a:extLst>
+            </p:cNvPr>
+            <p:cNvSpPr/>
+            <p:nvPr/>
+          </p:nvSpPr>
+          <p:spPr>
+            <a:xfrm>
+              <a:off x="5162553" y="2547120"/>
+              <a:ext cx="647696" cy="66674"/>
+            </a:xfrm>
+            <a:prstGeom prst="rect">
+              <a:avLst/>
+            </a:prstGeom>
+            <a:solidFill>
+              <a:schemeClr val="tx1"/>
+            </a:solidFill>
+            <a:ln>
+              <a:solidFill>
+                <a:schemeClr val="tx1"/>
+              </a:solidFill>
+            </a:ln>
+          </p:spPr>
+          <p:style>
+            <a:lnRef idx="2">
+              <a:schemeClr val="accent1">
+                <a:shade val="50000"/>
+              </a:schemeClr>
+            </a:lnRef>
+            <a:fillRef idx="1">
+              <a:schemeClr val="accent1"/>
+            </a:fillRef>
+            <a:effectRef idx="0">
+              <a:schemeClr val="accent1"/>
+            </a:effectRef>
+            <a:fontRef idx="minor">
+              <a:schemeClr val="lt1"/>
+            </a:fontRef>
+          </p:style>
+          <p:txBody>
+            <a:bodyPr rtlCol="0" anchor="ctr"/>
+            <a:lstStyle/>
+            <a:p>
+              <a:pPr algn="ctr"/>
+              <a:endParaRPr lang="en-AU"/>
+            </a:p>
+          </p:txBody>
+        </p:sp>
+        <mc:AlternateContent xmlns:mc="http://schemas.openxmlformats.org/markup-compatibility/2006">
+          <mc:Choice xmlns:a14="http://schemas.microsoft.com/office/drawing/2010/main" Requires="a14">
+            <p:sp>
+              <p:nvSpPr>
+                <p:cNvPr id="36" name="Rectangle 35">
+                  <a:extLst>
+                    <a:ext uri="{FF2B5EF4-FFF2-40B4-BE49-F238E27FC236}">
+                      <a16:creationId xmlns:a16="http://schemas.microsoft.com/office/drawing/2014/main" id="{6EC6004A-41D6-469E-A648-DC62C4A8A94B}"/>
+                    </a:ext>
+                  </a:extLst>
+                </p:cNvPr>
+                <p:cNvSpPr/>
+                <p:nvPr/>
+              </p:nvSpPr>
+              <p:spPr>
+                <a:xfrm>
+                  <a:off x="4887636" y="2215638"/>
+                  <a:ext cx="494879" cy="261610"/>
+                </a:xfrm>
+                <a:prstGeom prst="rect">
+                  <a:avLst/>
+                </a:prstGeom>
+              </p:spPr>
+              <p:txBody>
+                <a:bodyPr wrap="none">
+                  <a:spAutoFit/>
+                </a:bodyPr>
+                <a:lstStyle/>
+                <a:p>
+                  <a:pPr/>
+                  <a14:m>
+                    <m:oMathPara xmlns:m="http://schemas.openxmlformats.org/officeDocument/2006/math">
+                      <m:oMathParaPr>
+                        <m:jc m:val="centerGroup"/>
+                      </m:oMathParaPr>
+                      <m:oMath xmlns:m="http://schemas.openxmlformats.org/officeDocument/2006/math">
+                        <m:r>
+                          <a:rPr lang="en-AU" sz="1050" b="0" i="1" smtClean="0">
+                            <a:latin typeface="Cambria Math" panose="02040503050406030204" pitchFamily="18" charset="0"/>
+                          </a:rPr>
+                          <m:t>𝐴𝑟𝑚</m:t>
+                        </m:r>
+                      </m:oMath>
+                    </m:oMathPara>
+                  </a14:m>
+                  <a:endParaRPr lang="en-AU" dirty="0"/>
+                </a:p>
+              </p:txBody>
+            </p:sp>
+          </mc:Choice>
+          <mc:Fallback>
+            <p:sp>
+              <p:nvSpPr>
+                <p:cNvPr id="36" name="Rectangle 35">
+                  <a:extLst>
+                    <a:ext uri="{FF2B5EF4-FFF2-40B4-BE49-F238E27FC236}">
+                      <a16:creationId xmlns:a16="http://schemas.microsoft.com/office/drawing/2014/main" id="{6EC6004A-41D6-469E-A648-DC62C4A8A94B}"/>
+                    </a:ext>
+                  </a:extLst>
+                </p:cNvPr>
+                <p:cNvSpPr>
+                  <a:spLocks noRot="1" noChangeAspect="1" noMove="1" noResize="1" noEditPoints="1" noAdjustHandles="1" noChangeArrowheads="1" noChangeShapeType="1" noTextEdit="1"/>
+                </p:cNvSpPr>
+                <p:nvPr/>
+              </p:nvSpPr>
+              <p:spPr>
+                <a:xfrm>
+                  <a:off x="4887636" y="2215638"/>
+                  <a:ext cx="494879" cy="261610"/>
+                </a:xfrm>
+                <a:prstGeom prst="rect">
+                  <a:avLst/>
+                </a:prstGeom>
+                <a:blipFill>
+                  <a:blip r:embed="rId6"/>
+                  <a:stretch>
+                    <a:fillRect/>
+                  </a:stretch>
+                </a:blipFill>
+              </p:spPr>
+              <p:txBody>
+                <a:bodyPr/>
+                <a:lstStyle/>
+                <a:p>
+                  <a:r>
+                    <a:rPr lang="en-AU">
+                      <a:noFill/>
+                    </a:rPr>
+                    <a:t> </a:t>
+                  </a:r>
+                </a:p>
+              </p:txBody>
+            </p:sp>
+          </mc:Fallback>
+        </mc:AlternateContent>
+        <p:cxnSp>
+          <p:nvCxnSpPr>
+            <p:cNvPr id="37" name="Straight Connector 36">
+              <a:extLst>
+                <a:ext uri="{FF2B5EF4-FFF2-40B4-BE49-F238E27FC236}">
+                  <a16:creationId xmlns:a16="http://schemas.microsoft.com/office/drawing/2014/main" id="{208B38C0-AC62-4CB0-B17B-21E57979DCBF}"/>
+                </a:ext>
+              </a:extLst>
+            </p:cNvPr>
+            <p:cNvCxnSpPr>
+              <a:cxnSpLocks/>
+            </p:cNvCxnSpPr>
+            <p:nvPr/>
+          </p:nvCxnSpPr>
+          <p:spPr>
+            <a:xfrm>
+              <a:off x="5484294" y="2438920"/>
+              <a:ext cx="2108" cy="107431"/>
+            </a:xfrm>
+            <a:prstGeom prst="line">
+              <a:avLst/>
+            </a:prstGeom>
+            <a:ln w="57150">
+              <a:solidFill>
+                <a:schemeClr val="tx1"/>
+              </a:solidFill>
+            </a:ln>
+          </p:spPr>
+          <p:style>
+            <a:lnRef idx="1">
+              <a:schemeClr val="accent1"/>
+            </a:lnRef>
+            <a:fillRef idx="0">
+              <a:schemeClr val="accent1"/>
+            </a:fillRef>
+            <a:effectRef idx="0">
+              <a:schemeClr val="accent1"/>
+            </a:effectRef>
+            <a:fontRef idx="minor">
+              <a:schemeClr val="tx1"/>
+            </a:fontRef>
+          </p:style>
+        </p:cxnSp>
+      </p:grpSp>
+    </p:spTree>
+    <p:extLst>
+      <p:ext uri="{BB962C8B-B14F-4D97-AF65-F5344CB8AC3E}">
+        <p14:creationId xmlns:p14="http://schemas.microsoft.com/office/powerpoint/2010/main" val="2479542886"/>
+      </p:ext>
+    </p:extLst>
+  </p:cSld>
+  <p:clrMapOvr>
+    <a:masterClrMapping/>
+  </p:clrMapOvr>
+</p:sld>
+</file>
+
+<file path=ppt/slides/slide3.xml><?xml version="1.0" encoding="utf-8"?>
+<p:sld xmlns:a="http://schemas.openxmlformats.org/drawingml/2006/main" xmlns:r="http://schemas.openxmlformats.org/officeDocument/2006/relationships" xmlns:p="http://schemas.openxmlformats.org/presentationml/2006/main">
+  <p:cSld>
+    <p:spTree>
+      <p:nvGrpSpPr>
+        <p:cNvPr id="1" name=""/>
+        <p:cNvGrpSpPr/>
+        <p:nvPr/>
+      </p:nvGrpSpPr>
+      <p:grpSpPr>
+        <a:xfrm>
+          <a:off x="0" y="0"/>
+          <a:ext cx="0" cy="0"/>
+          <a:chOff x="0" y="0"/>
+          <a:chExt cx="0" cy="0"/>
+        </a:xfrm>
+      </p:grpSpPr>
+      <p:grpSp>
+        <p:nvGrpSpPr>
           <p:cNvPr id="6" name="Group 5">
             <a:extLst>
               <a:ext uri="{FF2B5EF4-FFF2-40B4-BE49-F238E27FC236}">
@@ -7093,7 +7965,7 @@
 </p:sld>
 </file>
 
-<file path=ppt/slides/slide3.xml><?xml version="1.0" encoding="utf-8"?>
+<file path=ppt/slides/slide4.xml><?xml version="1.0" encoding="utf-8"?>
 <p:sld xmlns:a="http://schemas.openxmlformats.org/drawingml/2006/main" xmlns:r="http://schemas.openxmlformats.org/officeDocument/2006/relationships" xmlns:p="http://schemas.openxmlformats.org/presentationml/2006/main">
   <p:cSld>
     <p:spTree>

</xml_diff>

<commit_message>
Report backup. This isnt how you are supposed to use git.
</commit_message>
<xml_diff>
--- a/Report/Figures.pptx
+++ b/Report/Figures.pptx
@@ -9,6 +9,7 @@
     <p:sldId id="259" r:id="rId3"/>
     <p:sldId id="258" r:id="rId4"/>
     <p:sldId id="257" r:id="rId5"/>
+    <p:sldId id="260" r:id="rId6"/>
   </p:sldIdLst>
   <p:sldSz cx="12192000" cy="6858000"/>
   <p:notesSz cx="6858000" cy="9144000"/>
@@ -1446,7 +1447,7 @@
           <a:p>
             <a:fld id="{CD8A8668-38E6-4869-B909-2A20D69E4707}" type="datetimeFigureOut">
               <a:rPr lang="en-AU" smtClean="0"/>
-              <a:t>12/10/2020</a:t>
+              <a:t>20/10/2020</a:t>
             </a:fld>
             <a:endParaRPr lang="en-AU"/>
           </a:p>
@@ -1646,7 +1647,7 @@
           <a:p>
             <a:fld id="{CD8A8668-38E6-4869-B909-2A20D69E4707}" type="datetimeFigureOut">
               <a:rPr lang="en-AU" smtClean="0"/>
-              <a:t>12/10/2020</a:t>
+              <a:t>20/10/2020</a:t>
             </a:fld>
             <a:endParaRPr lang="en-AU"/>
           </a:p>
@@ -1856,7 +1857,7 @@
           <a:p>
             <a:fld id="{CD8A8668-38E6-4869-B909-2A20D69E4707}" type="datetimeFigureOut">
               <a:rPr lang="en-AU" smtClean="0"/>
-              <a:t>12/10/2020</a:t>
+              <a:t>20/10/2020</a:t>
             </a:fld>
             <a:endParaRPr lang="en-AU"/>
           </a:p>
@@ -2056,7 +2057,7 @@
           <a:p>
             <a:fld id="{CD8A8668-38E6-4869-B909-2A20D69E4707}" type="datetimeFigureOut">
               <a:rPr lang="en-AU" smtClean="0"/>
-              <a:t>12/10/2020</a:t>
+              <a:t>20/10/2020</a:t>
             </a:fld>
             <a:endParaRPr lang="en-AU"/>
           </a:p>
@@ -2332,7 +2333,7 @@
           <a:p>
             <a:fld id="{CD8A8668-38E6-4869-B909-2A20D69E4707}" type="datetimeFigureOut">
               <a:rPr lang="en-AU" smtClean="0"/>
-              <a:t>12/10/2020</a:t>
+              <a:t>20/10/2020</a:t>
             </a:fld>
             <a:endParaRPr lang="en-AU"/>
           </a:p>
@@ -2600,7 +2601,7 @@
           <a:p>
             <a:fld id="{CD8A8668-38E6-4869-B909-2A20D69E4707}" type="datetimeFigureOut">
               <a:rPr lang="en-AU" smtClean="0"/>
-              <a:t>12/10/2020</a:t>
+              <a:t>20/10/2020</a:t>
             </a:fld>
             <a:endParaRPr lang="en-AU"/>
           </a:p>
@@ -3015,7 +3016,7 @@
           <a:p>
             <a:fld id="{CD8A8668-38E6-4869-B909-2A20D69E4707}" type="datetimeFigureOut">
               <a:rPr lang="en-AU" smtClean="0"/>
-              <a:t>12/10/2020</a:t>
+              <a:t>20/10/2020</a:t>
             </a:fld>
             <a:endParaRPr lang="en-AU"/>
           </a:p>
@@ -3157,7 +3158,7 @@
           <a:p>
             <a:fld id="{CD8A8668-38E6-4869-B909-2A20D69E4707}" type="datetimeFigureOut">
               <a:rPr lang="en-AU" smtClean="0"/>
-              <a:t>12/10/2020</a:t>
+              <a:t>20/10/2020</a:t>
             </a:fld>
             <a:endParaRPr lang="en-AU"/>
           </a:p>
@@ -3270,7 +3271,7 @@
           <a:p>
             <a:fld id="{CD8A8668-38E6-4869-B909-2A20D69E4707}" type="datetimeFigureOut">
               <a:rPr lang="en-AU" smtClean="0"/>
-              <a:t>12/10/2020</a:t>
+              <a:t>20/10/2020</a:t>
             </a:fld>
             <a:endParaRPr lang="en-AU"/>
           </a:p>
@@ -3583,7 +3584,7 @@
           <a:p>
             <a:fld id="{CD8A8668-38E6-4869-B909-2A20D69E4707}" type="datetimeFigureOut">
               <a:rPr lang="en-AU" smtClean="0"/>
-              <a:t>12/10/2020</a:t>
+              <a:t>20/10/2020</a:t>
             </a:fld>
             <a:endParaRPr lang="en-AU"/>
           </a:p>
@@ -3872,7 +3873,7 @@
           <a:p>
             <a:fld id="{CD8A8668-38E6-4869-B909-2A20D69E4707}" type="datetimeFigureOut">
               <a:rPr lang="en-AU" smtClean="0"/>
-              <a:t>12/10/2020</a:t>
+              <a:t>20/10/2020</a:t>
             </a:fld>
             <a:endParaRPr lang="en-AU"/>
           </a:p>
@@ -4115,7 +4116,7 @@
           <a:p>
             <a:fld id="{CD8A8668-38E6-4869-B909-2A20D69E4707}" type="datetimeFigureOut">
               <a:rPr lang="en-AU" smtClean="0"/>
-              <a:t>12/10/2020</a:t>
+              <a:t>20/10/2020</a:t>
             </a:fld>
             <a:endParaRPr lang="en-AU"/>
           </a:p>
@@ -7011,8 +7012,8 @@
             <a:chExt cx="2033432" cy="1358029"/>
           </a:xfrm>
         </p:grpSpPr>
-        <mc:AlternateContent xmlns:mc="http://schemas.openxmlformats.org/markup-compatibility/2006">
-          <mc:Choice xmlns:a14="http://schemas.microsoft.com/office/drawing/2010/main" Requires="a14">
+        <mc:AlternateContent xmlns:mc="http://schemas.openxmlformats.org/markup-compatibility/2006" xmlns:a14="http://schemas.microsoft.com/office/drawing/2010/main">
+          <mc:Choice Requires="a14">
             <p:sp>
               <p:nvSpPr>
                 <p:cNvPr id="13" name="TextBox 12">
@@ -7062,7 +7063,7 @@
               </p:txBody>
             </p:sp>
           </mc:Choice>
-          <mc:Fallback>
+          <mc:Fallback xmlns="">
             <p:sp>
               <p:nvSpPr>
                 <p:cNvPr id="13" name="TextBox 12">
@@ -7213,8 +7214,8 @@
             </a:p>
           </p:txBody>
         </p:sp>
-        <mc:AlternateContent xmlns:mc="http://schemas.openxmlformats.org/markup-compatibility/2006">
-          <mc:Choice xmlns:a14="http://schemas.microsoft.com/office/drawing/2010/main" Requires="a14">
+        <mc:AlternateContent xmlns:mc="http://schemas.openxmlformats.org/markup-compatibility/2006" xmlns:a14="http://schemas.microsoft.com/office/drawing/2010/main">
+          <mc:Choice Requires="a14">
             <p:sp>
               <p:nvSpPr>
                 <p:cNvPr id="9" name="Rectangle 8">
@@ -7263,7 +7264,7 @@
               </p:txBody>
             </p:sp>
           </mc:Choice>
-          <mc:Fallback>
+          <mc:Fallback xmlns="">
             <p:sp>
               <p:nvSpPr>
                 <p:cNvPr id="9" name="Rectangle 8">
@@ -7448,8 +7449,8 @@
             </a:fontRef>
           </p:style>
         </p:cxnSp>
-        <mc:AlternateContent xmlns:mc="http://schemas.openxmlformats.org/markup-compatibility/2006">
-          <mc:Choice xmlns:a14="http://schemas.microsoft.com/office/drawing/2010/main" Requires="a14">
+        <mc:AlternateContent xmlns:mc="http://schemas.openxmlformats.org/markup-compatibility/2006" xmlns:a14="http://schemas.microsoft.com/office/drawing/2010/main">
+          <mc:Choice Requires="a14">
             <p:sp>
               <p:nvSpPr>
                 <p:cNvPr id="30" name="TextBox 29">
@@ -7499,7 +7500,7 @@
               </p:txBody>
             </p:sp>
           </mc:Choice>
-          <mc:Fallback>
+          <mc:Fallback xmlns="">
             <p:sp>
               <p:nvSpPr>
                 <p:cNvPr id="30" name="TextBox 29">
@@ -7544,8 +7545,8 @@
             </p:sp>
           </mc:Fallback>
         </mc:AlternateContent>
-        <mc:AlternateContent xmlns:mc="http://schemas.openxmlformats.org/markup-compatibility/2006">
-          <mc:Choice xmlns:a14="http://schemas.microsoft.com/office/drawing/2010/main" Requires="a14">
+        <mc:AlternateContent xmlns:mc="http://schemas.openxmlformats.org/markup-compatibility/2006" xmlns:a14="http://schemas.microsoft.com/office/drawing/2010/main">
+          <mc:Choice Requires="a14">
             <p:sp>
               <p:nvSpPr>
                 <p:cNvPr id="32" name="Rectangle 31">
@@ -7594,7 +7595,7 @@
               </p:txBody>
             </p:sp>
           </mc:Choice>
-          <mc:Fallback>
+          <mc:Fallback xmlns="">
             <p:sp>
               <p:nvSpPr>
                 <p:cNvPr id="32" name="Rectangle 31">
@@ -7693,8 +7694,8 @@
             </a:p>
           </p:txBody>
         </p:sp>
-        <mc:AlternateContent xmlns:mc="http://schemas.openxmlformats.org/markup-compatibility/2006">
-          <mc:Choice xmlns:a14="http://schemas.microsoft.com/office/drawing/2010/main" Requires="a14">
+        <mc:AlternateContent xmlns:mc="http://schemas.openxmlformats.org/markup-compatibility/2006" xmlns:a14="http://schemas.microsoft.com/office/drawing/2010/main">
+          <mc:Choice Requires="a14">
             <p:sp>
               <p:nvSpPr>
                 <p:cNvPr id="36" name="Rectangle 35">
@@ -7743,7 +7744,7 @@
               </p:txBody>
             </p:sp>
           </mc:Choice>
-          <mc:Fallback>
+          <mc:Fallback xmlns="">
             <p:sp>
               <p:nvSpPr>
                 <p:cNvPr id="36" name="Rectangle 35">
@@ -8665,6 +8666,3114 @@
 </p:sld>
 </file>
 
+<file path=ppt/slides/slide5.xml><?xml version="1.0" encoding="utf-8"?>
+<p:sld xmlns:a="http://schemas.openxmlformats.org/drawingml/2006/main" xmlns:r="http://schemas.openxmlformats.org/officeDocument/2006/relationships" xmlns:p="http://schemas.openxmlformats.org/presentationml/2006/main">
+  <p:cSld>
+    <p:spTree>
+      <p:nvGrpSpPr>
+        <p:cNvPr id="1" name=""/>
+        <p:cNvGrpSpPr/>
+        <p:nvPr/>
+      </p:nvGrpSpPr>
+      <p:grpSpPr>
+        <a:xfrm>
+          <a:off x="0" y="0"/>
+          <a:ext cx="0" cy="0"/>
+          <a:chOff x="0" y="0"/>
+          <a:chExt cx="0" cy="0"/>
+        </a:xfrm>
+      </p:grpSpPr>
+      <p:sp>
+        <p:nvSpPr>
+          <p:cNvPr id="45" name="Oval 44">
+            <a:extLst>
+              <a:ext uri="{FF2B5EF4-FFF2-40B4-BE49-F238E27FC236}">
+                <a16:creationId xmlns:a16="http://schemas.microsoft.com/office/drawing/2014/main" id="{5B6524CB-504A-485B-8499-D47A48D33C95}"/>
+              </a:ext>
+            </a:extLst>
+          </p:cNvPr>
+          <p:cNvSpPr/>
+          <p:nvPr/>
+        </p:nvSpPr>
+        <p:spPr>
+          <a:xfrm>
+            <a:off x="9275678" y="1580765"/>
+            <a:ext cx="2160000" cy="2160000"/>
+          </a:xfrm>
+          <a:prstGeom prst="ellipse">
+            <a:avLst/>
+          </a:prstGeom>
+          <a:noFill/>
+          <a:ln w="28575">
+            <a:solidFill>
+              <a:schemeClr val="tx1"/>
+            </a:solidFill>
+          </a:ln>
+        </p:spPr>
+        <p:style>
+          <a:lnRef idx="2">
+            <a:schemeClr val="accent1">
+              <a:shade val="50000"/>
+            </a:schemeClr>
+          </a:lnRef>
+          <a:fillRef idx="1">
+            <a:schemeClr val="accent1"/>
+          </a:fillRef>
+          <a:effectRef idx="0">
+            <a:schemeClr val="accent1"/>
+          </a:effectRef>
+          <a:fontRef idx="minor">
+            <a:schemeClr val="lt1"/>
+          </a:fontRef>
+        </p:style>
+        <p:txBody>
+          <a:bodyPr rtlCol="0" anchor="ctr"/>
+          <a:lstStyle/>
+          <a:p>
+            <a:pPr algn="ctr"/>
+            <a:endParaRPr lang="en-AU"/>
+          </a:p>
+        </p:txBody>
+      </p:sp>
+      <p:sp>
+        <p:nvSpPr>
+          <p:cNvPr id="46" name="Oval 45">
+            <a:extLst>
+              <a:ext uri="{FF2B5EF4-FFF2-40B4-BE49-F238E27FC236}">
+                <a16:creationId xmlns:a16="http://schemas.microsoft.com/office/drawing/2014/main" id="{5CC3F19E-9A35-41D0-9EEB-9884B07E85DB}"/>
+              </a:ext>
+            </a:extLst>
+          </p:cNvPr>
+          <p:cNvSpPr/>
+          <p:nvPr/>
+        </p:nvSpPr>
+        <p:spPr>
+          <a:xfrm>
+            <a:off x="8735678" y="900134"/>
+            <a:ext cx="1080000" cy="1080000"/>
+          </a:xfrm>
+          <a:prstGeom prst="ellipse">
+            <a:avLst/>
+          </a:prstGeom>
+          <a:noFill/>
+          <a:ln w="28575">
+            <a:solidFill>
+              <a:schemeClr val="tx1"/>
+            </a:solidFill>
+          </a:ln>
+        </p:spPr>
+        <p:style>
+          <a:lnRef idx="2">
+            <a:schemeClr val="accent1">
+              <a:shade val="50000"/>
+            </a:schemeClr>
+          </a:lnRef>
+          <a:fillRef idx="1">
+            <a:schemeClr val="accent1"/>
+          </a:fillRef>
+          <a:effectRef idx="0">
+            <a:schemeClr val="accent1"/>
+          </a:effectRef>
+          <a:fontRef idx="minor">
+            <a:schemeClr val="lt1"/>
+          </a:fontRef>
+        </p:style>
+        <p:txBody>
+          <a:bodyPr rtlCol="0" anchor="ctr"/>
+          <a:lstStyle/>
+          <a:p>
+            <a:pPr algn="ctr"/>
+            <a:endParaRPr lang="en-AU"/>
+          </a:p>
+        </p:txBody>
+      </p:sp>
+      <p:cxnSp>
+        <p:nvCxnSpPr>
+          <p:cNvPr id="47" name="Straight Arrow Connector 46">
+            <a:extLst>
+              <a:ext uri="{FF2B5EF4-FFF2-40B4-BE49-F238E27FC236}">
+                <a16:creationId xmlns:a16="http://schemas.microsoft.com/office/drawing/2014/main" id="{78642E04-4E71-4E77-A9E2-101A2552C0C2}"/>
+              </a:ext>
+            </a:extLst>
+          </p:cNvPr>
+          <p:cNvCxnSpPr>
+            <a:cxnSpLocks/>
+            <a:endCxn id="45" idx="7"/>
+          </p:cNvCxnSpPr>
+          <p:nvPr/>
+        </p:nvCxnSpPr>
+        <p:spPr>
+          <a:xfrm flipV="1">
+            <a:off x="10355678" y="1897090"/>
+            <a:ext cx="763675" cy="763676"/>
+          </a:xfrm>
+          <a:prstGeom prst="straightConnector1">
+            <a:avLst/>
+          </a:prstGeom>
+          <a:ln w="19050">
+            <a:solidFill>
+              <a:schemeClr val="tx1"/>
+            </a:solidFill>
+            <a:tailEnd type="triangle"/>
+          </a:ln>
+        </p:spPr>
+        <p:style>
+          <a:lnRef idx="1">
+            <a:schemeClr val="accent2"/>
+          </a:lnRef>
+          <a:fillRef idx="0">
+            <a:schemeClr val="accent2"/>
+          </a:fillRef>
+          <a:effectRef idx="0">
+            <a:schemeClr val="accent2"/>
+          </a:effectRef>
+          <a:fontRef idx="minor">
+            <a:schemeClr val="tx1"/>
+          </a:fontRef>
+        </p:style>
+      </p:cxnSp>
+      <p:cxnSp>
+        <p:nvCxnSpPr>
+          <p:cNvPr id="48" name="Straight Arrow Connector 47">
+            <a:extLst>
+              <a:ext uri="{FF2B5EF4-FFF2-40B4-BE49-F238E27FC236}">
+                <a16:creationId xmlns:a16="http://schemas.microsoft.com/office/drawing/2014/main" id="{662489BF-7C99-4B14-BD41-669B1F87BFB1}"/>
+              </a:ext>
+            </a:extLst>
+          </p:cNvPr>
+          <p:cNvCxnSpPr>
+            <a:cxnSpLocks/>
+            <a:endCxn id="46" idx="7"/>
+          </p:cNvCxnSpPr>
+          <p:nvPr/>
+        </p:nvCxnSpPr>
+        <p:spPr>
+          <a:xfrm flipV="1">
+            <a:off x="9275678" y="1058296"/>
+            <a:ext cx="381838" cy="381838"/>
+          </a:xfrm>
+          <a:prstGeom prst="straightConnector1">
+            <a:avLst/>
+          </a:prstGeom>
+          <a:ln w="19050">
+            <a:solidFill>
+              <a:schemeClr val="tx1"/>
+            </a:solidFill>
+            <a:tailEnd type="triangle"/>
+          </a:ln>
+        </p:spPr>
+        <p:style>
+          <a:lnRef idx="1">
+            <a:schemeClr val="accent2"/>
+          </a:lnRef>
+          <a:fillRef idx="0">
+            <a:schemeClr val="accent2"/>
+          </a:fillRef>
+          <a:effectRef idx="0">
+            <a:schemeClr val="accent2"/>
+          </a:effectRef>
+          <a:fontRef idx="minor">
+            <a:schemeClr val="tx1"/>
+          </a:fontRef>
+        </p:style>
+      </p:cxnSp>
+      <mc:AlternateContent xmlns:mc="http://schemas.openxmlformats.org/markup-compatibility/2006">
+        <mc:Choice xmlns:a14="http://schemas.microsoft.com/office/drawing/2010/main" Requires="a14">
+          <p:sp>
+            <p:nvSpPr>
+              <p:cNvPr id="49" name="TextBox 48">
+                <a:extLst>
+                  <a:ext uri="{FF2B5EF4-FFF2-40B4-BE49-F238E27FC236}">
+                    <a16:creationId xmlns:a16="http://schemas.microsoft.com/office/drawing/2014/main" id="{1E844509-6C84-4B5C-986B-3C4FF15D079B}"/>
+                  </a:ext>
+                </a:extLst>
+              </p:cNvPr>
+              <p:cNvSpPr txBox="1"/>
+              <p:nvPr/>
+            </p:nvSpPr>
+            <p:spPr>
+              <a:xfrm>
+                <a:off x="9381528" y="1116968"/>
+                <a:ext cx="389450" cy="646331"/>
+              </a:xfrm>
+              <a:prstGeom prst="rect">
+                <a:avLst/>
+              </a:prstGeom>
+              <a:noFill/>
+            </p:spPr>
+            <p:txBody>
+              <a:bodyPr wrap="square" rtlCol="0">
+                <a:spAutoFit/>
+              </a:bodyPr>
+              <a:lstStyle/>
+              <a:p>
+                <a:pPr/>
+                <a14:m>
+                  <m:oMathPara xmlns:m="http://schemas.openxmlformats.org/officeDocument/2006/math">
+                    <m:oMathParaPr>
+                      <m:jc m:val="centerGroup"/>
+                    </m:oMathParaPr>
+                    <m:oMath xmlns:m="http://schemas.openxmlformats.org/officeDocument/2006/math">
+                      <m:sSub>
+                        <m:sSubPr>
+                          <m:ctrlPr>
+                            <a:rPr lang="en-AU" b="0" i="1" smtClean="0">
+                              <a:latin typeface="Cambria Math" panose="02040503050406030204" pitchFamily="18" charset="0"/>
+                            </a:rPr>
+                          </m:ctrlPr>
+                        </m:sSubPr>
+                        <m:e>
+                          <m:r>
+                            <a:rPr lang="en-AU" b="0" i="1" smtClean="0">
+                              <a:latin typeface="Cambria Math" panose="02040503050406030204" pitchFamily="18" charset="0"/>
+                            </a:rPr>
+                            <m:t>𝑟</m:t>
+                          </m:r>
+                        </m:e>
+                        <m:sub>
+                          <m:r>
+                            <a:rPr lang="en-AU" b="0" i="1" smtClean="0">
+                              <a:latin typeface="Cambria Math" panose="02040503050406030204" pitchFamily="18" charset="0"/>
+                            </a:rPr>
+                            <m:t>𝑜</m:t>
+                          </m:r>
+                        </m:sub>
+                      </m:sSub>
+                    </m:oMath>
+                  </m:oMathPara>
+                </a14:m>
+                <a:endParaRPr lang="en-AU" b="0" dirty="0"/>
+              </a:p>
+              <a:p>
+                <a:endParaRPr lang="en-AU" dirty="0"/>
+              </a:p>
+            </p:txBody>
+          </p:sp>
+        </mc:Choice>
+        <mc:Fallback>
+          <p:sp>
+            <p:nvSpPr>
+              <p:cNvPr id="49" name="TextBox 48">
+                <a:extLst>
+                  <a:ext uri="{FF2B5EF4-FFF2-40B4-BE49-F238E27FC236}">
+                    <a16:creationId xmlns:a16="http://schemas.microsoft.com/office/drawing/2014/main" id="{1E844509-6C84-4B5C-986B-3C4FF15D079B}"/>
+                  </a:ext>
+                </a:extLst>
+              </p:cNvPr>
+              <p:cNvSpPr txBox="1">
+                <a:spLocks noRot="1" noChangeAspect="1" noMove="1" noResize="1" noEditPoints="1" noAdjustHandles="1" noChangeArrowheads="1" noChangeShapeType="1" noTextEdit="1"/>
+              </p:cNvSpPr>
+              <p:nvPr/>
+            </p:nvSpPr>
+            <p:spPr>
+              <a:xfrm>
+                <a:off x="9381528" y="1116968"/>
+                <a:ext cx="389450" cy="646331"/>
+              </a:xfrm>
+              <a:prstGeom prst="rect">
+                <a:avLst/>
+              </a:prstGeom>
+              <a:blipFill>
+                <a:blip r:embed="rId2"/>
+                <a:stretch>
+                  <a:fillRect/>
+                </a:stretch>
+              </a:blipFill>
+            </p:spPr>
+            <p:txBody>
+              <a:bodyPr/>
+              <a:lstStyle/>
+              <a:p>
+                <a:r>
+                  <a:rPr lang="en-AU">
+                    <a:noFill/>
+                  </a:rPr>
+                  <a:t> </a:t>
+                </a:r>
+              </a:p>
+            </p:txBody>
+          </p:sp>
+        </mc:Fallback>
+      </mc:AlternateContent>
+      <mc:AlternateContent xmlns:mc="http://schemas.openxmlformats.org/markup-compatibility/2006">
+        <mc:Choice xmlns:a14="http://schemas.microsoft.com/office/drawing/2010/main" Requires="a14">
+          <p:sp>
+            <p:nvSpPr>
+              <p:cNvPr id="50" name="TextBox 49">
+                <a:extLst>
+                  <a:ext uri="{FF2B5EF4-FFF2-40B4-BE49-F238E27FC236}">
+                    <a16:creationId xmlns:a16="http://schemas.microsoft.com/office/drawing/2014/main" id="{408DEC2A-F4F5-4E6F-A5B9-0D49FB704674}"/>
+                  </a:ext>
+                </a:extLst>
+              </p:cNvPr>
+              <p:cNvSpPr txBox="1"/>
+              <p:nvPr/>
+            </p:nvSpPr>
+            <p:spPr>
+              <a:xfrm>
+                <a:off x="10665411" y="2155066"/>
+                <a:ext cx="389450" cy="668645"/>
+              </a:xfrm>
+              <a:prstGeom prst="rect">
+                <a:avLst/>
+              </a:prstGeom>
+              <a:noFill/>
+            </p:spPr>
+            <p:txBody>
+              <a:bodyPr wrap="square" rtlCol="0">
+                <a:spAutoFit/>
+              </a:bodyPr>
+              <a:lstStyle/>
+              <a:p>
+                <a:pPr/>
+                <a14:m>
+                  <m:oMathPara xmlns:m="http://schemas.openxmlformats.org/officeDocument/2006/math">
+                    <m:oMathParaPr>
+                      <m:jc m:val="centerGroup"/>
+                    </m:oMathParaPr>
+                    <m:oMath xmlns:m="http://schemas.openxmlformats.org/officeDocument/2006/math">
+                      <m:sSub>
+                        <m:sSubPr>
+                          <m:ctrlPr>
+                            <a:rPr lang="en-AU" b="0" i="1" smtClean="0">
+                              <a:latin typeface="Cambria Math" panose="02040503050406030204" pitchFamily="18" charset="0"/>
+                            </a:rPr>
+                          </m:ctrlPr>
+                        </m:sSubPr>
+                        <m:e>
+                          <m:r>
+                            <a:rPr lang="en-AU" b="0" i="1" smtClean="0">
+                              <a:latin typeface="Cambria Math" panose="02040503050406030204" pitchFamily="18" charset="0"/>
+                            </a:rPr>
+                            <m:t>𝑟</m:t>
+                          </m:r>
+                        </m:e>
+                        <m:sub>
+                          <m:r>
+                            <a:rPr lang="en-AU" b="0" i="1" smtClean="0">
+                              <a:latin typeface="Cambria Math" panose="02040503050406030204" pitchFamily="18" charset="0"/>
+                            </a:rPr>
+                            <m:t>h</m:t>
+                          </m:r>
+                        </m:sub>
+                      </m:sSub>
+                    </m:oMath>
+                  </m:oMathPara>
+                </a14:m>
+                <a:endParaRPr lang="en-AU" b="0" dirty="0"/>
+              </a:p>
+              <a:p>
+                <a:endParaRPr lang="en-AU" dirty="0"/>
+              </a:p>
+            </p:txBody>
+          </p:sp>
+        </mc:Choice>
+        <mc:Fallback>
+          <p:sp>
+            <p:nvSpPr>
+              <p:cNvPr id="50" name="TextBox 49">
+                <a:extLst>
+                  <a:ext uri="{FF2B5EF4-FFF2-40B4-BE49-F238E27FC236}">
+                    <a16:creationId xmlns:a16="http://schemas.microsoft.com/office/drawing/2014/main" id="{408DEC2A-F4F5-4E6F-A5B9-0D49FB704674}"/>
+                  </a:ext>
+                </a:extLst>
+              </p:cNvPr>
+              <p:cNvSpPr txBox="1">
+                <a:spLocks noRot="1" noChangeAspect="1" noMove="1" noResize="1" noEditPoints="1" noAdjustHandles="1" noChangeArrowheads="1" noChangeShapeType="1" noTextEdit="1"/>
+              </p:cNvSpPr>
+              <p:nvPr/>
+            </p:nvSpPr>
+            <p:spPr>
+              <a:xfrm>
+                <a:off x="10665411" y="2155066"/>
+                <a:ext cx="389450" cy="668645"/>
+              </a:xfrm>
+              <a:prstGeom prst="rect">
+                <a:avLst/>
+              </a:prstGeom>
+              <a:blipFill>
+                <a:blip r:embed="rId3"/>
+                <a:stretch>
+                  <a:fillRect/>
+                </a:stretch>
+              </a:blipFill>
+            </p:spPr>
+            <p:txBody>
+              <a:bodyPr/>
+              <a:lstStyle/>
+              <a:p>
+                <a:r>
+                  <a:rPr lang="en-AU">
+                    <a:noFill/>
+                  </a:rPr>
+                  <a:t> </a:t>
+                </a:r>
+              </a:p>
+            </p:txBody>
+          </p:sp>
+        </mc:Fallback>
+      </mc:AlternateContent>
+      <p:grpSp>
+        <p:nvGrpSpPr>
+          <p:cNvPr id="52" name="Group 51">
+            <a:extLst>
+              <a:ext uri="{FF2B5EF4-FFF2-40B4-BE49-F238E27FC236}">
+                <a16:creationId xmlns:a16="http://schemas.microsoft.com/office/drawing/2014/main" id="{42953D69-DA7B-4ED9-8268-973F13E120E7}"/>
+              </a:ext>
+            </a:extLst>
+          </p:cNvPr>
+          <p:cNvGrpSpPr/>
+          <p:nvPr/>
+        </p:nvGrpSpPr>
+        <p:grpSpPr>
+          <a:xfrm>
+            <a:off x="2965142" y="1924345"/>
+            <a:ext cx="4062144" cy="2840631"/>
+            <a:chOff x="2965142" y="1924345"/>
+            <a:chExt cx="4062144" cy="2840631"/>
+          </a:xfrm>
+        </p:grpSpPr>
+        <p:grpSp>
+          <p:nvGrpSpPr>
+            <p:cNvPr id="4" name="Group 3">
+              <a:extLst>
+                <a:ext uri="{FF2B5EF4-FFF2-40B4-BE49-F238E27FC236}">
+                  <a16:creationId xmlns:a16="http://schemas.microsoft.com/office/drawing/2014/main" id="{45DC1CE5-65D4-40FE-B411-A229D41B40E3}"/>
+                </a:ext>
+              </a:extLst>
+            </p:cNvPr>
+            <p:cNvGrpSpPr/>
+            <p:nvPr/>
+          </p:nvGrpSpPr>
+          <p:grpSpPr>
+            <a:xfrm>
+              <a:off x="3261102" y="1924345"/>
+              <a:ext cx="3615238" cy="2840631"/>
+              <a:chOff x="3261102" y="1924345"/>
+              <a:chExt cx="3615238" cy="2840631"/>
+            </a:xfrm>
+          </p:grpSpPr>
+          <p:grpSp>
+            <p:nvGrpSpPr>
+              <p:cNvPr id="5" name="Group 4">
+                <a:extLst>
+                  <a:ext uri="{FF2B5EF4-FFF2-40B4-BE49-F238E27FC236}">
+                    <a16:creationId xmlns:a16="http://schemas.microsoft.com/office/drawing/2014/main" id="{C833531B-8BA0-425C-80E2-B199E4C98EC9}"/>
+                  </a:ext>
+                </a:extLst>
+              </p:cNvPr>
+              <p:cNvGrpSpPr/>
+              <p:nvPr/>
+            </p:nvGrpSpPr>
+            <p:grpSpPr>
+              <a:xfrm>
+                <a:off x="3261102" y="1924345"/>
+                <a:ext cx="3615238" cy="2840631"/>
+                <a:chOff x="3261102" y="1924345"/>
+                <a:chExt cx="3615238" cy="2840631"/>
+              </a:xfrm>
+            </p:grpSpPr>
+            <p:grpSp>
+              <p:nvGrpSpPr>
+                <p:cNvPr id="10" name="Group 9">
+                  <a:extLst>
+                    <a:ext uri="{FF2B5EF4-FFF2-40B4-BE49-F238E27FC236}">
+                      <a16:creationId xmlns:a16="http://schemas.microsoft.com/office/drawing/2014/main" id="{DF03693C-E8D4-4B12-B33F-3935C2C7BD12}"/>
+                    </a:ext>
+                  </a:extLst>
+                </p:cNvPr>
+                <p:cNvGrpSpPr/>
+                <p:nvPr/>
+              </p:nvGrpSpPr>
+              <p:grpSpPr>
+                <a:xfrm>
+                  <a:off x="3261102" y="1924345"/>
+                  <a:ext cx="3615238" cy="2840631"/>
+                  <a:chOff x="3261102" y="1924345"/>
+                  <a:chExt cx="3615238" cy="2840631"/>
+                </a:xfrm>
+              </p:grpSpPr>
+              <p:grpSp>
+                <p:nvGrpSpPr>
+                  <p:cNvPr id="13" name="Group 12">
+                    <a:extLst>
+                      <a:ext uri="{FF2B5EF4-FFF2-40B4-BE49-F238E27FC236}">
+                        <a16:creationId xmlns:a16="http://schemas.microsoft.com/office/drawing/2014/main" id="{297A302F-E07E-4CB7-A262-C1C5BD1DF22A}"/>
+                      </a:ext>
+                    </a:extLst>
+                  </p:cNvPr>
+                  <p:cNvGrpSpPr/>
+                  <p:nvPr/>
+                </p:nvGrpSpPr>
+                <p:grpSpPr>
+                  <a:xfrm>
+                    <a:off x="3776817" y="1924345"/>
+                    <a:ext cx="2700000" cy="2840631"/>
+                    <a:chOff x="3776817" y="1924345"/>
+                    <a:chExt cx="2700000" cy="2840631"/>
+                  </a:xfrm>
+                </p:grpSpPr>
+                <p:sp>
+                  <p:nvSpPr>
+                    <p:cNvPr id="20" name="Oval 19">
+                      <a:extLst>
+                        <a:ext uri="{FF2B5EF4-FFF2-40B4-BE49-F238E27FC236}">
+                          <a16:creationId xmlns:a16="http://schemas.microsoft.com/office/drawing/2014/main" id="{2D95021A-18C5-4427-BD96-7BBED360C63A}"/>
+                        </a:ext>
+                      </a:extLst>
+                    </p:cNvPr>
+                    <p:cNvSpPr/>
+                    <p:nvPr/>
+                  </p:nvSpPr>
+                  <p:spPr>
+                    <a:xfrm>
+                      <a:off x="4316817" y="2604976"/>
+                      <a:ext cx="2160000" cy="2160000"/>
+                    </a:xfrm>
+                    <a:prstGeom prst="ellipse">
+                      <a:avLst/>
+                    </a:prstGeom>
+                    <a:noFill/>
+                    <a:ln w="28575">
+                      <a:solidFill>
+                        <a:schemeClr val="tx1"/>
+                      </a:solidFill>
+                    </a:ln>
+                  </p:spPr>
+                  <p:style>
+                    <a:lnRef idx="2">
+                      <a:schemeClr val="accent1">
+                        <a:shade val="50000"/>
+                      </a:schemeClr>
+                    </a:lnRef>
+                    <a:fillRef idx="1">
+                      <a:schemeClr val="accent1"/>
+                    </a:fillRef>
+                    <a:effectRef idx="0">
+                      <a:schemeClr val="accent1"/>
+                    </a:effectRef>
+                    <a:fontRef idx="minor">
+                      <a:schemeClr val="lt1"/>
+                    </a:fontRef>
+                  </p:style>
+                  <p:txBody>
+                    <a:bodyPr rtlCol="0" anchor="ctr"/>
+                    <a:lstStyle/>
+                    <a:p>
+                      <a:pPr algn="ctr"/>
+                      <a:endParaRPr lang="en-AU"/>
+                    </a:p>
+                  </p:txBody>
+                </p:sp>
+                <p:sp>
+                  <p:nvSpPr>
+                    <p:cNvPr id="21" name="Oval 20">
+                      <a:extLst>
+                        <a:ext uri="{FF2B5EF4-FFF2-40B4-BE49-F238E27FC236}">
+                          <a16:creationId xmlns:a16="http://schemas.microsoft.com/office/drawing/2014/main" id="{68F25723-5D62-42AD-8342-C963C1465D63}"/>
+                        </a:ext>
+                      </a:extLst>
+                    </p:cNvPr>
+                    <p:cNvSpPr/>
+                    <p:nvPr/>
+                  </p:nvSpPr>
+                  <p:spPr>
+                    <a:xfrm>
+                      <a:off x="3776817" y="1924345"/>
+                      <a:ext cx="1080000" cy="1080000"/>
+                    </a:xfrm>
+                    <a:prstGeom prst="ellipse">
+                      <a:avLst/>
+                    </a:prstGeom>
+                    <a:noFill/>
+                    <a:ln w="28575">
+                      <a:solidFill>
+                        <a:schemeClr val="tx1"/>
+                      </a:solidFill>
+                    </a:ln>
+                  </p:spPr>
+                  <p:style>
+                    <a:lnRef idx="2">
+                      <a:schemeClr val="accent1">
+                        <a:shade val="50000"/>
+                      </a:schemeClr>
+                    </a:lnRef>
+                    <a:fillRef idx="1">
+                      <a:schemeClr val="accent1"/>
+                    </a:fillRef>
+                    <a:effectRef idx="0">
+                      <a:schemeClr val="accent1"/>
+                    </a:effectRef>
+                    <a:fontRef idx="minor">
+                      <a:schemeClr val="lt1"/>
+                    </a:fontRef>
+                  </p:style>
+                  <p:txBody>
+                    <a:bodyPr rtlCol="0" anchor="ctr"/>
+                    <a:lstStyle/>
+                    <a:p>
+                      <a:pPr algn="ctr"/>
+                      <a:endParaRPr lang="en-AU"/>
+                    </a:p>
+                  </p:txBody>
+                </p:sp>
+                <p:cxnSp>
+                  <p:nvCxnSpPr>
+                    <p:cNvPr id="22" name="Straight Connector 21">
+                      <a:extLst>
+                        <a:ext uri="{FF2B5EF4-FFF2-40B4-BE49-F238E27FC236}">
+                          <a16:creationId xmlns:a16="http://schemas.microsoft.com/office/drawing/2014/main" id="{469B61B2-CC3B-4A9F-AB20-04BA68E1BE79}"/>
+                        </a:ext>
+                      </a:extLst>
+                    </p:cNvPr>
+                    <p:cNvCxnSpPr>
+                      <a:cxnSpLocks/>
+                    </p:cNvCxnSpPr>
+                    <p:nvPr/>
+                  </p:nvCxnSpPr>
+                  <p:spPr>
+                    <a:xfrm>
+                      <a:off x="5396817" y="2184400"/>
+                      <a:ext cx="0" cy="1496600"/>
+                    </a:xfrm>
+                    <a:prstGeom prst="line">
+                      <a:avLst/>
+                    </a:prstGeom>
+                    <a:ln w="12700">
+                      <a:solidFill>
+                        <a:schemeClr val="tx1"/>
+                      </a:solidFill>
+                      <a:prstDash val="dash"/>
+                    </a:ln>
+                  </p:spPr>
+                  <p:style>
+                    <a:lnRef idx="1">
+                      <a:schemeClr val="accent1"/>
+                    </a:lnRef>
+                    <a:fillRef idx="0">
+                      <a:schemeClr val="accent1"/>
+                    </a:fillRef>
+                    <a:effectRef idx="0">
+                      <a:schemeClr val="accent1"/>
+                    </a:effectRef>
+                    <a:fontRef idx="minor">
+                      <a:schemeClr val="tx1"/>
+                    </a:fontRef>
+                  </p:style>
+                </p:cxnSp>
+                <p:cxnSp>
+                  <p:nvCxnSpPr>
+                    <p:cNvPr id="23" name="Straight Arrow Connector 22">
+                      <a:extLst>
+                        <a:ext uri="{FF2B5EF4-FFF2-40B4-BE49-F238E27FC236}">
+                          <a16:creationId xmlns:a16="http://schemas.microsoft.com/office/drawing/2014/main" id="{0137EBE8-8884-47DD-9518-70E956A7550D}"/>
+                        </a:ext>
+                      </a:extLst>
+                    </p:cNvPr>
+                    <p:cNvCxnSpPr>
+                      <a:cxnSpLocks/>
+                    </p:cNvCxnSpPr>
+                    <p:nvPr/>
+                  </p:nvCxnSpPr>
+                  <p:spPr>
+                    <a:xfrm flipV="1">
+                      <a:off x="5396817" y="2977116"/>
+                      <a:ext cx="0" cy="720000"/>
+                    </a:xfrm>
+                    <a:prstGeom prst="straightConnector1">
+                      <a:avLst/>
+                    </a:prstGeom>
+                    <a:ln w="19050">
+                      <a:solidFill>
+                        <a:schemeClr val="tx1"/>
+                      </a:solidFill>
+                      <a:tailEnd type="triangle"/>
+                    </a:ln>
+                  </p:spPr>
+                  <p:style>
+                    <a:lnRef idx="1">
+                      <a:schemeClr val="accent2"/>
+                    </a:lnRef>
+                    <a:fillRef idx="0">
+                      <a:schemeClr val="accent2"/>
+                    </a:fillRef>
+                    <a:effectRef idx="0">
+                      <a:schemeClr val="accent2"/>
+                    </a:effectRef>
+                    <a:fontRef idx="minor">
+                      <a:schemeClr val="tx1"/>
+                    </a:fontRef>
+                  </p:style>
+                </p:cxnSp>
+                <p:cxnSp>
+                  <p:nvCxnSpPr>
+                    <p:cNvPr id="24" name="Straight Arrow Connector 23">
+                      <a:extLst>
+                        <a:ext uri="{FF2B5EF4-FFF2-40B4-BE49-F238E27FC236}">
+                          <a16:creationId xmlns:a16="http://schemas.microsoft.com/office/drawing/2014/main" id="{D1B41BE2-2DD9-4C8A-BCBC-6CE8632A23E2}"/>
+                        </a:ext>
+                      </a:extLst>
+                    </p:cNvPr>
+                    <p:cNvCxnSpPr>
+                      <a:cxnSpLocks/>
+                    </p:cNvCxnSpPr>
+                    <p:nvPr/>
+                  </p:nvCxnSpPr>
+                  <p:spPr>
+                    <a:xfrm>
+                      <a:off x="5396817" y="3684976"/>
+                      <a:ext cx="720000" cy="0"/>
+                    </a:xfrm>
+                    <a:prstGeom prst="straightConnector1">
+                      <a:avLst/>
+                    </a:prstGeom>
+                    <a:ln w="19050">
+                      <a:solidFill>
+                        <a:schemeClr val="tx1"/>
+                      </a:solidFill>
+                      <a:tailEnd type="triangle"/>
+                    </a:ln>
+                  </p:spPr>
+                  <p:style>
+                    <a:lnRef idx="1">
+                      <a:schemeClr val="accent2"/>
+                    </a:lnRef>
+                    <a:fillRef idx="0">
+                      <a:schemeClr val="accent2"/>
+                    </a:fillRef>
+                    <a:effectRef idx="0">
+                      <a:schemeClr val="accent2"/>
+                    </a:effectRef>
+                    <a:fontRef idx="minor">
+                      <a:schemeClr val="tx1"/>
+                    </a:fontRef>
+                  </p:style>
+                </p:cxnSp>
+                <p:cxnSp>
+                  <p:nvCxnSpPr>
+                    <p:cNvPr id="25" name="Straight Arrow Connector 24">
+                      <a:extLst>
+                        <a:ext uri="{FF2B5EF4-FFF2-40B4-BE49-F238E27FC236}">
+                          <a16:creationId xmlns:a16="http://schemas.microsoft.com/office/drawing/2014/main" id="{A1907320-52A2-495C-8BBC-08C4671046D3}"/>
+                        </a:ext>
+                      </a:extLst>
+                    </p:cNvPr>
+                    <p:cNvCxnSpPr>
+                      <a:cxnSpLocks/>
+                    </p:cNvCxnSpPr>
+                    <p:nvPr/>
+                  </p:nvCxnSpPr>
+                  <p:spPr>
+                    <a:xfrm flipH="1" flipV="1">
+                      <a:off x="5145087" y="3004345"/>
+                      <a:ext cx="252000" cy="684000"/>
+                    </a:xfrm>
+                    <a:prstGeom prst="straightConnector1">
+                      <a:avLst/>
+                    </a:prstGeom>
+                    <a:ln w="19050">
+                      <a:solidFill>
+                        <a:schemeClr val="tx1"/>
+                      </a:solidFill>
+                      <a:tailEnd type="triangle"/>
+                    </a:ln>
+                  </p:spPr>
+                  <p:style>
+                    <a:lnRef idx="1">
+                      <a:schemeClr val="accent2"/>
+                    </a:lnRef>
+                    <a:fillRef idx="0">
+                      <a:schemeClr val="accent2"/>
+                    </a:fillRef>
+                    <a:effectRef idx="0">
+                      <a:schemeClr val="accent2"/>
+                    </a:effectRef>
+                    <a:fontRef idx="minor">
+                      <a:schemeClr val="tx1"/>
+                    </a:fontRef>
+                  </p:style>
+                </p:cxnSp>
+                <p:cxnSp>
+                  <p:nvCxnSpPr>
+                    <p:cNvPr id="26" name="Straight Arrow Connector 25">
+                      <a:extLst>
+                        <a:ext uri="{FF2B5EF4-FFF2-40B4-BE49-F238E27FC236}">
+                          <a16:creationId xmlns:a16="http://schemas.microsoft.com/office/drawing/2014/main" id="{36A6DF05-21D1-4395-BDBD-1AED30703E60}"/>
+                        </a:ext>
+                      </a:extLst>
+                    </p:cNvPr>
+                    <p:cNvCxnSpPr>
+                      <a:cxnSpLocks/>
+                    </p:cNvCxnSpPr>
+                    <p:nvPr/>
+                  </p:nvCxnSpPr>
+                  <p:spPr>
+                    <a:xfrm flipV="1">
+                      <a:off x="5396816" y="3429000"/>
+                      <a:ext cx="639653" cy="252000"/>
+                    </a:xfrm>
+                    <a:prstGeom prst="straightConnector1">
+                      <a:avLst/>
+                    </a:prstGeom>
+                    <a:ln w="19050">
+                      <a:solidFill>
+                        <a:schemeClr val="tx1"/>
+                      </a:solidFill>
+                      <a:tailEnd type="triangle"/>
+                    </a:ln>
+                  </p:spPr>
+                  <p:style>
+                    <a:lnRef idx="1">
+                      <a:schemeClr val="accent2"/>
+                    </a:lnRef>
+                    <a:fillRef idx="0">
+                      <a:schemeClr val="accent2"/>
+                    </a:fillRef>
+                    <a:effectRef idx="0">
+                      <a:schemeClr val="accent2"/>
+                    </a:effectRef>
+                    <a:fontRef idx="minor">
+                      <a:schemeClr val="tx1"/>
+                    </a:fontRef>
+                  </p:style>
+                </p:cxnSp>
+                <p:cxnSp>
+                  <p:nvCxnSpPr>
+                    <p:cNvPr id="27" name="Straight Connector 26">
+                      <a:extLst>
+                        <a:ext uri="{FF2B5EF4-FFF2-40B4-BE49-F238E27FC236}">
+                          <a16:creationId xmlns:a16="http://schemas.microsoft.com/office/drawing/2014/main" id="{D1939D98-4ECC-4A24-A275-E392BEC2902A}"/>
+                        </a:ext>
+                      </a:extLst>
+                    </p:cNvPr>
+                    <p:cNvCxnSpPr>
+                      <a:cxnSpLocks/>
+                    </p:cNvCxnSpPr>
+                    <p:nvPr/>
+                  </p:nvCxnSpPr>
+                  <p:spPr>
+                    <a:xfrm flipH="1" flipV="1">
+                      <a:off x="4321698" y="2470293"/>
+                      <a:ext cx="1075119" cy="1220320"/>
+                    </a:xfrm>
+                    <a:prstGeom prst="line">
+                      <a:avLst/>
+                    </a:prstGeom>
+                    <a:ln w="12700">
+                      <a:solidFill>
+                        <a:schemeClr val="tx1"/>
+                      </a:solidFill>
+                      <a:prstDash val="dash"/>
+                    </a:ln>
+                  </p:spPr>
+                  <p:style>
+                    <a:lnRef idx="1">
+                      <a:schemeClr val="accent1"/>
+                    </a:lnRef>
+                    <a:fillRef idx="0">
+                      <a:schemeClr val="accent1"/>
+                    </a:fillRef>
+                    <a:effectRef idx="0">
+                      <a:schemeClr val="accent1"/>
+                    </a:effectRef>
+                    <a:fontRef idx="minor">
+                      <a:schemeClr val="tx1"/>
+                    </a:fontRef>
+                  </p:style>
+                </p:cxnSp>
+                <p:cxnSp>
+                  <p:nvCxnSpPr>
+                    <p:cNvPr id="28" name="Straight Arrow Connector 27">
+                      <a:extLst>
+                        <a:ext uri="{FF2B5EF4-FFF2-40B4-BE49-F238E27FC236}">
+                          <a16:creationId xmlns:a16="http://schemas.microsoft.com/office/drawing/2014/main" id="{FF4B15A1-0D81-4E37-BB6C-EEE6AE5D00CD}"/>
+                        </a:ext>
+                      </a:extLst>
+                    </p:cNvPr>
+                    <p:cNvCxnSpPr>
+                      <a:cxnSpLocks/>
+                    </p:cNvCxnSpPr>
+                    <p:nvPr/>
+                  </p:nvCxnSpPr>
+                  <p:spPr>
+                    <a:xfrm>
+                      <a:off x="4309540" y="2464345"/>
+                      <a:ext cx="360000" cy="0"/>
+                    </a:xfrm>
+                    <a:prstGeom prst="straightConnector1">
+                      <a:avLst/>
+                    </a:prstGeom>
+                    <a:ln w="19050">
+                      <a:solidFill>
+                        <a:schemeClr val="tx1"/>
+                      </a:solidFill>
+                      <a:tailEnd type="triangle"/>
+                    </a:ln>
+                  </p:spPr>
+                  <p:style>
+                    <a:lnRef idx="1">
+                      <a:schemeClr val="accent2"/>
+                    </a:lnRef>
+                    <a:fillRef idx="0">
+                      <a:schemeClr val="accent2"/>
+                    </a:fillRef>
+                    <a:effectRef idx="0">
+                      <a:schemeClr val="accent2"/>
+                    </a:effectRef>
+                    <a:fontRef idx="minor">
+                      <a:schemeClr val="tx1"/>
+                    </a:fontRef>
+                  </p:style>
+                </p:cxnSp>
+                <p:cxnSp>
+                  <p:nvCxnSpPr>
+                    <p:cNvPr id="29" name="Straight Arrow Connector 28">
+                      <a:extLst>
+                        <a:ext uri="{FF2B5EF4-FFF2-40B4-BE49-F238E27FC236}">
+                          <a16:creationId xmlns:a16="http://schemas.microsoft.com/office/drawing/2014/main" id="{326A9D65-AEFF-4EB3-8419-92B2866B4C57}"/>
+                        </a:ext>
+                      </a:extLst>
+                    </p:cNvPr>
+                    <p:cNvCxnSpPr>
+                      <a:cxnSpLocks/>
+                    </p:cNvCxnSpPr>
+                    <p:nvPr/>
+                  </p:nvCxnSpPr>
+                  <p:spPr>
+                    <a:xfrm flipV="1">
+                      <a:off x="4318541" y="2104345"/>
+                      <a:ext cx="0" cy="360000"/>
+                    </a:xfrm>
+                    <a:prstGeom prst="straightConnector1">
+                      <a:avLst/>
+                    </a:prstGeom>
+                    <a:ln w="19050">
+                      <a:solidFill>
+                        <a:schemeClr val="tx1"/>
+                      </a:solidFill>
+                      <a:tailEnd type="triangle"/>
+                    </a:ln>
+                  </p:spPr>
+                  <p:style>
+                    <a:lnRef idx="1">
+                      <a:schemeClr val="accent2"/>
+                    </a:lnRef>
+                    <a:fillRef idx="0">
+                      <a:schemeClr val="accent2"/>
+                    </a:fillRef>
+                    <a:effectRef idx="0">
+                      <a:schemeClr val="accent2"/>
+                    </a:effectRef>
+                    <a:fontRef idx="minor">
+                      <a:schemeClr val="tx1"/>
+                    </a:fontRef>
+                  </p:style>
+                </p:cxnSp>
+                <p:sp>
+                  <p:nvSpPr>
+                    <p:cNvPr id="30" name="Arc 29">
+                      <a:extLst>
+                        <a:ext uri="{FF2B5EF4-FFF2-40B4-BE49-F238E27FC236}">
+                          <a16:creationId xmlns:a16="http://schemas.microsoft.com/office/drawing/2014/main" id="{D97495DC-6B8E-47C0-8BF5-BFEEBD315CDC}"/>
+                        </a:ext>
+                      </a:extLst>
+                    </p:cNvPr>
+                    <p:cNvSpPr/>
+                    <p:nvPr/>
+                  </p:nvSpPr>
+                  <p:spPr>
+                    <a:xfrm rot="16200000">
+                      <a:off x="4136414" y="2271010"/>
+                      <a:ext cx="360000" cy="360000"/>
+                    </a:xfrm>
+                    <a:prstGeom prst="arc">
+                      <a:avLst>
+                        <a:gd name="adj1" fmla="val 13567190"/>
+                        <a:gd name="adj2" fmla="val 0"/>
+                      </a:avLst>
+                    </a:prstGeom>
+                    <a:ln w="9525">
+                      <a:solidFill>
+                        <a:schemeClr val="tx1"/>
+                      </a:solidFill>
+                    </a:ln>
+                  </p:spPr>
+                  <p:style>
+                    <a:lnRef idx="1">
+                      <a:schemeClr val="accent1"/>
+                    </a:lnRef>
+                    <a:fillRef idx="0">
+                      <a:schemeClr val="accent1"/>
+                    </a:fillRef>
+                    <a:effectRef idx="0">
+                      <a:schemeClr val="accent1"/>
+                    </a:effectRef>
+                    <a:fontRef idx="minor">
+                      <a:schemeClr val="tx1"/>
+                    </a:fontRef>
+                  </p:style>
+                  <p:txBody>
+                    <a:bodyPr rtlCol="0" anchor="ctr"/>
+                    <a:lstStyle/>
+                    <a:p>
+                      <a:pPr algn="ctr"/>
+                      <a:endParaRPr lang="en-AU"/>
+                    </a:p>
+                  </p:txBody>
+                </p:sp>
+                <p:cxnSp>
+                  <p:nvCxnSpPr>
+                    <p:cNvPr id="31" name="Straight Connector 30">
+                      <a:extLst>
+                        <a:ext uri="{FF2B5EF4-FFF2-40B4-BE49-F238E27FC236}">
+                          <a16:creationId xmlns:a16="http://schemas.microsoft.com/office/drawing/2014/main" id="{7CE634B2-BA90-4A27-918B-6518CF0A3A60}"/>
+                        </a:ext>
+                      </a:extLst>
+                    </p:cNvPr>
+                    <p:cNvCxnSpPr>
+                      <a:cxnSpLocks/>
+                      <a:stCxn id="21" idx="3"/>
+                    </p:cNvCxnSpPr>
+                    <p:nvPr/>
+                  </p:nvCxnSpPr>
+                  <p:spPr>
+                    <a:xfrm flipV="1">
+                      <a:off x="3934979" y="2451011"/>
+                      <a:ext cx="379981" cy="395172"/>
+                    </a:xfrm>
+                    <a:prstGeom prst="line">
+                      <a:avLst/>
+                    </a:prstGeom>
+                    <a:ln w="12700">
+                      <a:solidFill>
+                        <a:schemeClr val="tx1"/>
+                      </a:solidFill>
+                      <a:prstDash val="dash"/>
+                    </a:ln>
+                  </p:spPr>
+                  <p:style>
+                    <a:lnRef idx="1">
+                      <a:schemeClr val="accent1"/>
+                    </a:lnRef>
+                    <a:fillRef idx="0">
+                      <a:schemeClr val="accent1"/>
+                    </a:fillRef>
+                    <a:effectRef idx="0">
+                      <a:schemeClr val="accent1"/>
+                    </a:effectRef>
+                    <a:fontRef idx="minor">
+                      <a:schemeClr val="tx1"/>
+                    </a:fontRef>
+                  </p:style>
+                </p:cxnSp>
+                <p:sp>
+                  <p:nvSpPr>
+                    <p:cNvPr id="32" name="Arc 31">
+                      <a:extLst>
+                        <a:ext uri="{FF2B5EF4-FFF2-40B4-BE49-F238E27FC236}">
+                          <a16:creationId xmlns:a16="http://schemas.microsoft.com/office/drawing/2014/main" id="{099A062E-5B08-4A5E-B13D-48AB9C4391EA}"/>
+                        </a:ext>
+                      </a:extLst>
+                    </p:cNvPr>
+                    <p:cNvSpPr/>
+                    <p:nvPr/>
+                  </p:nvSpPr>
+                  <p:spPr>
+                    <a:xfrm rot="16200000">
+                      <a:off x="5286560" y="3069028"/>
+                      <a:ext cx="220244" cy="360000"/>
+                    </a:xfrm>
+                    <a:prstGeom prst="arc">
+                      <a:avLst>
+                        <a:gd name="adj1" fmla="val 16933107"/>
+                        <a:gd name="adj2" fmla="val 0"/>
+                      </a:avLst>
+                    </a:prstGeom>
+                    <a:ln w="9525">
+                      <a:solidFill>
+                        <a:schemeClr val="tx1"/>
+                      </a:solidFill>
+                    </a:ln>
+                  </p:spPr>
+                  <p:style>
+                    <a:lnRef idx="1">
+                      <a:schemeClr val="accent1"/>
+                    </a:lnRef>
+                    <a:fillRef idx="0">
+                      <a:schemeClr val="accent1"/>
+                    </a:fillRef>
+                    <a:effectRef idx="0">
+                      <a:schemeClr val="accent1"/>
+                    </a:effectRef>
+                    <a:fontRef idx="minor">
+                      <a:schemeClr val="tx1"/>
+                    </a:fontRef>
+                  </p:style>
+                  <p:txBody>
+                    <a:bodyPr rtlCol="0" anchor="ctr"/>
+                    <a:lstStyle/>
+                    <a:p>
+                      <a:pPr algn="ctr"/>
+                      <a:endParaRPr lang="en-AU"/>
+                    </a:p>
+                  </p:txBody>
+                </p:sp>
+                <p:sp>
+                  <p:nvSpPr>
+                    <p:cNvPr id="33" name="Arc 32">
+                      <a:extLst>
+                        <a:ext uri="{FF2B5EF4-FFF2-40B4-BE49-F238E27FC236}">
+                          <a16:creationId xmlns:a16="http://schemas.microsoft.com/office/drawing/2014/main" id="{35BC139B-04CE-493B-8F1C-F1F468EC4CDA}"/>
+                        </a:ext>
+                      </a:extLst>
+                    </p:cNvPr>
+                    <p:cNvSpPr/>
+                    <p:nvPr/>
+                  </p:nvSpPr>
+                  <p:spPr>
+                    <a:xfrm rot="16200000">
+                      <a:off x="5178502" y="3287776"/>
+                      <a:ext cx="360000" cy="426830"/>
+                    </a:xfrm>
+                    <a:prstGeom prst="arc">
+                      <a:avLst>
+                        <a:gd name="adj1" fmla="val 17446248"/>
+                        <a:gd name="adj2" fmla="val 874469"/>
+                      </a:avLst>
+                    </a:prstGeom>
+                    <a:ln w="9525">
+                      <a:solidFill>
+                        <a:schemeClr val="tx1"/>
+                      </a:solidFill>
+                    </a:ln>
+                  </p:spPr>
+                  <p:style>
+                    <a:lnRef idx="1">
+                      <a:schemeClr val="accent1"/>
+                    </a:lnRef>
+                    <a:fillRef idx="0">
+                      <a:schemeClr val="accent1"/>
+                    </a:fillRef>
+                    <a:effectRef idx="0">
+                      <a:schemeClr val="accent1"/>
+                    </a:effectRef>
+                    <a:fontRef idx="minor">
+                      <a:schemeClr val="tx1"/>
+                    </a:fontRef>
+                  </p:style>
+                  <p:txBody>
+                    <a:bodyPr rtlCol="0" anchor="ctr"/>
+                    <a:lstStyle/>
+                    <a:p>
+                      <a:pPr algn="ctr"/>
+                      <a:endParaRPr lang="en-AU"/>
+                    </a:p>
+                  </p:txBody>
+                </p:sp>
+                <p:sp>
+                  <p:nvSpPr>
+                    <p:cNvPr id="34" name="Arc 33">
+                      <a:extLst>
+                        <a:ext uri="{FF2B5EF4-FFF2-40B4-BE49-F238E27FC236}">
+                          <a16:creationId xmlns:a16="http://schemas.microsoft.com/office/drawing/2014/main" id="{DD4746FD-3A3B-433B-A37E-0A733A5D23BA}"/>
+                        </a:ext>
+                      </a:extLst>
+                    </p:cNvPr>
+                    <p:cNvSpPr/>
+                    <p:nvPr/>
+                  </p:nvSpPr>
+                  <p:spPr>
+                    <a:xfrm rot="16200000">
+                      <a:off x="5178501" y="2999079"/>
+                      <a:ext cx="360002" cy="639653"/>
+                    </a:xfrm>
+                    <a:prstGeom prst="arc">
+                      <a:avLst>
+                        <a:gd name="adj1" fmla="val 16568432"/>
+                        <a:gd name="adj2" fmla="val 18942459"/>
+                      </a:avLst>
+                    </a:prstGeom>
+                    <a:ln w="9525">
+                      <a:solidFill>
+                        <a:schemeClr val="tx1"/>
+                      </a:solidFill>
+                    </a:ln>
+                  </p:spPr>
+                  <p:style>
+                    <a:lnRef idx="1">
+                      <a:schemeClr val="accent1"/>
+                    </a:lnRef>
+                    <a:fillRef idx="0">
+                      <a:schemeClr val="accent1"/>
+                    </a:fillRef>
+                    <a:effectRef idx="0">
+                      <a:schemeClr val="accent1"/>
+                    </a:effectRef>
+                    <a:fontRef idx="minor">
+                      <a:schemeClr val="tx1"/>
+                    </a:fontRef>
+                  </p:style>
+                  <p:txBody>
+                    <a:bodyPr rtlCol="0" anchor="ctr"/>
+                    <a:lstStyle/>
+                    <a:p>
+                      <a:pPr algn="ctr"/>
+                      <a:endParaRPr lang="en-AU"/>
+                    </a:p>
+                  </p:txBody>
+                </p:sp>
+                <mc:AlternateContent xmlns:mc="http://schemas.openxmlformats.org/markup-compatibility/2006" xmlns:a14="http://schemas.microsoft.com/office/drawing/2010/main">
+                  <mc:Choice Requires="a14">
+                    <p:sp>
+                      <p:nvSpPr>
+                        <p:cNvPr id="35" name="TextBox 34">
+                          <a:extLst>
+                            <a:ext uri="{FF2B5EF4-FFF2-40B4-BE49-F238E27FC236}">
+                              <a16:creationId xmlns:a16="http://schemas.microsoft.com/office/drawing/2014/main" id="{E0C60844-396B-462C-8B2C-92BE31A63CEB}"/>
+                            </a:ext>
+                          </a:extLst>
+                        </p:cNvPr>
+                        <p:cNvSpPr txBox="1"/>
+                        <p:nvPr/>
+                      </p:nvSpPr>
+                      <p:spPr>
+                        <a:xfrm>
+                          <a:off x="5956366" y="3601764"/>
+                          <a:ext cx="346377" cy="338554"/>
+                        </a:xfrm>
+                        <a:prstGeom prst="rect">
+                          <a:avLst/>
+                        </a:prstGeom>
+                        <a:noFill/>
+                      </p:spPr>
+                      <p:txBody>
+                        <a:bodyPr wrap="none" rtlCol="0">
+                          <a:spAutoFit/>
+                        </a:bodyPr>
+                        <a:lstStyle/>
+                        <a:p>
+                          <a:pPr/>
+                          <a14:m>
+                            <m:oMathPara xmlns:m="http://schemas.openxmlformats.org/officeDocument/2006/math">
+                              <m:oMathParaPr>
+                                <m:jc m:val="centerGroup"/>
+                              </m:oMathParaPr>
+                              <m:oMath xmlns:m="http://schemas.openxmlformats.org/officeDocument/2006/math">
+                                <m:r>
+                                  <a:rPr lang="en-AU" sz="1600" b="0" i="1" smtClean="0">
+                                    <a:latin typeface="Cambria Math" panose="02040503050406030204" pitchFamily="18" charset="0"/>
+                                  </a:rPr>
+                                  <m:t>𝑥</m:t>
+                                </m:r>
+                              </m:oMath>
+                            </m:oMathPara>
+                          </a14:m>
+                          <a:endParaRPr lang="en-AU" dirty="0"/>
+                        </a:p>
+                      </p:txBody>
+                    </p:sp>
+                  </mc:Choice>
+                  <mc:Fallback xmlns="">
+                    <p:sp>
+                      <p:nvSpPr>
+                        <p:cNvPr id="63" name="TextBox 62">
+                          <a:extLst>
+                            <a:ext uri="{FF2B5EF4-FFF2-40B4-BE49-F238E27FC236}">
+                              <a16:creationId xmlns:a16="http://schemas.microsoft.com/office/drawing/2014/main" id="{2FE38C87-8474-4333-81E2-0464DB00274B}"/>
+                            </a:ext>
+                          </a:extLst>
+                        </p:cNvPr>
+                        <p:cNvSpPr txBox="1">
+                          <a:spLocks noRot="1" noChangeAspect="1" noMove="1" noResize="1" noEditPoints="1" noAdjustHandles="1" noChangeArrowheads="1" noChangeShapeType="1" noTextEdit="1"/>
+                        </p:cNvSpPr>
+                        <p:nvPr/>
+                      </p:nvSpPr>
+                      <p:spPr>
+                        <a:xfrm>
+                          <a:off x="5956366" y="3601764"/>
+                          <a:ext cx="346377" cy="338554"/>
+                        </a:xfrm>
+                        <a:prstGeom prst="rect">
+                          <a:avLst/>
+                        </a:prstGeom>
+                        <a:blipFill>
+                          <a:blip r:embed="rId4"/>
+                          <a:stretch>
+                            <a:fillRect/>
+                          </a:stretch>
+                        </a:blipFill>
+                      </p:spPr>
+                      <p:txBody>
+                        <a:bodyPr/>
+                        <a:lstStyle/>
+                        <a:p>
+                          <a:r>
+                            <a:rPr lang="en-AU">
+                              <a:noFill/>
+                            </a:rPr>
+                            <a:t> </a:t>
+                          </a:r>
+                        </a:p>
+                      </p:txBody>
+                    </p:sp>
+                  </mc:Fallback>
+                </mc:AlternateContent>
+                <mc:AlternateContent xmlns:mc="http://schemas.openxmlformats.org/markup-compatibility/2006" xmlns:a14="http://schemas.microsoft.com/office/drawing/2010/main">
+                  <mc:Choice Requires="a14">
+                    <p:sp>
+                      <p:nvSpPr>
+                        <p:cNvPr id="36" name="TextBox 35">
+                          <a:extLst>
+                            <a:ext uri="{FF2B5EF4-FFF2-40B4-BE49-F238E27FC236}">
+                              <a16:creationId xmlns:a16="http://schemas.microsoft.com/office/drawing/2014/main" id="{EC969124-9AAA-46BB-9460-2B5ECC9C7E3B}"/>
+                            </a:ext>
+                          </a:extLst>
+                        </p:cNvPr>
+                        <p:cNvSpPr txBox="1"/>
+                        <p:nvPr/>
+                      </p:nvSpPr>
+                      <p:spPr>
+                        <a:xfrm>
+                          <a:off x="5345258" y="2708146"/>
+                          <a:ext cx="350096" cy="338554"/>
+                        </a:xfrm>
+                        <a:prstGeom prst="rect">
+                          <a:avLst/>
+                        </a:prstGeom>
+                        <a:noFill/>
+                      </p:spPr>
+                      <p:txBody>
+                        <a:bodyPr wrap="none" rtlCol="0">
+                          <a:spAutoFit/>
+                        </a:bodyPr>
+                        <a:lstStyle/>
+                        <a:p>
+                          <a:pPr/>
+                          <a14:m>
+                            <m:oMathPara xmlns:m="http://schemas.openxmlformats.org/officeDocument/2006/math">
+                              <m:oMathParaPr>
+                                <m:jc m:val="centerGroup"/>
+                              </m:oMathParaPr>
+                              <m:oMath xmlns:m="http://schemas.openxmlformats.org/officeDocument/2006/math">
+                                <m:r>
+                                  <a:rPr lang="en-AU" sz="1600" b="0" i="1" smtClean="0">
+                                    <a:latin typeface="Cambria Math" panose="02040503050406030204" pitchFamily="18" charset="0"/>
+                                  </a:rPr>
+                                  <m:t>𝑦</m:t>
+                                </m:r>
+                              </m:oMath>
+                            </m:oMathPara>
+                          </a14:m>
+                          <a:endParaRPr lang="en-AU" dirty="0"/>
+                        </a:p>
+                      </p:txBody>
+                    </p:sp>
+                  </mc:Choice>
+                  <mc:Fallback xmlns="">
+                    <p:sp>
+                      <p:nvSpPr>
+                        <p:cNvPr id="64" name="TextBox 63">
+                          <a:extLst>
+                            <a:ext uri="{FF2B5EF4-FFF2-40B4-BE49-F238E27FC236}">
+                              <a16:creationId xmlns:a16="http://schemas.microsoft.com/office/drawing/2014/main" id="{EA195DC6-89F2-49A4-A4FE-7B322F18B49D}"/>
+                            </a:ext>
+                          </a:extLst>
+                        </p:cNvPr>
+                        <p:cNvSpPr txBox="1">
+                          <a:spLocks noRot="1" noChangeAspect="1" noMove="1" noResize="1" noEditPoints="1" noAdjustHandles="1" noChangeArrowheads="1" noChangeShapeType="1" noTextEdit="1"/>
+                        </p:cNvSpPr>
+                        <p:nvPr/>
+                      </p:nvSpPr>
+                      <p:spPr>
+                        <a:xfrm>
+                          <a:off x="5345258" y="2708146"/>
+                          <a:ext cx="350096" cy="338554"/>
+                        </a:xfrm>
+                        <a:prstGeom prst="rect">
+                          <a:avLst/>
+                        </a:prstGeom>
+                        <a:blipFill>
+                          <a:blip r:embed="rId5"/>
+                          <a:stretch>
+                            <a:fillRect b="-3571"/>
+                          </a:stretch>
+                        </a:blipFill>
+                      </p:spPr>
+                      <p:txBody>
+                        <a:bodyPr/>
+                        <a:lstStyle/>
+                        <a:p>
+                          <a:r>
+                            <a:rPr lang="en-AU">
+                              <a:noFill/>
+                            </a:rPr>
+                            <a:t> </a:t>
+                          </a:r>
+                        </a:p>
+                      </p:txBody>
+                    </p:sp>
+                  </mc:Fallback>
+                </mc:AlternateContent>
+                <mc:AlternateContent xmlns:mc="http://schemas.openxmlformats.org/markup-compatibility/2006" xmlns:a14="http://schemas.microsoft.com/office/drawing/2010/main">
+                  <mc:Choice Requires="a14">
+                    <p:sp>
+                      <p:nvSpPr>
+                        <p:cNvPr id="37" name="TextBox 36">
+                          <a:extLst>
+                            <a:ext uri="{FF2B5EF4-FFF2-40B4-BE49-F238E27FC236}">
+                              <a16:creationId xmlns:a16="http://schemas.microsoft.com/office/drawing/2014/main" id="{AE8442E1-AF93-4A33-A685-55B112DA6314}"/>
+                            </a:ext>
+                          </a:extLst>
+                        </p:cNvPr>
+                        <p:cNvSpPr txBox="1"/>
+                        <p:nvPr/>
+                      </p:nvSpPr>
+                      <p:spPr>
+                        <a:xfrm>
+                          <a:off x="4864756" y="3286288"/>
+                          <a:ext cx="389450" cy="307777"/>
+                        </a:xfrm>
+                        <a:prstGeom prst="rect">
+                          <a:avLst/>
+                        </a:prstGeom>
+                        <a:noFill/>
+                      </p:spPr>
+                      <p:txBody>
+                        <a:bodyPr wrap="square" rtlCol="0">
+                          <a:spAutoFit/>
+                        </a:bodyPr>
+                        <a:lstStyle/>
+                        <a:p>
+                          <a:pPr/>
+                          <a14:m>
+                            <m:oMathPara xmlns:m="http://schemas.openxmlformats.org/officeDocument/2006/math">
+                              <m:oMathParaPr>
+                                <m:jc m:val="centerGroup"/>
+                              </m:oMathParaPr>
+                              <m:oMath xmlns:m="http://schemas.openxmlformats.org/officeDocument/2006/math">
+                                <m:r>
+                                  <a:rPr lang="en-AU" sz="1400" b="0" i="1" smtClean="0">
+                                    <a:latin typeface="Cambria Math" panose="02040503050406030204" pitchFamily="18" charset="0"/>
+                                  </a:rPr>
+                                  <m:t>𝜙</m:t>
+                                </m:r>
+                              </m:oMath>
+                            </m:oMathPara>
+                          </a14:m>
+                          <a:endParaRPr lang="en-AU" dirty="0"/>
+                        </a:p>
+                      </p:txBody>
+                    </p:sp>
+                  </mc:Choice>
+                  <mc:Fallback xmlns="">
+                    <p:sp>
+                      <p:nvSpPr>
+                        <p:cNvPr id="66" name="TextBox 65">
+                          <a:extLst>
+                            <a:ext uri="{FF2B5EF4-FFF2-40B4-BE49-F238E27FC236}">
+                              <a16:creationId xmlns:a16="http://schemas.microsoft.com/office/drawing/2014/main" id="{5BE0F2DE-DFC6-4419-BF4C-393642AF27F6}"/>
+                            </a:ext>
+                          </a:extLst>
+                        </p:cNvPr>
+                        <p:cNvSpPr txBox="1">
+                          <a:spLocks noRot="1" noChangeAspect="1" noMove="1" noResize="1" noEditPoints="1" noAdjustHandles="1" noChangeArrowheads="1" noChangeShapeType="1" noTextEdit="1"/>
+                        </p:cNvSpPr>
+                        <p:nvPr/>
+                      </p:nvSpPr>
+                      <p:spPr>
+                        <a:xfrm>
+                          <a:off x="4864756" y="3286288"/>
+                          <a:ext cx="389450" cy="307777"/>
+                        </a:xfrm>
+                        <a:prstGeom prst="rect">
+                          <a:avLst/>
+                        </a:prstGeom>
+                        <a:blipFill>
+                          <a:blip r:embed="rId6"/>
+                          <a:stretch>
+                            <a:fillRect b="-5882"/>
+                          </a:stretch>
+                        </a:blipFill>
+                      </p:spPr>
+                      <p:txBody>
+                        <a:bodyPr/>
+                        <a:lstStyle/>
+                        <a:p>
+                          <a:r>
+                            <a:rPr lang="en-AU">
+                              <a:noFill/>
+                            </a:rPr>
+                            <a:t> </a:t>
+                          </a:r>
+                        </a:p>
+                      </p:txBody>
+                    </p:sp>
+                  </mc:Fallback>
+                </mc:AlternateContent>
+                <mc:AlternateContent xmlns:mc="http://schemas.openxmlformats.org/markup-compatibility/2006" xmlns:a14="http://schemas.microsoft.com/office/drawing/2010/main">
+                  <mc:Choice Requires="a14">
+                    <p:sp>
+                      <p:nvSpPr>
+                        <p:cNvPr id="38" name="TextBox 37">
+                          <a:extLst>
+                            <a:ext uri="{FF2B5EF4-FFF2-40B4-BE49-F238E27FC236}">
+                              <a16:creationId xmlns:a16="http://schemas.microsoft.com/office/drawing/2014/main" id="{0507FCC9-41CC-4BB1-8D49-D077860CD9CB}"/>
+                            </a:ext>
+                          </a:extLst>
+                        </p:cNvPr>
+                        <p:cNvSpPr txBox="1"/>
+                        <p:nvPr/>
+                      </p:nvSpPr>
+                      <p:spPr>
+                        <a:xfrm>
+                          <a:off x="4881912" y="2977681"/>
+                          <a:ext cx="389450" cy="307777"/>
+                        </a:xfrm>
+                        <a:prstGeom prst="rect">
+                          <a:avLst/>
+                        </a:prstGeom>
+                        <a:noFill/>
+                      </p:spPr>
+                      <p:txBody>
+                        <a:bodyPr wrap="square" rtlCol="0">
+                          <a:spAutoFit/>
+                        </a:bodyPr>
+                        <a:lstStyle/>
+                        <a:p>
+                          <a:pPr/>
+                          <a14:m>
+                            <m:oMathPara xmlns:m="http://schemas.openxmlformats.org/officeDocument/2006/math">
+                              <m:oMathParaPr>
+                                <m:jc m:val="centerGroup"/>
+                              </m:oMathParaPr>
+                              <m:oMath xmlns:m="http://schemas.openxmlformats.org/officeDocument/2006/math">
+                                <m:r>
+                                  <a:rPr lang="en-AU" sz="1400" b="0" i="1" smtClean="0">
+                                    <a:latin typeface="Cambria Math" panose="02040503050406030204" pitchFamily="18" charset="0"/>
+                                  </a:rPr>
+                                  <m:t>𝛾</m:t>
+                                </m:r>
+                              </m:oMath>
+                            </m:oMathPara>
+                          </a14:m>
+                          <a:endParaRPr lang="en-AU" dirty="0"/>
+                        </a:p>
+                      </p:txBody>
+                    </p:sp>
+                  </mc:Choice>
+                  <mc:Fallback xmlns="">
+                    <p:sp>
+                      <p:nvSpPr>
+                        <p:cNvPr id="67" name="TextBox 66">
+                          <a:extLst>
+                            <a:ext uri="{FF2B5EF4-FFF2-40B4-BE49-F238E27FC236}">
+                              <a16:creationId xmlns:a16="http://schemas.microsoft.com/office/drawing/2014/main" id="{70EF0D0B-FAC3-4F4B-87EF-326D4B48B4FA}"/>
+                            </a:ext>
+                          </a:extLst>
+                        </p:cNvPr>
+                        <p:cNvSpPr txBox="1">
+                          <a:spLocks noRot="1" noChangeAspect="1" noMove="1" noResize="1" noEditPoints="1" noAdjustHandles="1" noChangeArrowheads="1" noChangeShapeType="1" noTextEdit="1"/>
+                        </p:cNvSpPr>
+                        <p:nvPr/>
+                      </p:nvSpPr>
+                      <p:spPr>
+                        <a:xfrm>
+                          <a:off x="4881912" y="2977681"/>
+                          <a:ext cx="389450" cy="307777"/>
+                        </a:xfrm>
+                        <a:prstGeom prst="rect">
+                          <a:avLst/>
+                        </a:prstGeom>
+                        <a:blipFill>
+                          <a:blip r:embed="rId7"/>
+                          <a:stretch>
+                            <a:fillRect/>
+                          </a:stretch>
+                        </a:blipFill>
+                      </p:spPr>
+                      <p:txBody>
+                        <a:bodyPr/>
+                        <a:lstStyle/>
+                        <a:p>
+                          <a:r>
+                            <a:rPr lang="en-AU">
+                              <a:noFill/>
+                            </a:rPr>
+                            <a:t> </a:t>
+                          </a:r>
+                        </a:p>
+                      </p:txBody>
+                    </p:sp>
+                  </mc:Fallback>
+                </mc:AlternateContent>
+                <mc:AlternateContent xmlns:mc="http://schemas.openxmlformats.org/markup-compatibility/2006" xmlns:a14="http://schemas.microsoft.com/office/drawing/2010/main">
+                  <mc:Choice Requires="a14">
+                    <p:sp>
+                      <p:nvSpPr>
+                        <p:cNvPr id="39" name="TextBox 38">
+                          <a:extLst>
+                            <a:ext uri="{FF2B5EF4-FFF2-40B4-BE49-F238E27FC236}">
+                              <a16:creationId xmlns:a16="http://schemas.microsoft.com/office/drawing/2014/main" id="{F4FCAB55-22C4-40C9-BA6E-77B8F9BB23FA}"/>
+                            </a:ext>
+                          </a:extLst>
+                        </p:cNvPr>
+                        <p:cNvSpPr txBox="1"/>
+                        <p:nvPr/>
+                      </p:nvSpPr>
+                      <p:spPr>
+                        <a:xfrm>
+                          <a:off x="5097165" y="2916255"/>
+                          <a:ext cx="389450" cy="307777"/>
+                        </a:xfrm>
+                        <a:prstGeom prst="rect">
+                          <a:avLst/>
+                        </a:prstGeom>
+                        <a:noFill/>
+                      </p:spPr>
+                      <p:txBody>
+                        <a:bodyPr wrap="square" rtlCol="0">
+                          <a:spAutoFit/>
+                        </a:bodyPr>
+                        <a:lstStyle/>
+                        <a:p>
+                          <a:pPr/>
+                          <a14:m>
+                            <m:oMathPara xmlns:m="http://schemas.openxmlformats.org/officeDocument/2006/math">
+                              <m:oMathParaPr>
+                                <m:jc m:val="centerGroup"/>
+                              </m:oMathParaPr>
+                              <m:oMath xmlns:m="http://schemas.openxmlformats.org/officeDocument/2006/math">
+                                <m:r>
+                                  <a:rPr lang="en-AU" sz="1400" b="0" i="1" smtClean="0">
+                                    <a:latin typeface="Cambria Math" panose="02040503050406030204" pitchFamily="18" charset="0"/>
+                                  </a:rPr>
+                                  <m:t>𝜃</m:t>
+                                </m:r>
+                              </m:oMath>
+                            </m:oMathPara>
+                          </a14:m>
+                          <a:endParaRPr lang="en-AU" dirty="0"/>
+                        </a:p>
+                      </p:txBody>
+                    </p:sp>
+                  </mc:Choice>
+                  <mc:Fallback xmlns="">
+                    <p:sp>
+                      <p:nvSpPr>
+                        <p:cNvPr id="68" name="TextBox 67">
+                          <a:extLst>
+                            <a:ext uri="{FF2B5EF4-FFF2-40B4-BE49-F238E27FC236}">
+                              <a16:creationId xmlns:a16="http://schemas.microsoft.com/office/drawing/2014/main" id="{4E263CEE-EC74-43BD-A9D6-1EA2165CFB3C}"/>
+                            </a:ext>
+                          </a:extLst>
+                        </p:cNvPr>
+                        <p:cNvSpPr txBox="1">
+                          <a:spLocks noRot="1" noChangeAspect="1" noMove="1" noResize="1" noEditPoints="1" noAdjustHandles="1" noChangeArrowheads="1" noChangeShapeType="1" noTextEdit="1"/>
+                        </p:cNvSpPr>
+                        <p:nvPr/>
+                      </p:nvSpPr>
+                      <p:spPr>
+                        <a:xfrm>
+                          <a:off x="5097165" y="2916255"/>
+                          <a:ext cx="389450" cy="307777"/>
+                        </a:xfrm>
+                        <a:prstGeom prst="rect">
+                          <a:avLst/>
+                        </a:prstGeom>
+                        <a:blipFill>
+                          <a:blip r:embed="rId8"/>
+                          <a:stretch>
+                            <a:fillRect/>
+                          </a:stretch>
+                        </a:blipFill>
+                      </p:spPr>
+                      <p:txBody>
+                        <a:bodyPr/>
+                        <a:lstStyle/>
+                        <a:p>
+                          <a:r>
+                            <a:rPr lang="en-AU">
+                              <a:noFill/>
+                            </a:rPr>
+                            <a:t> </a:t>
+                          </a:r>
+                        </a:p>
+                      </p:txBody>
+                    </p:sp>
+                  </mc:Fallback>
+                </mc:AlternateContent>
+                <mc:AlternateContent xmlns:mc="http://schemas.openxmlformats.org/markup-compatibility/2006" xmlns:a14="http://schemas.microsoft.com/office/drawing/2010/main">
+                  <mc:Choice Requires="a14">
+                    <p:sp>
+                      <p:nvSpPr>
+                        <p:cNvPr id="40" name="TextBox 39">
+                          <a:extLst>
+                            <a:ext uri="{FF2B5EF4-FFF2-40B4-BE49-F238E27FC236}">
+                              <a16:creationId xmlns:a16="http://schemas.microsoft.com/office/drawing/2014/main" id="{B9E676C9-8395-4972-95EC-09A77995DE85}"/>
+                            </a:ext>
+                          </a:extLst>
+                        </p:cNvPr>
+                        <p:cNvSpPr txBox="1"/>
+                        <p:nvPr/>
+                      </p:nvSpPr>
+                      <p:spPr>
+                        <a:xfrm>
+                          <a:off x="3864506" y="2196033"/>
+                          <a:ext cx="389450" cy="307777"/>
+                        </a:xfrm>
+                        <a:prstGeom prst="rect">
+                          <a:avLst/>
+                        </a:prstGeom>
+                        <a:noFill/>
+                      </p:spPr>
+                      <p:txBody>
+                        <a:bodyPr wrap="square" rtlCol="0">
+                          <a:spAutoFit/>
+                        </a:bodyPr>
+                        <a:lstStyle/>
+                        <a:p>
+                          <a:pPr/>
+                          <a14:m>
+                            <m:oMathPara xmlns:m="http://schemas.openxmlformats.org/officeDocument/2006/math">
+                              <m:oMathParaPr>
+                                <m:jc m:val="centerGroup"/>
+                              </m:oMathParaPr>
+                              <m:oMath xmlns:m="http://schemas.openxmlformats.org/officeDocument/2006/math">
+                                <m:r>
+                                  <a:rPr lang="en-AU" sz="1400" b="0" i="1" smtClean="0">
+                                    <a:latin typeface="Cambria Math" panose="02040503050406030204" pitchFamily="18" charset="0"/>
+                                  </a:rPr>
+                                  <m:t>𝛼</m:t>
+                                </m:r>
+                              </m:oMath>
+                            </m:oMathPara>
+                          </a14:m>
+                          <a:endParaRPr lang="en-AU" dirty="0"/>
+                        </a:p>
+                      </p:txBody>
+                    </p:sp>
+                  </mc:Choice>
+                  <mc:Fallback xmlns="">
+                    <p:sp>
+                      <p:nvSpPr>
+                        <p:cNvPr id="69" name="TextBox 68">
+                          <a:extLst>
+                            <a:ext uri="{FF2B5EF4-FFF2-40B4-BE49-F238E27FC236}">
+                              <a16:creationId xmlns:a16="http://schemas.microsoft.com/office/drawing/2014/main" id="{899A26F7-590C-40B3-A04B-4EC2CD070BE6}"/>
+                            </a:ext>
+                          </a:extLst>
+                        </p:cNvPr>
+                        <p:cNvSpPr txBox="1">
+                          <a:spLocks noRot="1" noChangeAspect="1" noMove="1" noResize="1" noEditPoints="1" noAdjustHandles="1" noChangeArrowheads="1" noChangeShapeType="1" noTextEdit="1"/>
+                        </p:cNvSpPr>
+                        <p:nvPr/>
+                      </p:nvSpPr>
+                      <p:spPr>
+                        <a:xfrm>
+                          <a:off x="3864506" y="2196033"/>
+                          <a:ext cx="389450" cy="307777"/>
+                        </a:xfrm>
+                        <a:prstGeom prst="rect">
+                          <a:avLst/>
+                        </a:prstGeom>
+                        <a:blipFill>
+                          <a:blip r:embed="rId9"/>
+                          <a:stretch>
+                            <a:fillRect/>
+                          </a:stretch>
+                        </a:blipFill>
+                      </p:spPr>
+                      <p:txBody>
+                        <a:bodyPr/>
+                        <a:lstStyle/>
+                        <a:p>
+                          <a:r>
+                            <a:rPr lang="en-AU">
+                              <a:noFill/>
+                            </a:rPr>
+                            <a:t> </a:t>
+                          </a:r>
+                        </a:p>
+                      </p:txBody>
+                    </p:sp>
+                  </mc:Fallback>
+                </mc:AlternateContent>
+                <mc:AlternateContent xmlns:mc="http://schemas.openxmlformats.org/markup-compatibility/2006" xmlns:a14="http://schemas.microsoft.com/office/drawing/2010/main">
+                  <mc:Choice Requires="a14">
+                    <p:sp>
+                      <p:nvSpPr>
+                        <p:cNvPr id="41" name="TextBox 40">
+                          <a:extLst>
+                            <a:ext uri="{FF2B5EF4-FFF2-40B4-BE49-F238E27FC236}">
+                              <a16:creationId xmlns:a16="http://schemas.microsoft.com/office/drawing/2014/main" id="{DC244848-C81B-4071-B008-1780C0A68E5A}"/>
+                            </a:ext>
+                          </a:extLst>
+                        </p:cNvPr>
+                        <p:cNvSpPr txBox="1"/>
+                        <p:nvPr/>
+                      </p:nvSpPr>
+                      <p:spPr>
+                        <a:xfrm>
+                          <a:off x="5281063" y="3632414"/>
+                          <a:ext cx="385875" cy="369332"/>
+                        </a:xfrm>
+                        <a:prstGeom prst="rect">
+                          <a:avLst/>
+                        </a:prstGeom>
+                        <a:noFill/>
+                      </p:spPr>
+                      <p:txBody>
+                        <a:bodyPr wrap="none" rtlCol="0">
+                          <a:spAutoFit/>
+                        </a:bodyPr>
+                        <a:lstStyle/>
+                        <a:p>
+                          <a:pPr/>
+                          <a14:m>
+                            <m:oMathPara xmlns:m="http://schemas.openxmlformats.org/officeDocument/2006/math">
+                              <m:oMathParaPr>
+                                <m:jc m:val="centerGroup"/>
+                              </m:oMathParaPr>
+                              <m:oMath xmlns:m="http://schemas.openxmlformats.org/officeDocument/2006/math">
+                                <m:r>
+                                  <a:rPr lang="en-AU" b="0" i="1" smtClean="0">
+                                    <a:latin typeface="Cambria Math" panose="02040503050406030204" pitchFamily="18" charset="0"/>
+                                  </a:rPr>
+                                  <m:t>𝑃</m:t>
+                                </m:r>
+                              </m:oMath>
+                            </m:oMathPara>
+                          </a14:m>
+                          <a:endParaRPr lang="en-AU" dirty="0"/>
+                        </a:p>
+                      </p:txBody>
+                    </p:sp>
+                  </mc:Choice>
+                  <mc:Fallback xmlns="">
+                    <p:sp>
+                      <p:nvSpPr>
+                        <p:cNvPr id="73" name="TextBox 72">
+                          <a:extLst>
+                            <a:ext uri="{FF2B5EF4-FFF2-40B4-BE49-F238E27FC236}">
+                              <a16:creationId xmlns:a16="http://schemas.microsoft.com/office/drawing/2014/main" id="{08C3AB82-6923-422E-A16D-119E9B063574}"/>
+                            </a:ext>
+                          </a:extLst>
+                        </p:cNvPr>
+                        <p:cNvSpPr txBox="1">
+                          <a:spLocks noRot="1" noChangeAspect="1" noMove="1" noResize="1" noEditPoints="1" noAdjustHandles="1" noChangeArrowheads="1" noChangeShapeType="1" noTextEdit="1"/>
+                        </p:cNvSpPr>
+                        <p:nvPr/>
+                      </p:nvSpPr>
+                      <p:spPr>
+                        <a:xfrm>
+                          <a:off x="5281063" y="3632414"/>
+                          <a:ext cx="385875" cy="369332"/>
+                        </a:xfrm>
+                        <a:prstGeom prst="rect">
+                          <a:avLst/>
+                        </a:prstGeom>
+                        <a:blipFill>
+                          <a:blip r:embed="rId10"/>
+                          <a:stretch>
+                            <a:fillRect/>
+                          </a:stretch>
+                        </a:blipFill>
+                      </p:spPr>
+                      <p:txBody>
+                        <a:bodyPr/>
+                        <a:lstStyle/>
+                        <a:p>
+                          <a:r>
+                            <a:rPr lang="en-AU">
+                              <a:noFill/>
+                            </a:rPr>
+                            <a:t> </a:t>
+                          </a:r>
+                        </a:p>
+                      </p:txBody>
+                    </p:sp>
+                  </mc:Fallback>
+                </mc:AlternateContent>
+              </p:grpSp>
+              <p:cxnSp>
+                <p:nvCxnSpPr>
+                  <p:cNvPr id="14" name="Straight Arrow Connector 13">
+                    <a:extLst>
+                      <a:ext uri="{FF2B5EF4-FFF2-40B4-BE49-F238E27FC236}">
+                        <a16:creationId xmlns:a16="http://schemas.microsoft.com/office/drawing/2014/main" id="{230F681D-DDB8-47D6-9E8A-4D49403D0D4F}"/>
+                      </a:ext>
+                    </a:extLst>
+                  </p:cNvPr>
+                  <p:cNvCxnSpPr>
+                    <a:cxnSpLocks/>
+                    <a:endCxn id="21" idx="7"/>
+                  </p:cNvCxnSpPr>
+                  <p:nvPr/>
+                </p:nvCxnSpPr>
+                <p:spPr>
+                  <a:xfrm flipV="1">
+                    <a:off x="4316817" y="2082507"/>
+                    <a:ext cx="381838" cy="381838"/>
+                  </a:xfrm>
+                  <a:prstGeom prst="straightConnector1">
+                    <a:avLst/>
+                  </a:prstGeom>
+                  <a:ln w="9525">
+                    <a:solidFill>
+                      <a:schemeClr val="tx1"/>
+                    </a:solidFill>
+                    <a:tailEnd type="triangle"/>
+                  </a:ln>
+                </p:spPr>
+                <p:style>
+                  <a:lnRef idx="1">
+                    <a:schemeClr val="accent2"/>
+                  </a:lnRef>
+                  <a:fillRef idx="0">
+                    <a:schemeClr val="accent2"/>
+                  </a:fillRef>
+                  <a:effectRef idx="0">
+                    <a:schemeClr val="accent2"/>
+                  </a:effectRef>
+                  <a:fontRef idx="minor">
+                    <a:schemeClr val="tx1"/>
+                  </a:fontRef>
+                </p:style>
+              </p:cxnSp>
+              <mc:AlternateContent xmlns:mc="http://schemas.openxmlformats.org/markup-compatibility/2006" xmlns:a14="http://schemas.microsoft.com/office/drawing/2010/main">
+                <mc:Choice Requires="a14">
+                  <p:sp>
+                    <p:nvSpPr>
+                      <p:cNvPr id="15" name="TextBox 14">
+                        <a:extLst>
+                          <a:ext uri="{FF2B5EF4-FFF2-40B4-BE49-F238E27FC236}">
+                            <a16:creationId xmlns:a16="http://schemas.microsoft.com/office/drawing/2014/main" id="{383CCB76-1D60-42A9-B1F5-1B873E666245}"/>
+                          </a:ext>
+                        </a:extLst>
+                      </p:cNvPr>
+                      <p:cNvSpPr txBox="1"/>
+                      <p:nvPr/>
+                    </p:nvSpPr>
+                    <p:spPr>
+                      <a:xfrm>
+                        <a:off x="4353502" y="1945713"/>
+                        <a:ext cx="408530" cy="276999"/>
+                      </a:xfrm>
+                      <a:prstGeom prst="rect">
+                        <a:avLst/>
+                      </a:prstGeom>
+                      <a:noFill/>
+                    </p:spPr>
+                    <p:txBody>
+                      <a:bodyPr wrap="square" rtlCol="0">
+                        <a:spAutoFit/>
+                      </a:bodyPr>
+                      <a:lstStyle/>
+                      <a:p>
+                        <a:pPr/>
+                        <a14:m>
+                          <m:oMathPara xmlns:m="http://schemas.openxmlformats.org/officeDocument/2006/math">
+                            <m:oMathParaPr>
+                              <m:jc m:val="centerGroup"/>
+                            </m:oMathParaPr>
+                            <m:oMath xmlns:m="http://schemas.openxmlformats.org/officeDocument/2006/math">
+                              <m:sSub>
+                                <m:sSubPr>
+                                  <m:ctrlPr>
+                                    <a:rPr lang="en-AU" sz="1200" b="0" i="1" smtClean="0">
+                                      <a:latin typeface="Cambria Math" panose="02040503050406030204" pitchFamily="18" charset="0"/>
+                                    </a:rPr>
+                                  </m:ctrlPr>
+                                </m:sSubPr>
+                                <m:e>
+                                  <m:r>
+                                    <a:rPr lang="en-AU" sz="1200" b="0" i="1" smtClean="0">
+                                      <a:latin typeface="Cambria Math" panose="02040503050406030204" pitchFamily="18" charset="0"/>
+                                    </a:rPr>
+                                    <m:t>𝑟</m:t>
+                                  </m:r>
+                                </m:e>
+                                <m:sub>
+                                  <m:r>
+                                    <a:rPr lang="en-AU" sz="1200" b="0" i="1" smtClean="0">
+                                      <a:latin typeface="Cambria Math" panose="02040503050406030204" pitchFamily="18" charset="0"/>
+                                    </a:rPr>
+                                    <m:t>𝑜</m:t>
+                                  </m:r>
+                                </m:sub>
+                              </m:sSub>
+                            </m:oMath>
+                          </m:oMathPara>
+                        </a14:m>
+                        <a:endParaRPr lang="en-AU" b="0" dirty="0"/>
+                      </a:p>
+                    </p:txBody>
+                  </p:sp>
+                </mc:Choice>
+                <mc:Fallback xmlns="">
+                  <p:sp>
+                    <p:nvSpPr>
+                      <p:cNvPr id="76" name="TextBox 75">
+                        <a:extLst>
+                          <a:ext uri="{FF2B5EF4-FFF2-40B4-BE49-F238E27FC236}">
+                            <a16:creationId xmlns:a16="http://schemas.microsoft.com/office/drawing/2014/main" id="{74ED2A7B-C1C6-4ABA-8A3A-CCA339131C8E}"/>
+                          </a:ext>
+                        </a:extLst>
+                      </p:cNvPr>
+                      <p:cNvSpPr txBox="1">
+                        <a:spLocks noRot="1" noChangeAspect="1" noMove="1" noResize="1" noEditPoints="1" noAdjustHandles="1" noChangeArrowheads="1" noChangeShapeType="1" noTextEdit="1"/>
+                      </p:cNvSpPr>
+                      <p:nvPr/>
+                    </p:nvSpPr>
+                    <p:spPr>
+                      <a:xfrm>
+                        <a:off x="4353502" y="1945713"/>
+                        <a:ext cx="408530" cy="276999"/>
+                      </a:xfrm>
+                      <a:prstGeom prst="rect">
+                        <a:avLst/>
+                      </a:prstGeom>
+                      <a:blipFill>
+                        <a:blip r:embed="rId11"/>
+                        <a:stretch>
+                          <a:fillRect/>
+                        </a:stretch>
+                      </a:blipFill>
+                    </p:spPr>
+                    <p:txBody>
+                      <a:bodyPr/>
+                      <a:lstStyle/>
+                      <a:p>
+                        <a:r>
+                          <a:rPr lang="en-AU">
+                            <a:noFill/>
+                          </a:rPr>
+                          <a:t> </a:t>
+                        </a:r>
+                      </a:p>
+                    </p:txBody>
+                  </p:sp>
+                </mc:Fallback>
+              </mc:AlternateContent>
+              <p:cxnSp>
+                <p:nvCxnSpPr>
+                  <p:cNvPr id="16" name="Straight Arrow Connector 15">
+                    <a:extLst>
+                      <a:ext uri="{FF2B5EF4-FFF2-40B4-BE49-F238E27FC236}">
+                        <a16:creationId xmlns:a16="http://schemas.microsoft.com/office/drawing/2014/main" id="{CC0263A6-B265-4501-9ADE-F1FF1CA4A748}"/>
+                      </a:ext>
+                    </a:extLst>
+                  </p:cNvPr>
+                  <p:cNvCxnSpPr>
+                    <a:cxnSpLocks/>
+                    <a:endCxn id="20" idx="7"/>
+                  </p:cNvCxnSpPr>
+                  <p:nvPr/>
+                </p:nvCxnSpPr>
+                <p:spPr>
+                  <a:xfrm flipV="1">
+                    <a:off x="5387620" y="2921301"/>
+                    <a:ext cx="772872" cy="761220"/>
+                  </a:xfrm>
+                  <a:prstGeom prst="straightConnector1">
+                    <a:avLst/>
+                  </a:prstGeom>
+                  <a:ln w="9525">
+                    <a:solidFill>
+                      <a:schemeClr val="tx1"/>
+                    </a:solidFill>
+                    <a:tailEnd type="triangle"/>
+                  </a:ln>
+                </p:spPr>
+                <p:style>
+                  <a:lnRef idx="1">
+                    <a:schemeClr val="accent2"/>
+                  </a:lnRef>
+                  <a:fillRef idx="0">
+                    <a:schemeClr val="accent2"/>
+                  </a:fillRef>
+                  <a:effectRef idx="0">
+                    <a:schemeClr val="accent2"/>
+                  </a:effectRef>
+                  <a:fontRef idx="minor">
+                    <a:schemeClr val="tx1"/>
+                  </a:fontRef>
+                </p:style>
+              </p:cxnSp>
+              <mc:AlternateContent xmlns:mc="http://schemas.openxmlformats.org/markup-compatibility/2006" xmlns:a14="http://schemas.microsoft.com/office/drawing/2010/main">
+                <mc:Choice Requires="a14">
+                  <p:sp>
+                    <p:nvSpPr>
+                      <p:cNvPr id="17" name="TextBox 16">
+                        <a:extLst>
+                          <a:ext uri="{FF2B5EF4-FFF2-40B4-BE49-F238E27FC236}">
+                            <a16:creationId xmlns:a16="http://schemas.microsoft.com/office/drawing/2014/main" id="{12FCEC9F-AE94-4F81-9C23-0B5E4BD7964C}"/>
+                          </a:ext>
+                        </a:extLst>
+                      </p:cNvPr>
+                      <p:cNvSpPr txBox="1"/>
+                      <p:nvPr/>
+                    </p:nvSpPr>
+                    <p:spPr>
+                      <a:xfrm>
+                        <a:off x="5743110" y="2826371"/>
+                        <a:ext cx="408530" cy="276999"/>
+                      </a:xfrm>
+                      <a:prstGeom prst="rect">
+                        <a:avLst/>
+                      </a:prstGeom>
+                      <a:noFill/>
+                    </p:spPr>
+                    <p:txBody>
+                      <a:bodyPr wrap="square" rtlCol="0">
+                        <a:spAutoFit/>
+                      </a:bodyPr>
+                      <a:lstStyle/>
+                      <a:p>
+                        <a:pPr/>
+                        <a14:m>
+                          <m:oMathPara xmlns:m="http://schemas.openxmlformats.org/officeDocument/2006/math">
+                            <m:oMathParaPr>
+                              <m:jc m:val="centerGroup"/>
+                            </m:oMathParaPr>
+                            <m:oMath xmlns:m="http://schemas.openxmlformats.org/officeDocument/2006/math">
+                              <m:sSub>
+                                <m:sSubPr>
+                                  <m:ctrlPr>
+                                    <a:rPr lang="en-AU" sz="1200" b="0" i="1" smtClean="0">
+                                      <a:latin typeface="Cambria Math" panose="02040503050406030204" pitchFamily="18" charset="0"/>
+                                    </a:rPr>
+                                  </m:ctrlPr>
+                                </m:sSubPr>
+                                <m:e>
+                                  <m:r>
+                                    <a:rPr lang="en-AU" sz="1200" b="0" i="1" smtClean="0">
+                                      <a:latin typeface="Cambria Math" panose="02040503050406030204" pitchFamily="18" charset="0"/>
+                                    </a:rPr>
+                                    <m:t>𝑟</m:t>
+                                  </m:r>
+                                </m:e>
+                                <m:sub>
+                                  <m:r>
+                                    <a:rPr lang="en-AU" sz="1200" b="0" i="1" smtClean="0">
+                                      <a:latin typeface="Cambria Math" panose="02040503050406030204" pitchFamily="18" charset="0"/>
+                                    </a:rPr>
+                                    <m:t>h</m:t>
+                                  </m:r>
+                                </m:sub>
+                              </m:sSub>
+                            </m:oMath>
+                          </m:oMathPara>
+                        </a14:m>
+                        <a:endParaRPr lang="en-AU" b="0" dirty="0"/>
+                      </a:p>
+                    </p:txBody>
+                  </p:sp>
+                </mc:Choice>
+                <mc:Fallback xmlns="">
+                  <p:sp>
+                    <p:nvSpPr>
+                      <p:cNvPr id="80" name="TextBox 79">
+                        <a:extLst>
+                          <a:ext uri="{FF2B5EF4-FFF2-40B4-BE49-F238E27FC236}">
+                            <a16:creationId xmlns:a16="http://schemas.microsoft.com/office/drawing/2014/main" id="{470C78FF-1A71-4FA9-8DCC-6643C4C3C862}"/>
+                          </a:ext>
+                        </a:extLst>
+                      </p:cNvPr>
+                      <p:cNvSpPr txBox="1">
+                        <a:spLocks noRot="1" noChangeAspect="1" noMove="1" noResize="1" noEditPoints="1" noAdjustHandles="1" noChangeArrowheads="1" noChangeShapeType="1" noTextEdit="1"/>
+                      </p:cNvSpPr>
+                      <p:nvPr/>
+                    </p:nvSpPr>
+                    <p:spPr>
+                      <a:xfrm>
+                        <a:off x="5743110" y="2826371"/>
+                        <a:ext cx="408530" cy="276999"/>
+                      </a:xfrm>
+                      <a:prstGeom prst="rect">
+                        <a:avLst/>
+                      </a:prstGeom>
+                      <a:blipFill>
+                        <a:blip r:embed="rId12"/>
+                        <a:stretch>
+                          <a:fillRect/>
+                        </a:stretch>
+                      </a:blipFill>
+                    </p:spPr>
+                    <p:txBody>
+                      <a:bodyPr/>
+                      <a:lstStyle/>
+                      <a:p>
+                        <a:r>
+                          <a:rPr lang="en-AU">
+                            <a:noFill/>
+                          </a:rPr>
+                          <a:t> </a:t>
+                        </a:r>
+                      </a:p>
+                    </p:txBody>
+                  </p:sp>
+                </mc:Fallback>
+              </mc:AlternateContent>
+              <mc:AlternateContent xmlns:mc="http://schemas.openxmlformats.org/markup-compatibility/2006" xmlns:a14="http://schemas.microsoft.com/office/drawing/2010/main">
+                <mc:Choice Requires="a14">
+                  <p:sp>
+                    <p:nvSpPr>
+                      <p:cNvPr id="18" name="Rectangle 17">
+                        <a:extLst>
+                          <a:ext uri="{FF2B5EF4-FFF2-40B4-BE49-F238E27FC236}">
+                            <a16:creationId xmlns:a16="http://schemas.microsoft.com/office/drawing/2014/main" id="{A49A801D-A6D5-48AF-A9CF-74ECF9191D20}"/>
+                          </a:ext>
+                        </a:extLst>
+                      </p:cNvPr>
+                      <p:cNvSpPr/>
+                      <p:nvPr/>
+                    </p:nvSpPr>
+                    <p:spPr>
+                      <a:xfrm>
+                        <a:off x="3261102" y="2678735"/>
+                        <a:ext cx="673581" cy="307777"/>
+                      </a:xfrm>
+                      <a:prstGeom prst="rect">
+                        <a:avLst/>
+                      </a:prstGeom>
+                    </p:spPr>
+                    <p:txBody>
+                      <a:bodyPr wrap="none">
+                        <a:spAutoFit/>
+                      </a:bodyPr>
+                      <a:lstStyle/>
+                      <a:p>
+                        <a:pPr/>
+                        <a14:m>
+                          <m:oMathPara xmlns:m="http://schemas.openxmlformats.org/officeDocument/2006/math">
+                            <m:oMathParaPr>
+                              <m:jc m:val="centerGroup"/>
+                            </m:oMathParaPr>
+                            <m:oMath xmlns:m="http://schemas.openxmlformats.org/officeDocument/2006/math">
+                              <m:sSub>
+                                <m:sSubPr>
+                                  <m:ctrlPr>
+                                    <a:rPr lang="en-AU" sz="1400" b="0" i="1" smtClean="0">
+                                      <a:latin typeface="Cambria Math" panose="02040503050406030204" pitchFamily="18" charset="0"/>
+                                    </a:rPr>
+                                  </m:ctrlPr>
+                                </m:sSubPr>
+                                <m:e>
+                                  <m:r>
+                                    <a:rPr lang="en-AU" sz="1400" b="0" i="1" smtClean="0">
+                                      <a:latin typeface="Cambria Math" panose="02040503050406030204" pitchFamily="18" charset="0"/>
+                                    </a:rPr>
+                                    <m:t>𝑚</m:t>
+                                  </m:r>
+                                </m:e>
+                                <m:sub>
+                                  <m:r>
+                                    <a:rPr lang="en-AU" sz="1400" b="0" i="1" smtClean="0">
+                                      <a:latin typeface="Cambria Math" panose="02040503050406030204" pitchFamily="18" charset="0"/>
+                                    </a:rPr>
+                                    <m:t>𝑜</m:t>
+                                  </m:r>
+                                </m:sub>
+                              </m:sSub>
+                              <m:r>
+                                <a:rPr lang="en-AU" sz="1400" b="0" i="1" smtClean="0">
+                                  <a:latin typeface="Cambria Math" panose="02040503050406030204" pitchFamily="18" charset="0"/>
+                                </a:rPr>
+                                <m:t>, </m:t>
+                              </m:r>
+                              <m:sSub>
+                                <m:sSubPr>
+                                  <m:ctrlPr>
+                                    <a:rPr lang="en-AU" sz="1400" b="0" i="1" smtClean="0">
+                                      <a:latin typeface="Cambria Math" panose="02040503050406030204" pitchFamily="18" charset="0"/>
+                                    </a:rPr>
+                                  </m:ctrlPr>
+                                </m:sSubPr>
+                                <m:e>
+                                  <m:r>
+                                    <a:rPr lang="en-AU" sz="1400" b="0" i="1" smtClean="0">
+                                      <a:latin typeface="Cambria Math" panose="02040503050406030204" pitchFamily="18" charset="0"/>
+                                    </a:rPr>
+                                    <m:t>𝐼</m:t>
+                                  </m:r>
+                                </m:e>
+                                <m:sub>
+                                  <m:r>
+                                    <a:rPr lang="en-AU" sz="1400" b="0" i="1" smtClean="0">
+                                      <a:latin typeface="Cambria Math" panose="02040503050406030204" pitchFamily="18" charset="0"/>
+                                    </a:rPr>
+                                    <m:t>𝑜</m:t>
+                                  </m:r>
+                                </m:sub>
+                              </m:sSub>
+                            </m:oMath>
+                          </m:oMathPara>
+                        </a14:m>
+                        <a:endParaRPr lang="en-AU" dirty="0"/>
+                      </a:p>
+                    </p:txBody>
+                  </p:sp>
+                </mc:Choice>
+                <mc:Fallback xmlns="">
+                  <p:sp>
+                    <p:nvSpPr>
+                      <p:cNvPr id="81" name="Rectangle 80">
+                        <a:extLst>
+                          <a:ext uri="{FF2B5EF4-FFF2-40B4-BE49-F238E27FC236}">
+                            <a16:creationId xmlns:a16="http://schemas.microsoft.com/office/drawing/2014/main" id="{2CD23148-22DF-410B-B1CC-1460F606FD9D}"/>
+                          </a:ext>
+                        </a:extLst>
+                      </p:cNvPr>
+                      <p:cNvSpPr>
+                        <a:spLocks noRot="1" noChangeAspect="1" noMove="1" noResize="1" noEditPoints="1" noAdjustHandles="1" noChangeArrowheads="1" noChangeShapeType="1" noTextEdit="1"/>
+                      </p:cNvSpPr>
+                      <p:nvPr/>
+                    </p:nvSpPr>
+                    <p:spPr>
+                      <a:xfrm>
+                        <a:off x="3261102" y="2678735"/>
+                        <a:ext cx="673581" cy="307777"/>
+                      </a:xfrm>
+                      <a:prstGeom prst="rect">
+                        <a:avLst/>
+                      </a:prstGeom>
+                      <a:blipFill>
+                        <a:blip r:embed="rId13"/>
+                        <a:stretch>
+                          <a:fillRect/>
+                        </a:stretch>
+                      </a:blipFill>
+                    </p:spPr>
+                    <p:txBody>
+                      <a:bodyPr/>
+                      <a:lstStyle/>
+                      <a:p>
+                        <a:r>
+                          <a:rPr lang="en-AU">
+                            <a:noFill/>
+                          </a:rPr>
+                          <a:t> </a:t>
+                        </a:r>
+                      </a:p>
+                    </p:txBody>
+                  </p:sp>
+                </mc:Fallback>
+              </mc:AlternateContent>
+              <mc:AlternateContent xmlns:mc="http://schemas.openxmlformats.org/markup-compatibility/2006" xmlns:a14="http://schemas.microsoft.com/office/drawing/2010/main">
+                <mc:Choice Requires="a14">
+                  <p:sp>
+                    <p:nvSpPr>
+                      <p:cNvPr id="19" name="Rectangle 18">
+                        <a:extLst>
+                          <a:ext uri="{FF2B5EF4-FFF2-40B4-BE49-F238E27FC236}">
+                            <a16:creationId xmlns:a16="http://schemas.microsoft.com/office/drawing/2014/main" id="{D0B12540-F160-486F-9832-D0ECE5885DA9}"/>
+                          </a:ext>
+                        </a:extLst>
+                      </p:cNvPr>
+                      <p:cNvSpPr/>
+                      <p:nvPr/>
+                    </p:nvSpPr>
+                    <p:spPr>
+                      <a:xfrm>
+                        <a:off x="6192242" y="4232933"/>
+                        <a:ext cx="684098" cy="307777"/>
+                      </a:xfrm>
+                      <a:prstGeom prst="rect">
+                        <a:avLst/>
+                      </a:prstGeom>
+                    </p:spPr>
+                    <p:txBody>
+                      <a:bodyPr wrap="none">
+                        <a:spAutoFit/>
+                      </a:bodyPr>
+                      <a:lstStyle/>
+                      <a:p>
+                        <a:pPr/>
+                        <a14:m>
+                          <m:oMathPara xmlns:m="http://schemas.openxmlformats.org/officeDocument/2006/math">
+                            <m:oMathParaPr>
+                              <m:jc m:val="centerGroup"/>
+                            </m:oMathParaPr>
+                            <m:oMath xmlns:m="http://schemas.openxmlformats.org/officeDocument/2006/math">
+                              <m:sSub>
+                                <m:sSubPr>
+                                  <m:ctrlPr>
+                                    <a:rPr lang="en-AU" sz="1400" b="0" i="1" smtClean="0">
+                                      <a:latin typeface="Cambria Math" panose="02040503050406030204" pitchFamily="18" charset="0"/>
+                                    </a:rPr>
+                                  </m:ctrlPr>
+                                </m:sSubPr>
+                                <m:e>
+                                  <m:r>
+                                    <a:rPr lang="en-AU" sz="1400" b="0" i="1" smtClean="0">
+                                      <a:latin typeface="Cambria Math" panose="02040503050406030204" pitchFamily="18" charset="0"/>
+                                    </a:rPr>
+                                    <m:t>𝑚</m:t>
+                                  </m:r>
+                                </m:e>
+                                <m:sub>
+                                  <m:r>
+                                    <a:rPr lang="en-AU" sz="1400" b="0" i="1" smtClean="0">
+                                      <a:latin typeface="Cambria Math" panose="02040503050406030204" pitchFamily="18" charset="0"/>
+                                    </a:rPr>
+                                    <m:t>h</m:t>
+                                  </m:r>
+                                </m:sub>
+                              </m:sSub>
+                              <m:r>
+                                <a:rPr lang="en-AU" sz="1400" b="0" i="1" smtClean="0">
+                                  <a:latin typeface="Cambria Math" panose="02040503050406030204" pitchFamily="18" charset="0"/>
+                                </a:rPr>
+                                <m:t>, </m:t>
+                              </m:r>
+                              <m:sSub>
+                                <m:sSubPr>
+                                  <m:ctrlPr>
+                                    <a:rPr lang="en-AU" sz="1400" b="0" i="1" smtClean="0">
+                                      <a:latin typeface="Cambria Math" panose="02040503050406030204" pitchFamily="18" charset="0"/>
+                                    </a:rPr>
+                                  </m:ctrlPr>
+                                </m:sSubPr>
+                                <m:e>
+                                  <m:r>
+                                    <a:rPr lang="en-AU" sz="1400" b="0" i="1" smtClean="0">
+                                      <a:latin typeface="Cambria Math" panose="02040503050406030204" pitchFamily="18" charset="0"/>
+                                    </a:rPr>
+                                    <m:t>𝐼</m:t>
+                                  </m:r>
+                                </m:e>
+                                <m:sub>
+                                  <m:r>
+                                    <a:rPr lang="en-AU" sz="1400" b="0" i="1" smtClean="0">
+                                      <a:latin typeface="Cambria Math" panose="02040503050406030204" pitchFamily="18" charset="0"/>
+                                    </a:rPr>
+                                    <m:t>h</m:t>
+                                  </m:r>
+                                </m:sub>
+                              </m:sSub>
+                            </m:oMath>
+                          </m:oMathPara>
+                        </a14:m>
+                        <a:endParaRPr lang="en-AU" dirty="0"/>
+                      </a:p>
+                    </p:txBody>
+                  </p:sp>
+                </mc:Choice>
+                <mc:Fallback xmlns="">
+                  <p:sp>
+                    <p:nvSpPr>
+                      <p:cNvPr id="82" name="Rectangle 81">
+                        <a:extLst>
+                          <a:ext uri="{FF2B5EF4-FFF2-40B4-BE49-F238E27FC236}">
+                            <a16:creationId xmlns:a16="http://schemas.microsoft.com/office/drawing/2014/main" id="{8E1876E5-AC03-4BD2-BF4E-06B929BAADB4}"/>
+                          </a:ext>
+                        </a:extLst>
+                      </p:cNvPr>
+                      <p:cNvSpPr>
+                        <a:spLocks noRot="1" noChangeAspect="1" noMove="1" noResize="1" noEditPoints="1" noAdjustHandles="1" noChangeArrowheads="1" noChangeShapeType="1" noTextEdit="1"/>
+                      </p:cNvSpPr>
+                      <p:nvPr/>
+                    </p:nvSpPr>
+                    <p:spPr>
+                      <a:xfrm>
+                        <a:off x="6192242" y="4232933"/>
+                        <a:ext cx="684098" cy="307777"/>
+                      </a:xfrm>
+                      <a:prstGeom prst="rect">
+                        <a:avLst/>
+                      </a:prstGeom>
+                      <a:blipFill>
+                        <a:blip r:embed="rId14"/>
+                        <a:stretch>
+                          <a:fillRect/>
+                        </a:stretch>
+                      </a:blipFill>
+                    </p:spPr>
+                    <p:txBody>
+                      <a:bodyPr/>
+                      <a:lstStyle/>
+                      <a:p>
+                        <a:r>
+                          <a:rPr lang="en-AU">
+                            <a:noFill/>
+                          </a:rPr>
+                          <a:t> </a:t>
+                        </a:r>
+                      </a:p>
+                    </p:txBody>
+                  </p:sp>
+                </mc:Fallback>
+              </mc:AlternateContent>
+            </p:grpSp>
+            <p:cxnSp>
+              <p:nvCxnSpPr>
+                <p:cNvPr id="11" name="Straight Arrow Connector 10">
+                  <a:extLst>
+                    <a:ext uri="{FF2B5EF4-FFF2-40B4-BE49-F238E27FC236}">
+                      <a16:creationId xmlns:a16="http://schemas.microsoft.com/office/drawing/2014/main" id="{EBDEFEAA-6553-44D7-8E9F-D2D15760BA03}"/>
+                    </a:ext>
+                  </a:extLst>
+                </p:cNvPr>
+                <p:cNvCxnSpPr>
+                  <a:cxnSpLocks/>
+                </p:cNvCxnSpPr>
+                <p:nvPr/>
+              </p:nvCxnSpPr>
+              <p:spPr>
+                <a:xfrm>
+                  <a:off x="5735993" y="1978265"/>
+                  <a:ext cx="0" cy="522469"/>
+                </a:xfrm>
+                <a:prstGeom prst="straightConnector1">
+                  <a:avLst/>
+                </a:prstGeom>
+                <a:ln w="19050">
+                  <a:solidFill>
+                    <a:schemeClr val="tx1"/>
+                  </a:solidFill>
+                  <a:tailEnd type="triangle"/>
+                </a:ln>
+              </p:spPr>
+              <p:style>
+                <a:lnRef idx="1">
+                  <a:schemeClr val="accent2"/>
+                </a:lnRef>
+                <a:fillRef idx="0">
+                  <a:schemeClr val="accent2"/>
+                </a:fillRef>
+                <a:effectRef idx="0">
+                  <a:schemeClr val="accent2"/>
+                </a:effectRef>
+                <a:fontRef idx="minor">
+                  <a:schemeClr val="tx1"/>
+                </a:fontRef>
+              </p:style>
+            </p:cxnSp>
+            <mc:AlternateContent xmlns:mc="http://schemas.openxmlformats.org/markup-compatibility/2006" xmlns:a14="http://schemas.microsoft.com/office/drawing/2010/main">
+              <mc:Choice Requires="a14">
+                <p:sp>
+                  <p:nvSpPr>
+                    <p:cNvPr id="12" name="TextBox 11">
+                      <a:extLst>
+                        <a:ext uri="{FF2B5EF4-FFF2-40B4-BE49-F238E27FC236}">
+                          <a16:creationId xmlns:a16="http://schemas.microsoft.com/office/drawing/2014/main" id="{3808C90C-62BD-4D16-8669-BF523C916D37}"/>
+                        </a:ext>
+                      </a:extLst>
+                    </p:cNvPr>
+                    <p:cNvSpPr txBox="1"/>
+                    <p:nvPr/>
+                  </p:nvSpPr>
+                  <p:spPr>
+                    <a:xfrm>
+                      <a:off x="5629581" y="2043451"/>
+                      <a:ext cx="408530" cy="276999"/>
+                    </a:xfrm>
+                    <a:prstGeom prst="rect">
+                      <a:avLst/>
+                    </a:prstGeom>
+                    <a:noFill/>
+                  </p:spPr>
+                  <p:txBody>
+                    <a:bodyPr wrap="square" rtlCol="0">
+                      <a:spAutoFit/>
+                    </a:bodyPr>
+                    <a:lstStyle/>
+                    <a:p>
+                      <a:pPr/>
+                      <a14:m>
+                        <m:oMathPara xmlns:m="http://schemas.openxmlformats.org/officeDocument/2006/math">
+                          <m:oMathParaPr>
+                            <m:jc m:val="centerGroup"/>
+                          </m:oMathParaPr>
+                          <m:oMath xmlns:m="http://schemas.openxmlformats.org/officeDocument/2006/math">
+                            <m:r>
+                              <a:rPr lang="en-AU" sz="1200" b="0" i="1" smtClean="0">
+                                <a:latin typeface="Cambria Math" panose="02040503050406030204" pitchFamily="18" charset="0"/>
+                              </a:rPr>
+                              <m:t>𝑔</m:t>
+                            </m:r>
+                          </m:oMath>
+                        </m:oMathPara>
+                      </a14:m>
+                      <a:endParaRPr lang="en-AU" b="0" dirty="0"/>
+                    </a:p>
+                  </p:txBody>
+                </p:sp>
+              </mc:Choice>
+              <mc:Fallback xmlns="">
+                <p:sp>
+                  <p:nvSpPr>
+                    <p:cNvPr id="35" name="TextBox 34">
+                      <a:extLst>
+                        <a:ext uri="{FF2B5EF4-FFF2-40B4-BE49-F238E27FC236}">
+                          <a16:creationId xmlns:a16="http://schemas.microsoft.com/office/drawing/2014/main" id="{4E69C83C-1895-4DAC-BD0D-C9BD5146AF7F}"/>
+                        </a:ext>
+                      </a:extLst>
+                    </p:cNvPr>
+                    <p:cNvSpPr txBox="1">
+                      <a:spLocks noRot="1" noChangeAspect="1" noMove="1" noResize="1" noEditPoints="1" noAdjustHandles="1" noChangeArrowheads="1" noChangeShapeType="1" noTextEdit="1"/>
+                    </p:cNvSpPr>
+                    <p:nvPr/>
+                  </p:nvSpPr>
+                  <p:spPr>
+                    <a:xfrm>
+                      <a:off x="5629581" y="2043451"/>
+                      <a:ext cx="408530" cy="276999"/>
+                    </a:xfrm>
+                    <a:prstGeom prst="rect">
+                      <a:avLst/>
+                    </a:prstGeom>
+                    <a:blipFill>
+                      <a:blip r:embed="rId15"/>
+                      <a:stretch>
+                        <a:fillRect/>
+                      </a:stretch>
+                    </a:blipFill>
+                  </p:spPr>
+                  <p:txBody>
+                    <a:bodyPr/>
+                    <a:lstStyle/>
+                    <a:p>
+                      <a:r>
+                        <a:rPr lang="en-AU">
+                          <a:noFill/>
+                        </a:rPr>
+                        <a:t> </a:t>
+                      </a:r>
+                    </a:p>
+                  </p:txBody>
+                </p:sp>
+              </mc:Fallback>
+            </mc:AlternateContent>
+          </p:grpSp>
+          <p:grpSp>
+            <p:nvGrpSpPr>
+              <p:cNvPr id="6" name="Group 5">
+                <a:extLst>
+                  <a:ext uri="{FF2B5EF4-FFF2-40B4-BE49-F238E27FC236}">
+                    <a16:creationId xmlns:a16="http://schemas.microsoft.com/office/drawing/2014/main" id="{51D80978-483E-4CA7-B365-3C9A43BA77BF}"/>
+                  </a:ext>
+                </a:extLst>
+              </p:cNvPr>
+              <p:cNvGrpSpPr/>
+              <p:nvPr/>
+            </p:nvGrpSpPr>
+            <p:grpSpPr>
+              <a:xfrm>
+                <a:off x="5203776" y="3411662"/>
+                <a:ext cx="333375" cy="345454"/>
+                <a:chOff x="7569200" y="2826371"/>
+                <a:chExt cx="333375" cy="345454"/>
+              </a:xfrm>
+            </p:grpSpPr>
+            <p:sp>
+              <p:nvSpPr>
+                <p:cNvPr id="8" name="Arc 7">
+                  <a:extLst>
+                    <a:ext uri="{FF2B5EF4-FFF2-40B4-BE49-F238E27FC236}">
+                      <a16:creationId xmlns:a16="http://schemas.microsoft.com/office/drawing/2014/main" id="{2B1AD424-4955-4F58-BE2F-A80AACEEB2CD}"/>
+                    </a:ext>
+                  </a:extLst>
+                </p:cNvPr>
+                <p:cNvSpPr/>
+                <p:nvPr/>
+              </p:nvSpPr>
+              <p:spPr>
+                <a:xfrm>
+                  <a:off x="7569200" y="2826371"/>
+                  <a:ext cx="333375" cy="345454"/>
+                </a:xfrm>
+                <a:prstGeom prst="arc">
+                  <a:avLst>
+                    <a:gd name="adj1" fmla="val 9718028"/>
+                    <a:gd name="adj2" fmla="val 16569310"/>
+                  </a:avLst>
+                </a:prstGeom>
+                <a:ln w="19050">
+                  <a:solidFill>
+                    <a:schemeClr val="tx1"/>
+                  </a:solidFill>
+                </a:ln>
+              </p:spPr>
+              <p:style>
+                <a:lnRef idx="1">
+                  <a:schemeClr val="accent1"/>
+                </a:lnRef>
+                <a:fillRef idx="0">
+                  <a:schemeClr val="accent1"/>
+                </a:fillRef>
+                <a:effectRef idx="0">
+                  <a:schemeClr val="accent1"/>
+                </a:effectRef>
+                <a:fontRef idx="minor">
+                  <a:schemeClr val="tx1"/>
+                </a:fontRef>
+              </p:style>
+              <p:txBody>
+                <a:bodyPr rtlCol="0" anchor="ctr"/>
+                <a:lstStyle/>
+                <a:p>
+                  <a:pPr algn="ctr"/>
+                  <a:endParaRPr lang="en-AU"/>
+                </a:p>
+              </p:txBody>
+            </p:sp>
+            <p:cxnSp>
+              <p:nvCxnSpPr>
+                <p:cNvPr id="9" name="Straight Arrow Connector 8">
+                  <a:extLst>
+                    <a:ext uri="{FF2B5EF4-FFF2-40B4-BE49-F238E27FC236}">
+                      <a16:creationId xmlns:a16="http://schemas.microsoft.com/office/drawing/2014/main" id="{5E010E87-A126-4C50-B747-78EA5529E085}"/>
+                    </a:ext>
+                  </a:extLst>
+                </p:cNvPr>
+                <p:cNvCxnSpPr>
+                  <a:cxnSpLocks/>
+                  <a:stCxn id="8" idx="0"/>
+                </p:cNvCxnSpPr>
+                <p:nvPr/>
+              </p:nvCxnSpPr>
+              <p:spPr>
+                <a:xfrm>
+                  <a:off x="7576863" y="3050869"/>
+                  <a:ext cx="27262" cy="60379"/>
+                </a:xfrm>
+                <a:prstGeom prst="straightConnector1">
+                  <a:avLst/>
+                </a:prstGeom>
+                <a:ln>
+                  <a:solidFill>
+                    <a:schemeClr val="tx1"/>
+                  </a:solidFill>
+                  <a:tailEnd type="triangle"/>
+                </a:ln>
+              </p:spPr>
+              <p:style>
+                <a:lnRef idx="1">
+                  <a:schemeClr val="accent1"/>
+                </a:lnRef>
+                <a:fillRef idx="0">
+                  <a:schemeClr val="accent1"/>
+                </a:fillRef>
+                <a:effectRef idx="0">
+                  <a:schemeClr val="accent1"/>
+                </a:effectRef>
+                <a:fontRef idx="minor">
+                  <a:schemeClr val="tx1"/>
+                </a:fontRef>
+              </p:style>
+            </p:cxnSp>
+          </p:grpSp>
+          <mc:AlternateContent xmlns:mc="http://schemas.openxmlformats.org/markup-compatibility/2006" xmlns:a14="http://schemas.microsoft.com/office/drawing/2010/main">
+            <mc:Choice Requires="a14">
+              <p:sp>
+                <p:nvSpPr>
+                  <p:cNvPr id="7" name="TextBox 6">
+                    <a:extLst>
+                      <a:ext uri="{FF2B5EF4-FFF2-40B4-BE49-F238E27FC236}">
+                        <a16:creationId xmlns:a16="http://schemas.microsoft.com/office/drawing/2014/main" id="{A141F52C-0C92-4AAC-AF7B-B1F7C4EACF80}"/>
+                      </a:ext>
+                    </a:extLst>
+                  </p:cNvPr>
+                  <p:cNvSpPr txBox="1"/>
+                  <p:nvPr/>
+                </p:nvSpPr>
+                <p:spPr>
+                  <a:xfrm>
+                    <a:off x="4960868" y="3567534"/>
+                    <a:ext cx="408530" cy="276999"/>
+                  </a:xfrm>
+                  <a:prstGeom prst="rect">
+                    <a:avLst/>
+                  </a:prstGeom>
+                  <a:noFill/>
+                </p:spPr>
+                <p:txBody>
+                  <a:bodyPr wrap="square" rtlCol="0">
+                    <a:spAutoFit/>
+                  </a:bodyPr>
+                  <a:lstStyle/>
+                  <a:p>
+                    <a:pPr/>
+                    <a14:m>
+                      <m:oMathPara xmlns:m="http://schemas.openxmlformats.org/officeDocument/2006/math">
+                        <m:oMathParaPr>
+                          <m:jc m:val="centerGroup"/>
+                        </m:oMathParaPr>
+                        <m:oMath xmlns:m="http://schemas.openxmlformats.org/officeDocument/2006/math">
+                          <m:r>
+                            <a:rPr lang="en-AU" sz="1200" b="0" i="1" smtClean="0">
+                              <a:latin typeface="Cambria Math" panose="02040503050406030204" pitchFamily="18" charset="0"/>
+                            </a:rPr>
+                            <m:t>𝜏</m:t>
+                          </m:r>
+                        </m:oMath>
+                      </m:oMathPara>
+                    </a14:m>
+                    <a:endParaRPr lang="en-AU" b="0" dirty="0"/>
+                  </a:p>
+                </p:txBody>
+              </p:sp>
+            </mc:Choice>
+            <mc:Fallback xmlns="">
+              <p:sp>
+                <p:nvSpPr>
+                  <p:cNvPr id="54" name="TextBox 53">
+                    <a:extLst>
+                      <a:ext uri="{FF2B5EF4-FFF2-40B4-BE49-F238E27FC236}">
+                        <a16:creationId xmlns:a16="http://schemas.microsoft.com/office/drawing/2014/main" id="{AF054CAF-975D-4C5B-8BB5-43DC3124A7AB}"/>
+                      </a:ext>
+                    </a:extLst>
+                  </p:cNvPr>
+                  <p:cNvSpPr txBox="1">
+                    <a:spLocks noRot="1" noChangeAspect="1" noMove="1" noResize="1" noEditPoints="1" noAdjustHandles="1" noChangeArrowheads="1" noChangeShapeType="1" noTextEdit="1"/>
+                  </p:cNvSpPr>
+                  <p:nvPr/>
+                </p:nvSpPr>
+                <p:spPr>
+                  <a:xfrm>
+                    <a:off x="4960868" y="3567534"/>
+                    <a:ext cx="408530" cy="276999"/>
+                  </a:xfrm>
+                  <a:prstGeom prst="rect">
+                    <a:avLst/>
+                  </a:prstGeom>
+                  <a:blipFill>
+                    <a:blip r:embed="rId16"/>
+                    <a:stretch>
+                      <a:fillRect/>
+                    </a:stretch>
+                  </a:blipFill>
+                </p:spPr>
+                <p:txBody>
+                  <a:bodyPr/>
+                  <a:lstStyle/>
+                  <a:p>
+                    <a:r>
+                      <a:rPr lang="en-AU">
+                        <a:noFill/>
+                      </a:rPr>
+                      <a:t> </a:t>
+                    </a:r>
+                  </a:p>
+                </p:txBody>
+              </p:sp>
+            </mc:Fallback>
+          </mc:AlternateContent>
+        </p:grpSp>
+        <mc:AlternateContent xmlns:mc="http://schemas.openxmlformats.org/markup-compatibility/2006">
+          <mc:Choice xmlns:a14="http://schemas.microsoft.com/office/drawing/2010/main" Requires="a14">
+            <p:sp>
+              <p:nvSpPr>
+                <p:cNvPr id="43" name="TextBox 42">
+                  <a:extLst>
+                    <a:ext uri="{FF2B5EF4-FFF2-40B4-BE49-F238E27FC236}">
+                      <a16:creationId xmlns:a16="http://schemas.microsoft.com/office/drawing/2014/main" id="{281C1209-D894-40B6-B521-3E4740D753CF}"/>
+                    </a:ext>
+                  </a:extLst>
+                </p:cNvPr>
+                <p:cNvSpPr txBox="1"/>
+                <p:nvPr/>
+              </p:nvSpPr>
+              <p:spPr>
+                <a:xfrm>
+                  <a:off x="6341578" y="4003374"/>
+                  <a:ext cx="685708" cy="668645"/>
+                </a:xfrm>
+                <a:prstGeom prst="rect">
+                  <a:avLst/>
+                </a:prstGeom>
+                <a:noFill/>
+              </p:spPr>
+              <p:txBody>
+                <a:bodyPr wrap="square" rtlCol="0">
+                  <a:spAutoFit/>
+                </a:bodyPr>
+                <a:lstStyle/>
+                <a:p>
+                  <a:pPr/>
+                  <a14:m>
+                    <m:oMathPara xmlns:m="http://schemas.openxmlformats.org/officeDocument/2006/math">
+                      <m:oMathParaPr>
+                        <m:jc m:val="centerGroup"/>
+                      </m:oMathParaPr>
+                      <m:oMath xmlns:m="http://schemas.openxmlformats.org/officeDocument/2006/math">
+                        <m:r>
+                          <a:rPr lang="en-AU" b="0" i="1" smtClean="0">
+                            <a:latin typeface="Cambria Math" panose="02040503050406030204" pitchFamily="18" charset="0"/>
+                          </a:rPr>
+                          <m:t>𝐻𝑎𝑛𝑑</m:t>
+                        </m:r>
+                      </m:oMath>
+                    </m:oMathPara>
+                  </a14:m>
+                  <a:endParaRPr lang="en-AU" b="0" dirty="0"/>
+                </a:p>
+                <a:p>
+                  <a:endParaRPr lang="en-AU" dirty="0"/>
+                </a:p>
+              </p:txBody>
+            </p:sp>
+          </mc:Choice>
+          <mc:Fallback>
+            <p:sp>
+              <p:nvSpPr>
+                <p:cNvPr id="43" name="TextBox 42">
+                  <a:extLst>
+                    <a:ext uri="{FF2B5EF4-FFF2-40B4-BE49-F238E27FC236}">
+                      <a16:creationId xmlns:a16="http://schemas.microsoft.com/office/drawing/2014/main" id="{281C1209-D894-40B6-B521-3E4740D753CF}"/>
+                    </a:ext>
+                  </a:extLst>
+                </p:cNvPr>
+                <p:cNvSpPr txBox="1">
+                  <a:spLocks noRot="1" noChangeAspect="1" noMove="1" noResize="1" noEditPoints="1" noAdjustHandles="1" noChangeArrowheads="1" noChangeShapeType="1" noTextEdit="1"/>
+                </p:cNvSpPr>
+                <p:nvPr/>
+              </p:nvSpPr>
+              <p:spPr>
+                <a:xfrm>
+                  <a:off x="6341578" y="4003374"/>
+                  <a:ext cx="685708" cy="668645"/>
+                </a:xfrm>
+                <a:prstGeom prst="rect">
+                  <a:avLst/>
+                </a:prstGeom>
+                <a:blipFill>
+                  <a:blip r:embed="rId17"/>
+                  <a:stretch>
+                    <a:fillRect r="-7080"/>
+                  </a:stretch>
+                </a:blipFill>
+              </p:spPr>
+              <p:txBody>
+                <a:bodyPr/>
+                <a:lstStyle/>
+                <a:p>
+                  <a:r>
+                    <a:rPr lang="en-AU">
+                      <a:noFill/>
+                    </a:rPr>
+                    <a:t> </a:t>
+                  </a:r>
+                </a:p>
+              </p:txBody>
+            </p:sp>
+          </mc:Fallback>
+        </mc:AlternateContent>
+        <mc:AlternateContent xmlns:mc="http://schemas.openxmlformats.org/markup-compatibility/2006">
+          <mc:Choice xmlns:a14="http://schemas.microsoft.com/office/drawing/2010/main" Requires="a14">
+            <p:sp>
+              <p:nvSpPr>
+                <p:cNvPr id="51" name="TextBox 50">
+                  <a:extLst>
+                    <a:ext uri="{FF2B5EF4-FFF2-40B4-BE49-F238E27FC236}">
+                      <a16:creationId xmlns:a16="http://schemas.microsoft.com/office/drawing/2014/main" id="{A177283E-1734-422D-A968-CB9E96F646AF}"/>
+                    </a:ext>
+                  </a:extLst>
+                </p:cNvPr>
+                <p:cNvSpPr txBox="1"/>
+                <p:nvPr/>
+              </p:nvSpPr>
+              <p:spPr>
+                <a:xfrm>
+                  <a:off x="2965142" y="2377982"/>
+                  <a:ext cx="864958" cy="646331"/>
+                </a:xfrm>
+                <a:prstGeom prst="rect">
+                  <a:avLst/>
+                </a:prstGeom>
+                <a:noFill/>
+              </p:spPr>
+              <p:txBody>
+                <a:bodyPr wrap="square" rtlCol="0">
+                  <a:spAutoFit/>
+                </a:bodyPr>
+                <a:lstStyle/>
+                <a:p>
+                  <a:pPr/>
+                  <a14:m>
+                    <m:oMathPara xmlns:m="http://schemas.openxmlformats.org/officeDocument/2006/math">
+                      <m:oMathParaPr>
+                        <m:jc m:val="centerGroup"/>
+                      </m:oMathParaPr>
+                      <m:oMath xmlns:m="http://schemas.openxmlformats.org/officeDocument/2006/math">
+                        <m:r>
+                          <a:rPr lang="en-AU" b="0" i="1" smtClean="0">
+                            <a:latin typeface="Cambria Math" panose="02040503050406030204" pitchFamily="18" charset="0"/>
+                          </a:rPr>
+                          <m:t>𝑂𝑏𝑗𝑒𝑐𝑡</m:t>
+                        </m:r>
+                      </m:oMath>
+                    </m:oMathPara>
+                  </a14:m>
+                  <a:endParaRPr lang="en-AU" b="0" dirty="0"/>
+                </a:p>
+                <a:p>
+                  <a:endParaRPr lang="en-AU" dirty="0"/>
+                </a:p>
+              </p:txBody>
+            </p:sp>
+          </mc:Choice>
+          <mc:Fallback>
+            <p:sp>
+              <p:nvSpPr>
+                <p:cNvPr id="51" name="TextBox 50">
+                  <a:extLst>
+                    <a:ext uri="{FF2B5EF4-FFF2-40B4-BE49-F238E27FC236}">
+                      <a16:creationId xmlns:a16="http://schemas.microsoft.com/office/drawing/2014/main" id="{A177283E-1734-422D-A968-CB9E96F646AF}"/>
+                    </a:ext>
+                  </a:extLst>
+                </p:cNvPr>
+                <p:cNvSpPr txBox="1">
+                  <a:spLocks noRot="1" noChangeAspect="1" noMove="1" noResize="1" noEditPoints="1" noAdjustHandles="1" noChangeArrowheads="1" noChangeShapeType="1" noTextEdit="1"/>
+                </p:cNvSpPr>
+                <p:nvPr/>
+              </p:nvSpPr>
+              <p:spPr>
+                <a:xfrm>
+                  <a:off x="2965142" y="2377982"/>
+                  <a:ext cx="864958" cy="646331"/>
+                </a:xfrm>
+                <a:prstGeom prst="rect">
+                  <a:avLst/>
+                </a:prstGeom>
+                <a:blipFill>
+                  <a:blip r:embed="rId18"/>
+                  <a:stretch>
+                    <a:fillRect l="-1408" r="-1408"/>
+                  </a:stretch>
+                </a:blipFill>
+              </p:spPr>
+              <p:txBody>
+                <a:bodyPr/>
+                <a:lstStyle/>
+                <a:p>
+                  <a:r>
+                    <a:rPr lang="en-AU">
+                      <a:noFill/>
+                    </a:rPr>
+                    <a:t> </a:t>
+                  </a:r>
+                </a:p>
+              </p:txBody>
+            </p:sp>
+          </mc:Fallback>
+        </mc:AlternateContent>
+      </p:grpSp>
+    </p:spTree>
+    <p:extLst>
+      <p:ext uri="{BB962C8B-B14F-4D97-AF65-F5344CB8AC3E}">
+        <p14:creationId xmlns:p14="http://schemas.microsoft.com/office/powerpoint/2010/main" val="2395432152"/>
+      </p:ext>
+    </p:extLst>
+  </p:cSld>
+  <p:clrMapOvr>
+    <a:masterClrMapping/>
+  </p:clrMapOvr>
+</p:sld>
+</file>
+
 <file path=ppt/theme/theme1.xml><?xml version="1.0" encoding="utf-8"?>
 <a:theme xmlns:a="http://schemas.openxmlformats.org/drawingml/2006/main" name="Office Theme">
   <a:themeElements>

</xml_diff>